<commit_message>
update dbtm + 7 TM icon(s)
</commit_message>
<xml_diff>
--- a/Icons_TimeMarks/BACKUP tm_icons/skulls.pptx
+++ b/Icons_TimeMarks/BACKUP tm_icons/skulls.pptx
@@ -6,6 +6,7 @@
   </p:sldMasterIdLst>
   <p:sldIdLst>
     <p:sldId id="256" r:id="rId2"/>
+    <p:sldId id="257" r:id="rId3"/>
   </p:sldIdLst>
   <p:sldSz cx="12192000" cy="6858000"/>
   <p:notesSz cx="6858000" cy="9144000"/>
@@ -24357,6 +24358,1040 @@
 </p:sld>
 </file>
 
+<file path=ppt/slides/slide2.xml><?xml version="1.0" encoding="utf-8"?>
+<p:sld xmlns:a="http://schemas.openxmlformats.org/drawingml/2006/main" xmlns:r="http://schemas.openxmlformats.org/officeDocument/2006/relationships" xmlns:p="http://schemas.openxmlformats.org/presentationml/2006/main">
+  <p:cSld>
+    <p:spTree>
+      <p:nvGrpSpPr>
+        <p:cNvPr id="1" name=""/>
+        <p:cNvGrpSpPr/>
+        <p:nvPr/>
+      </p:nvGrpSpPr>
+      <p:grpSpPr>
+        <a:xfrm>
+          <a:off x="0" y="0"/>
+          <a:ext cx="0" cy="0"/>
+          <a:chOff x="0" y="0"/>
+          <a:chExt cx="0" cy="0"/>
+        </a:xfrm>
+      </p:grpSpPr>
+      <p:sp>
+        <p:nvSpPr>
+          <p:cNvPr id="11" name="Freeform: Shape 10">
+            <a:extLst>
+              <a:ext uri="{FF2B5EF4-FFF2-40B4-BE49-F238E27FC236}">
+                <a16:creationId xmlns:a16="http://schemas.microsoft.com/office/drawing/2014/main" id="{6596786F-C65B-BA5A-5AC2-36DA52FA8DB7}"/>
+              </a:ext>
+            </a:extLst>
+          </p:cNvPr>
+          <p:cNvSpPr/>
+          <p:nvPr/>
+        </p:nvSpPr>
+        <p:spPr>
+          <a:xfrm rot="2753528" flipH="1">
+            <a:off x="240682" y="172288"/>
+            <a:ext cx="1186698" cy="666306"/>
+          </a:xfrm>
+          <a:custGeom>
+            <a:avLst/>
+            <a:gdLst>
+              <a:gd name="csX0" fmla="*/ 917925 w 1186698"/>
+              <a:gd name="csY0" fmla="*/ 242796 h 666306"/>
+              <a:gd name="csX1" fmla="*/ 908972 w 1186698"/>
+              <a:gd name="csY1" fmla="*/ 242796 h 666306"/>
+              <a:gd name="csX2" fmla="*/ 682575 w 1186698"/>
+              <a:gd name="csY2" fmla="*/ 235743 h 666306"/>
+              <a:gd name="csX3" fmla="*/ 682575 w 1186698"/>
+              <a:gd name="csY3" fmla="*/ 0 h 666306"/>
+              <a:gd name="csX4" fmla="*/ 536271 w 1186698"/>
+              <a:gd name="csY4" fmla="*/ 0 h 666306"/>
+              <a:gd name="csX5" fmla="*/ 536271 w 1186698"/>
+              <a:gd name="csY5" fmla="*/ 368625 h 666306"/>
+              <a:gd name="csX6" fmla="*/ 535993 w 1186698"/>
+              <a:gd name="csY6" fmla="*/ 377552 h 666306"/>
+              <a:gd name="csX7" fmla="*/ 536271 w 1186698"/>
+              <a:gd name="csY7" fmla="*/ 377560 h 666306"/>
+              <a:gd name="csX8" fmla="*/ 536271 w 1186698"/>
+              <a:gd name="csY8" fmla="*/ 377837 h 666306"/>
+              <a:gd name="csX9" fmla="*/ 545156 w 1186698"/>
+              <a:gd name="csY9" fmla="*/ 377837 h 666306"/>
+              <a:gd name="csX10" fmla="*/ 771621 w 1186698"/>
+              <a:gd name="csY10" fmla="*/ 384892 h 666306"/>
+              <a:gd name="csX11" fmla="*/ 771621 w 1186698"/>
+              <a:gd name="csY11" fmla="*/ 507143 h 666306"/>
+              <a:gd name="csX12" fmla="*/ 4556 w 1186698"/>
+              <a:gd name="csY12" fmla="*/ 483248 h 666306"/>
+              <a:gd name="csX13" fmla="*/ 0 w 1186698"/>
+              <a:gd name="csY13" fmla="*/ 629481 h 666306"/>
+              <a:gd name="csX14" fmla="*/ 1182143 w 1186698"/>
+              <a:gd name="csY14" fmla="*/ 666306 h 666306"/>
+              <a:gd name="csX15" fmla="*/ 1186698 w 1186698"/>
+              <a:gd name="csY15" fmla="*/ 520073 h 666306"/>
+              <a:gd name="csX16" fmla="*/ 917925 w 1186698"/>
+              <a:gd name="csY16" fmla="*/ 511701 h 666306"/>
+              <a:gd name="csX17" fmla="*/ 917925 w 1186698"/>
+              <a:gd name="csY17" fmla="*/ 251986 h 666306"/>
+              <a:gd name="csX18" fmla="*/ 918202 w 1186698"/>
+              <a:gd name="csY18" fmla="*/ 243083 h 666306"/>
+              <a:gd name="csX19" fmla="*/ 917925 w 1186698"/>
+              <a:gd name="csY19" fmla="*/ 243075 h 666306"/>
+            </a:gdLst>
+            <a:ahLst/>
+            <a:cxnLst>
+              <a:cxn ang="0">
+                <a:pos x="csX0" y="csY0"/>
+              </a:cxn>
+              <a:cxn ang="0">
+                <a:pos x="csX1" y="csY1"/>
+              </a:cxn>
+              <a:cxn ang="0">
+                <a:pos x="csX2" y="csY2"/>
+              </a:cxn>
+              <a:cxn ang="0">
+                <a:pos x="csX3" y="csY3"/>
+              </a:cxn>
+              <a:cxn ang="0">
+                <a:pos x="csX4" y="csY4"/>
+              </a:cxn>
+              <a:cxn ang="0">
+                <a:pos x="csX5" y="csY5"/>
+              </a:cxn>
+              <a:cxn ang="0">
+                <a:pos x="csX6" y="csY6"/>
+              </a:cxn>
+              <a:cxn ang="0">
+                <a:pos x="csX7" y="csY7"/>
+              </a:cxn>
+              <a:cxn ang="0">
+                <a:pos x="csX8" y="csY8"/>
+              </a:cxn>
+              <a:cxn ang="0">
+                <a:pos x="csX9" y="csY9"/>
+              </a:cxn>
+              <a:cxn ang="0">
+                <a:pos x="csX10" y="csY10"/>
+              </a:cxn>
+              <a:cxn ang="0">
+                <a:pos x="csX11" y="csY11"/>
+              </a:cxn>
+              <a:cxn ang="0">
+                <a:pos x="csX12" y="csY12"/>
+              </a:cxn>
+              <a:cxn ang="0">
+                <a:pos x="csX13" y="csY13"/>
+              </a:cxn>
+              <a:cxn ang="0">
+                <a:pos x="csX14" y="csY14"/>
+              </a:cxn>
+              <a:cxn ang="0">
+                <a:pos x="csX15" y="csY15"/>
+              </a:cxn>
+              <a:cxn ang="0">
+                <a:pos x="csX16" y="csY16"/>
+              </a:cxn>
+              <a:cxn ang="0">
+                <a:pos x="csX17" y="csY17"/>
+              </a:cxn>
+              <a:cxn ang="0">
+                <a:pos x="csX18" y="csY18"/>
+              </a:cxn>
+              <a:cxn ang="0">
+                <a:pos x="csX19" y="csY19"/>
+              </a:cxn>
+            </a:cxnLst>
+            <a:rect l="l" t="t" r="r" b="b"/>
+            <a:pathLst>
+              <a:path w="1186698" h="666306">
+                <a:moveTo>
+                  <a:pt x="917925" y="242796"/>
+                </a:moveTo>
+                <a:lnTo>
+                  <a:pt x="908972" y="242796"/>
+                </a:lnTo>
+                <a:lnTo>
+                  <a:pt x="682575" y="235743"/>
+                </a:lnTo>
+                <a:lnTo>
+                  <a:pt x="682575" y="0"/>
+                </a:lnTo>
+                <a:lnTo>
+                  <a:pt x="536271" y="0"/>
+                </a:lnTo>
+                <a:lnTo>
+                  <a:pt x="536271" y="368625"/>
+                </a:lnTo>
+                <a:lnTo>
+                  <a:pt x="535993" y="377552"/>
+                </a:lnTo>
+                <a:lnTo>
+                  <a:pt x="536271" y="377560"/>
+                </a:lnTo>
+                <a:lnTo>
+                  <a:pt x="536271" y="377837"/>
+                </a:lnTo>
+                <a:lnTo>
+                  <a:pt x="545156" y="377837"/>
+                </a:lnTo>
+                <a:lnTo>
+                  <a:pt x="771621" y="384892"/>
+                </a:lnTo>
+                <a:lnTo>
+                  <a:pt x="771621" y="507143"/>
+                </a:lnTo>
+                <a:lnTo>
+                  <a:pt x="4556" y="483248"/>
+                </a:lnTo>
+                <a:lnTo>
+                  <a:pt x="0" y="629481"/>
+                </a:lnTo>
+                <a:lnTo>
+                  <a:pt x="1182143" y="666306"/>
+                </a:lnTo>
+                <a:lnTo>
+                  <a:pt x="1186698" y="520073"/>
+                </a:lnTo>
+                <a:lnTo>
+                  <a:pt x="917925" y="511701"/>
+                </a:lnTo>
+                <a:lnTo>
+                  <a:pt x="917925" y="251986"/>
+                </a:lnTo>
+                <a:lnTo>
+                  <a:pt x="918202" y="243083"/>
+                </a:lnTo>
+                <a:lnTo>
+                  <a:pt x="917925" y="243075"/>
+                </a:lnTo>
+                <a:close/>
+              </a:path>
+            </a:pathLst>
+          </a:custGeom>
+        </p:spPr>
+        <p:style>
+          <a:lnRef idx="2">
+            <a:schemeClr val="accent1">
+              <a:shade val="15000"/>
+            </a:schemeClr>
+          </a:lnRef>
+          <a:fillRef idx="1">
+            <a:schemeClr val="accent1"/>
+          </a:fillRef>
+          <a:effectRef idx="0">
+            <a:schemeClr val="accent1"/>
+          </a:effectRef>
+          <a:fontRef idx="minor">
+            <a:schemeClr val="lt1"/>
+          </a:fontRef>
+        </p:style>
+        <p:txBody>
+          <a:bodyPr wrap="square" rtlCol="0" anchor="ctr">
+            <a:noAutofit/>
+          </a:bodyPr>
+          <a:lstStyle/>
+          <a:p>
+            <a:pPr algn="ctr"/>
+            <a:endParaRPr lang="en-US"/>
+          </a:p>
+        </p:txBody>
+      </p:sp>
+      <p:sp>
+        <p:nvSpPr>
+          <p:cNvPr id="16" name="Freeform: Shape 15">
+            <a:extLst>
+              <a:ext uri="{FF2B5EF4-FFF2-40B4-BE49-F238E27FC236}">
+                <a16:creationId xmlns:a16="http://schemas.microsoft.com/office/drawing/2014/main" id="{3B22599A-1E8F-2B03-6433-F4A9F8A63AC9}"/>
+              </a:ext>
+            </a:extLst>
+          </p:cNvPr>
+          <p:cNvSpPr/>
+          <p:nvPr/>
+        </p:nvSpPr>
+        <p:spPr>
+          <a:xfrm rot="16200000" flipH="1">
+            <a:off x="1023341" y="332516"/>
+            <a:ext cx="1035844" cy="659469"/>
+          </a:xfrm>
+          <a:custGeom>
+            <a:avLst/>
+            <a:gdLst>
+              <a:gd name="csX0" fmla="*/ 0 w 1035844"/>
+              <a:gd name="csY0" fmla="*/ 261548 h 659469"/>
+              <a:gd name="csX1" fmla="*/ 0 w 1035844"/>
+              <a:gd name="csY1" fmla="*/ 397923 h 659469"/>
+              <a:gd name="csX2" fmla="*/ 169069 w 1035844"/>
+              <a:gd name="csY2" fmla="*/ 397923 h 659469"/>
+              <a:gd name="csX3" fmla="*/ 169069 w 1035844"/>
+              <a:gd name="csY3" fmla="*/ 659469 h 659469"/>
+              <a:gd name="csX4" fmla="*/ 304804 w 1035844"/>
+              <a:gd name="csY4" fmla="*/ 659469 h 659469"/>
+              <a:gd name="csX5" fmla="*/ 304804 w 1035844"/>
+              <a:gd name="csY5" fmla="*/ 397923 h 659469"/>
+              <a:gd name="csX6" fmla="*/ 448895 w 1035844"/>
+              <a:gd name="csY6" fmla="*/ 397923 h 659469"/>
+              <a:gd name="csX7" fmla="*/ 448895 w 1035844"/>
+              <a:gd name="csY7" fmla="*/ 659469 h 659469"/>
+              <a:gd name="csX8" fmla="*/ 584631 w 1035844"/>
+              <a:gd name="csY8" fmla="*/ 659469 h 659469"/>
+              <a:gd name="csX9" fmla="*/ 584631 w 1035844"/>
+              <a:gd name="csY9" fmla="*/ 397923 h 659469"/>
+              <a:gd name="csX10" fmla="*/ 728722 w 1035844"/>
+              <a:gd name="csY10" fmla="*/ 397923 h 659469"/>
+              <a:gd name="csX11" fmla="*/ 728722 w 1035844"/>
+              <a:gd name="csY11" fmla="*/ 659469 h 659469"/>
+              <a:gd name="csX12" fmla="*/ 864458 w 1035844"/>
+              <a:gd name="csY12" fmla="*/ 659469 h 659469"/>
+              <a:gd name="csX13" fmla="*/ 864458 w 1035844"/>
+              <a:gd name="csY13" fmla="*/ 397923 h 659469"/>
+              <a:gd name="csX14" fmla="*/ 1035844 w 1035844"/>
+              <a:gd name="csY14" fmla="*/ 397923 h 659469"/>
+              <a:gd name="csX15" fmla="*/ 1035844 w 1035844"/>
+              <a:gd name="csY15" fmla="*/ 261548 h 659469"/>
+              <a:gd name="csX16" fmla="*/ 864458 w 1035844"/>
+              <a:gd name="csY16" fmla="*/ 261548 h 659469"/>
+              <a:gd name="csX17" fmla="*/ 864458 w 1035844"/>
+              <a:gd name="csY17" fmla="*/ 0 h 659469"/>
+              <a:gd name="csX18" fmla="*/ 728722 w 1035844"/>
+              <a:gd name="csY18" fmla="*/ 0 h 659469"/>
+              <a:gd name="csX19" fmla="*/ 728722 w 1035844"/>
+              <a:gd name="csY19" fmla="*/ 261548 h 659469"/>
+              <a:gd name="csX20" fmla="*/ 584631 w 1035844"/>
+              <a:gd name="csY20" fmla="*/ 261548 h 659469"/>
+              <a:gd name="csX21" fmla="*/ 584631 w 1035844"/>
+              <a:gd name="csY21" fmla="*/ 0 h 659469"/>
+              <a:gd name="csX22" fmla="*/ 448895 w 1035844"/>
+              <a:gd name="csY22" fmla="*/ 0 h 659469"/>
+              <a:gd name="csX23" fmla="*/ 448895 w 1035844"/>
+              <a:gd name="csY23" fmla="*/ 261548 h 659469"/>
+              <a:gd name="csX24" fmla="*/ 304804 w 1035844"/>
+              <a:gd name="csY24" fmla="*/ 261548 h 659469"/>
+              <a:gd name="csX25" fmla="*/ 304804 w 1035844"/>
+              <a:gd name="csY25" fmla="*/ 1 h 659469"/>
+              <a:gd name="csX26" fmla="*/ 169069 w 1035844"/>
+              <a:gd name="csY26" fmla="*/ 1 h 659469"/>
+              <a:gd name="csX27" fmla="*/ 169069 w 1035844"/>
+              <a:gd name="csY27" fmla="*/ 261548 h 659469"/>
+            </a:gdLst>
+            <a:ahLst/>
+            <a:cxnLst>
+              <a:cxn ang="0">
+                <a:pos x="csX0" y="csY0"/>
+              </a:cxn>
+              <a:cxn ang="0">
+                <a:pos x="csX1" y="csY1"/>
+              </a:cxn>
+              <a:cxn ang="0">
+                <a:pos x="csX2" y="csY2"/>
+              </a:cxn>
+              <a:cxn ang="0">
+                <a:pos x="csX3" y="csY3"/>
+              </a:cxn>
+              <a:cxn ang="0">
+                <a:pos x="csX4" y="csY4"/>
+              </a:cxn>
+              <a:cxn ang="0">
+                <a:pos x="csX5" y="csY5"/>
+              </a:cxn>
+              <a:cxn ang="0">
+                <a:pos x="csX6" y="csY6"/>
+              </a:cxn>
+              <a:cxn ang="0">
+                <a:pos x="csX7" y="csY7"/>
+              </a:cxn>
+              <a:cxn ang="0">
+                <a:pos x="csX8" y="csY8"/>
+              </a:cxn>
+              <a:cxn ang="0">
+                <a:pos x="csX9" y="csY9"/>
+              </a:cxn>
+              <a:cxn ang="0">
+                <a:pos x="csX10" y="csY10"/>
+              </a:cxn>
+              <a:cxn ang="0">
+                <a:pos x="csX11" y="csY11"/>
+              </a:cxn>
+              <a:cxn ang="0">
+                <a:pos x="csX12" y="csY12"/>
+              </a:cxn>
+              <a:cxn ang="0">
+                <a:pos x="csX13" y="csY13"/>
+              </a:cxn>
+              <a:cxn ang="0">
+                <a:pos x="csX14" y="csY14"/>
+              </a:cxn>
+              <a:cxn ang="0">
+                <a:pos x="csX15" y="csY15"/>
+              </a:cxn>
+              <a:cxn ang="0">
+                <a:pos x="csX16" y="csY16"/>
+              </a:cxn>
+              <a:cxn ang="0">
+                <a:pos x="csX17" y="csY17"/>
+              </a:cxn>
+              <a:cxn ang="0">
+                <a:pos x="csX18" y="csY18"/>
+              </a:cxn>
+              <a:cxn ang="0">
+                <a:pos x="csX19" y="csY19"/>
+              </a:cxn>
+              <a:cxn ang="0">
+                <a:pos x="csX20" y="csY20"/>
+              </a:cxn>
+              <a:cxn ang="0">
+                <a:pos x="csX21" y="csY21"/>
+              </a:cxn>
+              <a:cxn ang="0">
+                <a:pos x="csX22" y="csY22"/>
+              </a:cxn>
+              <a:cxn ang="0">
+                <a:pos x="csX23" y="csY23"/>
+              </a:cxn>
+              <a:cxn ang="0">
+                <a:pos x="csX24" y="csY24"/>
+              </a:cxn>
+              <a:cxn ang="0">
+                <a:pos x="csX25" y="csY25"/>
+              </a:cxn>
+              <a:cxn ang="0">
+                <a:pos x="csX26" y="csY26"/>
+              </a:cxn>
+              <a:cxn ang="0">
+                <a:pos x="csX27" y="csY27"/>
+              </a:cxn>
+            </a:cxnLst>
+            <a:rect l="l" t="t" r="r" b="b"/>
+            <a:pathLst>
+              <a:path w="1035844" h="659469">
+                <a:moveTo>
+                  <a:pt x="0" y="261548"/>
+                </a:moveTo>
+                <a:lnTo>
+                  <a:pt x="0" y="397923"/>
+                </a:lnTo>
+                <a:lnTo>
+                  <a:pt x="169069" y="397923"/>
+                </a:lnTo>
+                <a:lnTo>
+                  <a:pt x="169069" y="659469"/>
+                </a:lnTo>
+                <a:lnTo>
+                  <a:pt x="304804" y="659469"/>
+                </a:lnTo>
+                <a:lnTo>
+                  <a:pt x="304804" y="397923"/>
+                </a:lnTo>
+                <a:lnTo>
+                  <a:pt x="448895" y="397923"/>
+                </a:lnTo>
+                <a:lnTo>
+                  <a:pt x="448895" y="659469"/>
+                </a:lnTo>
+                <a:lnTo>
+                  <a:pt x="584631" y="659469"/>
+                </a:lnTo>
+                <a:lnTo>
+                  <a:pt x="584631" y="397923"/>
+                </a:lnTo>
+                <a:lnTo>
+                  <a:pt x="728722" y="397923"/>
+                </a:lnTo>
+                <a:lnTo>
+                  <a:pt x="728722" y="659469"/>
+                </a:lnTo>
+                <a:lnTo>
+                  <a:pt x="864458" y="659469"/>
+                </a:lnTo>
+                <a:lnTo>
+                  <a:pt x="864458" y="397923"/>
+                </a:lnTo>
+                <a:lnTo>
+                  <a:pt x="1035844" y="397923"/>
+                </a:lnTo>
+                <a:lnTo>
+                  <a:pt x="1035844" y="261548"/>
+                </a:lnTo>
+                <a:lnTo>
+                  <a:pt x="864458" y="261548"/>
+                </a:lnTo>
+                <a:lnTo>
+                  <a:pt x="864458" y="0"/>
+                </a:lnTo>
+                <a:lnTo>
+                  <a:pt x="728722" y="0"/>
+                </a:lnTo>
+                <a:lnTo>
+                  <a:pt x="728722" y="261548"/>
+                </a:lnTo>
+                <a:lnTo>
+                  <a:pt x="584631" y="261548"/>
+                </a:lnTo>
+                <a:lnTo>
+                  <a:pt x="584631" y="0"/>
+                </a:lnTo>
+                <a:lnTo>
+                  <a:pt x="448895" y="0"/>
+                </a:lnTo>
+                <a:lnTo>
+                  <a:pt x="448895" y="261548"/>
+                </a:lnTo>
+                <a:lnTo>
+                  <a:pt x="304804" y="261548"/>
+                </a:lnTo>
+                <a:lnTo>
+                  <a:pt x="304804" y="1"/>
+                </a:lnTo>
+                <a:lnTo>
+                  <a:pt x="169069" y="1"/>
+                </a:lnTo>
+                <a:lnTo>
+                  <a:pt x="169069" y="261548"/>
+                </a:lnTo>
+                <a:close/>
+              </a:path>
+            </a:pathLst>
+          </a:custGeom>
+        </p:spPr>
+        <p:style>
+          <a:lnRef idx="2">
+            <a:schemeClr val="accent1">
+              <a:shade val="15000"/>
+            </a:schemeClr>
+          </a:lnRef>
+          <a:fillRef idx="1">
+            <a:schemeClr val="accent1"/>
+          </a:fillRef>
+          <a:effectRef idx="0">
+            <a:schemeClr val="accent1"/>
+          </a:effectRef>
+          <a:fontRef idx="minor">
+            <a:schemeClr val="lt1"/>
+          </a:fontRef>
+        </p:style>
+        <p:txBody>
+          <a:bodyPr wrap="square" rtlCol="0" anchor="ctr">
+            <a:noAutofit/>
+          </a:bodyPr>
+          <a:lstStyle/>
+          <a:p>
+            <a:pPr algn="ctr"/>
+            <a:endParaRPr lang="en-US"/>
+          </a:p>
+        </p:txBody>
+      </p:sp>
+      <p:sp>
+        <p:nvSpPr>
+          <p:cNvPr id="2" name="Freeform: Shape 1">
+            <a:extLst>
+              <a:ext uri="{FF2B5EF4-FFF2-40B4-BE49-F238E27FC236}">
+                <a16:creationId xmlns:a16="http://schemas.microsoft.com/office/drawing/2014/main" id="{4EE6936E-D0F9-3B32-ACD8-05B932007D09}"/>
+              </a:ext>
+            </a:extLst>
+          </p:cNvPr>
+          <p:cNvSpPr/>
+          <p:nvPr/>
+        </p:nvSpPr>
+        <p:spPr>
+          <a:xfrm rot="2753528" flipH="1">
+            <a:off x="2244107" y="172288"/>
+            <a:ext cx="1186698" cy="666306"/>
+          </a:xfrm>
+          <a:custGeom>
+            <a:avLst/>
+            <a:gdLst>
+              <a:gd name="csX0" fmla="*/ 917925 w 1186698"/>
+              <a:gd name="csY0" fmla="*/ 242796 h 666306"/>
+              <a:gd name="csX1" fmla="*/ 908972 w 1186698"/>
+              <a:gd name="csY1" fmla="*/ 242796 h 666306"/>
+              <a:gd name="csX2" fmla="*/ 682575 w 1186698"/>
+              <a:gd name="csY2" fmla="*/ 235743 h 666306"/>
+              <a:gd name="csX3" fmla="*/ 682575 w 1186698"/>
+              <a:gd name="csY3" fmla="*/ 0 h 666306"/>
+              <a:gd name="csX4" fmla="*/ 536271 w 1186698"/>
+              <a:gd name="csY4" fmla="*/ 0 h 666306"/>
+              <a:gd name="csX5" fmla="*/ 536271 w 1186698"/>
+              <a:gd name="csY5" fmla="*/ 368625 h 666306"/>
+              <a:gd name="csX6" fmla="*/ 535993 w 1186698"/>
+              <a:gd name="csY6" fmla="*/ 377552 h 666306"/>
+              <a:gd name="csX7" fmla="*/ 536271 w 1186698"/>
+              <a:gd name="csY7" fmla="*/ 377560 h 666306"/>
+              <a:gd name="csX8" fmla="*/ 536271 w 1186698"/>
+              <a:gd name="csY8" fmla="*/ 377837 h 666306"/>
+              <a:gd name="csX9" fmla="*/ 545156 w 1186698"/>
+              <a:gd name="csY9" fmla="*/ 377837 h 666306"/>
+              <a:gd name="csX10" fmla="*/ 771621 w 1186698"/>
+              <a:gd name="csY10" fmla="*/ 384892 h 666306"/>
+              <a:gd name="csX11" fmla="*/ 771621 w 1186698"/>
+              <a:gd name="csY11" fmla="*/ 507143 h 666306"/>
+              <a:gd name="csX12" fmla="*/ 4556 w 1186698"/>
+              <a:gd name="csY12" fmla="*/ 483248 h 666306"/>
+              <a:gd name="csX13" fmla="*/ 0 w 1186698"/>
+              <a:gd name="csY13" fmla="*/ 629481 h 666306"/>
+              <a:gd name="csX14" fmla="*/ 1182143 w 1186698"/>
+              <a:gd name="csY14" fmla="*/ 666306 h 666306"/>
+              <a:gd name="csX15" fmla="*/ 1186698 w 1186698"/>
+              <a:gd name="csY15" fmla="*/ 520073 h 666306"/>
+              <a:gd name="csX16" fmla="*/ 917925 w 1186698"/>
+              <a:gd name="csY16" fmla="*/ 511701 h 666306"/>
+              <a:gd name="csX17" fmla="*/ 917925 w 1186698"/>
+              <a:gd name="csY17" fmla="*/ 251986 h 666306"/>
+              <a:gd name="csX18" fmla="*/ 918202 w 1186698"/>
+              <a:gd name="csY18" fmla="*/ 243083 h 666306"/>
+              <a:gd name="csX19" fmla="*/ 917925 w 1186698"/>
+              <a:gd name="csY19" fmla="*/ 243075 h 666306"/>
+            </a:gdLst>
+            <a:ahLst/>
+            <a:cxnLst>
+              <a:cxn ang="0">
+                <a:pos x="csX0" y="csY0"/>
+              </a:cxn>
+              <a:cxn ang="0">
+                <a:pos x="csX1" y="csY1"/>
+              </a:cxn>
+              <a:cxn ang="0">
+                <a:pos x="csX2" y="csY2"/>
+              </a:cxn>
+              <a:cxn ang="0">
+                <a:pos x="csX3" y="csY3"/>
+              </a:cxn>
+              <a:cxn ang="0">
+                <a:pos x="csX4" y="csY4"/>
+              </a:cxn>
+              <a:cxn ang="0">
+                <a:pos x="csX5" y="csY5"/>
+              </a:cxn>
+              <a:cxn ang="0">
+                <a:pos x="csX6" y="csY6"/>
+              </a:cxn>
+              <a:cxn ang="0">
+                <a:pos x="csX7" y="csY7"/>
+              </a:cxn>
+              <a:cxn ang="0">
+                <a:pos x="csX8" y="csY8"/>
+              </a:cxn>
+              <a:cxn ang="0">
+                <a:pos x="csX9" y="csY9"/>
+              </a:cxn>
+              <a:cxn ang="0">
+                <a:pos x="csX10" y="csY10"/>
+              </a:cxn>
+              <a:cxn ang="0">
+                <a:pos x="csX11" y="csY11"/>
+              </a:cxn>
+              <a:cxn ang="0">
+                <a:pos x="csX12" y="csY12"/>
+              </a:cxn>
+              <a:cxn ang="0">
+                <a:pos x="csX13" y="csY13"/>
+              </a:cxn>
+              <a:cxn ang="0">
+                <a:pos x="csX14" y="csY14"/>
+              </a:cxn>
+              <a:cxn ang="0">
+                <a:pos x="csX15" y="csY15"/>
+              </a:cxn>
+              <a:cxn ang="0">
+                <a:pos x="csX16" y="csY16"/>
+              </a:cxn>
+              <a:cxn ang="0">
+                <a:pos x="csX17" y="csY17"/>
+              </a:cxn>
+              <a:cxn ang="0">
+                <a:pos x="csX18" y="csY18"/>
+              </a:cxn>
+              <a:cxn ang="0">
+                <a:pos x="csX19" y="csY19"/>
+              </a:cxn>
+            </a:cxnLst>
+            <a:rect l="l" t="t" r="r" b="b"/>
+            <a:pathLst>
+              <a:path w="1186698" h="666306">
+                <a:moveTo>
+                  <a:pt x="917925" y="242796"/>
+                </a:moveTo>
+                <a:lnTo>
+                  <a:pt x="908972" y="242796"/>
+                </a:lnTo>
+                <a:lnTo>
+                  <a:pt x="682575" y="235743"/>
+                </a:lnTo>
+                <a:lnTo>
+                  <a:pt x="682575" y="0"/>
+                </a:lnTo>
+                <a:lnTo>
+                  <a:pt x="536271" y="0"/>
+                </a:lnTo>
+                <a:lnTo>
+                  <a:pt x="536271" y="368625"/>
+                </a:lnTo>
+                <a:lnTo>
+                  <a:pt x="535993" y="377552"/>
+                </a:lnTo>
+                <a:lnTo>
+                  <a:pt x="536271" y="377560"/>
+                </a:lnTo>
+                <a:lnTo>
+                  <a:pt x="536271" y="377837"/>
+                </a:lnTo>
+                <a:lnTo>
+                  <a:pt x="545156" y="377837"/>
+                </a:lnTo>
+                <a:lnTo>
+                  <a:pt x="771621" y="384892"/>
+                </a:lnTo>
+                <a:lnTo>
+                  <a:pt x="771621" y="507143"/>
+                </a:lnTo>
+                <a:lnTo>
+                  <a:pt x="4556" y="483248"/>
+                </a:lnTo>
+                <a:lnTo>
+                  <a:pt x="0" y="629481"/>
+                </a:lnTo>
+                <a:lnTo>
+                  <a:pt x="1182143" y="666306"/>
+                </a:lnTo>
+                <a:lnTo>
+                  <a:pt x="1186698" y="520073"/>
+                </a:lnTo>
+                <a:lnTo>
+                  <a:pt x="917925" y="511701"/>
+                </a:lnTo>
+                <a:lnTo>
+                  <a:pt x="917925" y="251986"/>
+                </a:lnTo>
+                <a:lnTo>
+                  <a:pt x="918202" y="243083"/>
+                </a:lnTo>
+                <a:lnTo>
+                  <a:pt x="917925" y="243075"/>
+                </a:lnTo>
+                <a:close/>
+              </a:path>
+            </a:pathLst>
+          </a:custGeom>
+        </p:spPr>
+        <p:style>
+          <a:lnRef idx="2">
+            <a:schemeClr val="accent1">
+              <a:shade val="15000"/>
+            </a:schemeClr>
+          </a:lnRef>
+          <a:fillRef idx="1">
+            <a:schemeClr val="accent1"/>
+          </a:fillRef>
+          <a:effectRef idx="0">
+            <a:schemeClr val="accent1"/>
+          </a:effectRef>
+          <a:fontRef idx="minor">
+            <a:schemeClr val="lt1"/>
+          </a:fontRef>
+        </p:style>
+        <p:txBody>
+          <a:bodyPr wrap="square" rtlCol="0" anchor="ctr">
+            <a:noAutofit/>
+          </a:bodyPr>
+          <a:lstStyle/>
+          <a:p>
+            <a:pPr algn="ctr"/>
+            <a:endParaRPr lang="en-US"/>
+          </a:p>
+        </p:txBody>
+      </p:sp>
+      <p:sp>
+        <p:nvSpPr>
+          <p:cNvPr id="3" name="Freeform: Shape 2">
+            <a:extLst>
+              <a:ext uri="{FF2B5EF4-FFF2-40B4-BE49-F238E27FC236}">
+                <a16:creationId xmlns:a16="http://schemas.microsoft.com/office/drawing/2014/main" id="{DDAF1C4F-7F90-52E0-AEF7-B166A0C5E1CC}"/>
+              </a:ext>
+            </a:extLst>
+          </p:cNvPr>
+          <p:cNvSpPr/>
+          <p:nvPr/>
+        </p:nvSpPr>
+        <p:spPr>
+          <a:xfrm rot="16200000" flipH="1">
+            <a:off x="3136131" y="372295"/>
+            <a:ext cx="940677" cy="598881"/>
+          </a:xfrm>
+          <a:custGeom>
+            <a:avLst/>
+            <a:gdLst>
+              <a:gd name="csX0" fmla="*/ 0 w 1035844"/>
+              <a:gd name="csY0" fmla="*/ 261548 h 659469"/>
+              <a:gd name="csX1" fmla="*/ 0 w 1035844"/>
+              <a:gd name="csY1" fmla="*/ 397923 h 659469"/>
+              <a:gd name="csX2" fmla="*/ 169069 w 1035844"/>
+              <a:gd name="csY2" fmla="*/ 397923 h 659469"/>
+              <a:gd name="csX3" fmla="*/ 169069 w 1035844"/>
+              <a:gd name="csY3" fmla="*/ 659469 h 659469"/>
+              <a:gd name="csX4" fmla="*/ 304804 w 1035844"/>
+              <a:gd name="csY4" fmla="*/ 659469 h 659469"/>
+              <a:gd name="csX5" fmla="*/ 304804 w 1035844"/>
+              <a:gd name="csY5" fmla="*/ 397923 h 659469"/>
+              <a:gd name="csX6" fmla="*/ 448895 w 1035844"/>
+              <a:gd name="csY6" fmla="*/ 397923 h 659469"/>
+              <a:gd name="csX7" fmla="*/ 448895 w 1035844"/>
+              <a:gd name="csY7" fmla="*/ 659469 h 659469"/>
+              <a:gd name="csX8" fmla="*/ 584631 w 1035844"/>
+              <a:gd name="csY8" fmla="*/ 659469 h 659469"/>
+              <a:gd name="csX9" fmla="*/ 584631 w 1035844"/>
+              <a:gd name="csY9" fmla="*/ 397923 h 659469"/>
+              <a:gd name="csX10" fmla="*/ 728722 w 1035844"/>
+              <a:gd name="csY10" fmla="*/ 397923 h 659469"/>
+              <a:gd name="csX11" fmla="*/ 728722 w 1035844"/>
+              <a:gd name="csY11" fmla="*/ 659469 h 659469"/>
+              <a:gd name="csX12" fmla="*/ 864458 w 1035844"/>
+              <a:gd name="csY12" fmla="*/ 659469 h 659469"/>
+              <a:gd name="csX13" fmla="*/ 864458 w 1035844"/>
+              <a:gd name="csY13" fmla="*/ 397923 h 659469"/>
+              <a:gd name="csX14" fmla="*/ 1035844 w 1035844"/>
+              <a:gd name="csY14" fmla="*/ 397923 h 659469"/>
+              <a:gd name="csX15" fmla="*/ 1035844 w 1035844"/>
+              <a:gd name="csY15" fmla="*/ 261548 h 659469"/>
+              <a:gd name="csX16" fmla="*/ 864458 w 1035844"/>
+              <a:gd name="csY16" fmla="*/ 261548 h 659469"/>
+              <a:gd name="csX17" fmla="*/ 864458 w 1035844"/>
+              <a:gd name="csY17" fmla="*/ 0 h 659469"/>
+              <a:gd name="csX18" fmla="*/ 728722 w 1035844"/>
+              <a:gd name="csY18" fmla="*/ 0 h 659469"/>
+              <a:gd name="csX19" fmla="*/ 728722 w 1035844"/>
+              <a:gd name="csY19" fmla="*/ 261548 h 659469"/>
+              <a:gd name="csX20" fmla="*/ 584631 w 1035844"/>
+              <a:gd name="csY20" fmla="*/ 261548 h 659469"/>
+              <a:gd name="csX21" fmla="*/ 584631 w 1035844"/>
+              <a:gd name="csY21" fmla="*/ 0 h 659469"/>
+              <a:gd name="csX22" fmla="*/ 448895 w 1035844"/>
+              <a:gd name="csY22" fmla="*/ 0 h 659469"/>
+              <a:gd name="csX23" fmla="*/ 448895 w 1035844"/>
+              <a:gd name="csY23" fmla="*/ 261548 h 659469"/>
+              <a:gd name="csX24" fmla="*/ 304804 w 1035844"/>
+              <a:gd name="csY24" fmla="*/ 261548 h 659469"/>
+              <a:gd name="csX25" fmla="*/ 304804 w 1035844"/>
+              <a:gd name="csY25" fmla="*/ 1 h 659469"/>
+              <a:gd name="csX26" fmla="*/ 169069 w 1035844"/>
+              <a:gd name="csY26" fmla="*/ 1 h 659469"/>
+              <a:gd name="csX27" fmla="*/ 169069 w 1035844"/>
+              <a:gd name="csY27" fmla="*/ 261548 h 659469"/>
+            </a:gdLst>
+            <a:ahLst/>
+            <a:cxnLst>
+              <a:cxn ang="0">
+                <a:pos x="csX0" y="csY0"/>
+              </a:cxn>
+              <a:cxn ang="0">
+                <a:pos x="csX1" y="csY1"/>
+              </a:cxn>
+              <a:cxn ang="0">
+                <a:pos x="csX2" y="csY2"/>
+              </a:cxn>
+              <a:cxn ang="0">
+                <a:pos x="csX3" y="csY3"/>
+              </a:cxn>
+              <a:cxn ang="0">
+                <a:pos x="csX4" y="csY4"/>
+              </a:cxn>
+              <a:cxn ang="0">
+                <a:pos x="csX5" y="csY5"/>
+              </a:cxn>
+              <a:cxn ang="0">
+                <a:pos x="csX6" y="csY6"/>
+              </a:cxn>
+              <a:cxn ang="0">
+                <a:pos x="csX7" y="csY7"/>
+              </a:cxn>
+              <a:cxn ang="0">
+                <a:pos x="csX8" y="csY8"/>
+              </a:cxn>
+              <a:cxn ang="0">
+                <a:pos x="csX9" y="csY9"/>
+              </a:cxn>
+              <a:cxn ang="0">
+                <a:pos x="csX10" y="csY10"/>
+              </a:cxn>
+              <a:cxn ang="0">
+                <a:pos x="csX11" y="csY11"/>
+              </a:cxn>
+              <a:cxn ang="0">
+                <a:pos x="csX12" y="csY12"/>
+              </a:cxn>
+              <a:cxn ang="0">
+                <a:pos x="csX13" y="csY13"/>
+              </a:cxn>
+              <a:cxn ang="0">
+                <a:pos x="csX14" y="csY14"/>
+              </a:cxn>
+              <a:cxn ang="0">
+                <a:pos x="csX15" y="csY15"/>
+              </a:cxn>
+              <a:cxn ang="0">
+                <a:pos x="csX16" y="csY16"/>
+              </a:cxn>
+              <a:cxn ang="0">
+                <a:pos x="csX17" y="csY17"/>
+              </a:cxn>
+              <a:cxn ang="0">
+                <a:pos x="csX18" y="csY18"/>
+              </a:cxn>
+              <a:cxn ang="0">
+                <a:pos x="csX19" y="csY19"/>
+              </a:cxn>
+              <a:cxn ang="0">
+                <a:pos x="csX20" y="csY20"/>
+              </a:cxn>
+              <a:cxn ang="0">
+                <a:pos x="csX21" y="csY21"/>
+              </a:cxn>
+              <a:cxn ang="0">
+                <a:pos x="csX22" y="csY22"/>
+              </a:cxn>
+              <a:cxn ang="0">
+                <a:pos x="csX23" y="csY23"/>
+              </a:cxn>
+              <a:cxn ang="0">
+                <a:pos x="csX24" y="csY24"/>
+              </a:cxn>
+              <a:cxn ang="0">
+                <a:pos x="csX25" y="csY25"/>
+              </a:cxn>
+              <a:cxn ang="0">
+                <a:pos x="csX26" y="csY26"/>
+              </a:cxn>
+              <a:cxn ang="0">
+                <a:pos x="csX27" y="csY27"/>
+              </a:cxn>
+            </a:cxnLst>
+            <a:rect l="l" t="t" r="r" b="b"/>
+            <a:pathLst>
+              <a:path w="1035844" h="659469">
+                <a:moveTo>
+                  <a:pt x="0" y="261548"/>
+                </a:moveTo>
+                <a:lnTo>
+                  <a:pt x="0" y="397923"/>
+                </a:lnTo>
+                <a:lnTo>
+                  <a:pt x="169069" y="397923"/>
+                </a:lnTo>
+                <a:lnTo>
+                  <a:pt x="169069" y="659469"/>
+                </a:lnTo>
+                <a:lnTo>
+                  <a:pt x="304804" y="659469"/>
+                </a:lnTo>
+                <a:lnTo>
+                  <a:pt x="304804" y="397923"/>
+                </a:lnTo>
+                <a:lnTo>
+                  <a:pt x="448895" y="397923"/>
+                </a:lnTo>
+                <a:lnTo>
+                  <a:pt x="448895" y="659469"/>
+                </a:lnTo>
+                <a:lnTo>
+                  <a:pt x="584631" y="659469"/>
+                </a:lnTo>
+                <a:lnTo>
+                  <a:pt x="584631" y="397923"/>
+                </a:lnTo>
+                <a:lnTo>
+                  <a:pt x="728722" y="397923"/>
+                </a:lnTo>
+                <a:lnTo>
+                  <a:pt x="728722" y="659469"/>
+                </a:lnTo>
+                <a:lnTo>
+                  <a:pt x="864458" y="659469"/>
+                </a:lnTo>
+                <a:lnTo>
+                  <a:pt x="864458" y="397923"/>
+                </a:lnTo>
+                <a:lnTo>
+                  <a:pt x="1035844" y="397923"/>
+                </a:lnTo>
+                <a:lnTo>
+                  <a:pt x="1035844" y="261548"/>
+                </a:lnTo>
+                <a:lnTo>
+                  <a:pt x="864458" y="261548"/>
+                </a:lnTo>
+                <a:lnTo>
+                  <a:pt x="864458" y="0"/>
+                </a:lnTo>
+                <a:lnTo>
+                  <a:pt x="728722" y="0"/>
+                </a:lnTo>
+                <a:lnTo>
+                  <a:pt x="728722" y="261548"/>
+                </a:lnTo>
+                <a:lnTo>
+                  <a:pt x="584631" y="261548"/>
+                </a:lnTo>
+                <a:lnTo>
+                  <a:pt x="584631" y="0"/>
+                </a:lnTo>
+                <a:lnTo>
+                  <a:pt x="448895" y="0"/>
+                </a:lnTo>
+                <a:lnTo>
+                  <a:pt x="448895" y="261548"/>
+                </a:lnTo>
+                <a:lnTo>
+                  <a:pt x="304804" y="261548"/>
+                </a:lnTo>
+                <a:lnTo>
+                  <a:pt x="304804" y="1"/>
+                </a:lnTo>
+                <a:lnTo>
+                  <a:pt x="169069" y="1"/>
+                </a:lnTo>
+                <a:lnTo>
+                  <a:pt x="169069" y="261548"/>
+                </a:lnTo>
+                <a:close/>
+              </a:path>
+            </a:pathLst>
+          </a:custGeom>
+        </p:spPr>
+        <p:style>
+          <a:lnRef idx="2">
+            <a:schemeClr val="accent1">
+              <a:shade val="15000"/>
+            </a:schemeClr>
+          </a:lnRef>
+          <a:fillRef idx="1">
+            <a:schemeClr val="accent1"/>
+          </a:fillRef>
+          <a:effectRef idx="0">
+            <a:schemeClr val="accent1"/>
+          </a:effectRef>
+          <a:fontRef idx="minor">
+            <a:schemeClr val="lt1"/>
+          </a:fontRef>
+        </p:style>
+        <p:txBody>
+          <a:bodyPr wrap="square" rtlCol="0" anchor="ctr">
+            <a:noAutofit/>
+          </a:bodyPr>
+          <a:lstStyle/>
+          <a:p>
+            <a:pPr algn="ctr"/>
+            <a:endParaRPr lang="en-US"/>
+          </a:p>
+        </p:txBody>
+      </p:sp>
+    </p:spTree>
+    <p:extLst>
+      <p:ext uri="{BB962C8B-B14F-4D97-AF65-F5344CB8AC3E}">
+        <p14:creationId xmlns:p14="http://schemas.microsoft.com/office/powerpoint/2010/main" val="17930377"/>
+      </p:ext>
+    </p:extLst>
+  </p:cSld>
+  <p:clrMapOvr>
+    <a:masterClrMapping/>
+  </p:clrMapOvr>
+</p:sld>
+</file>
+
 <file path=ppt/theme/theme1.xml><?xml version="1.0" encoding="utf-8"?>
 <a:theme xmlns:a="http://schemas.openxmlformats.org/drawingml/2006/main" name="Office Theme">
   <a:themeElements>

</xml_diff>

<commit_message>
update dbtm + 1 TM icon(s)
</commit_message>
<xml_diff>
--- a/Icons_TimeMarks/BACKUP tm_icons/skulls.pptx
+++ b/Icons_TimeMarks/BACKUP tm_icons/skulls.pptx
@@ -7,6 +7,7 @@
   <p:sldIdLst>
     <p:sldId id="256" r:id="rId2"/>
     <p:sldId id="257" r:id="rId3"/>
+    <p:sldId id="258" r:id="rId4"/>
   </p:sldIdLst>
   <p:sldSz cx="12192000" cy="6858000"/>
   <p:notesSz cx="6858000" cy="9144000"/>
@@ -25379,10 +25380,2033 @@
           </a:p>
         </p:txBody>
       </p:sp>
+      <p:grpSp>
+        <p:nvGrpSpPr>
+          <p:cNvPr id="12" name="Graphic 4">
+            <a:extLst>
+              <a:ext uri="{FF2B5EF4-FFF2-40B4-BE49-F238E27FC236}">
+                <a16:creationId xmlns:a16="http://schemas.microsoft.com/office/drawing/2014/main" id="{2CDAADFF-2E48-BA74-A572-1F6DC9CCBDAE}"/>
+              </a:ext>
+            </a:extLst>
+          </p:cNvPr>
+          <p:cNvGrpSpPr/>
+          <p:nvPr/>
+        </p:nvGrpSpPr>
+        <p:grpSpPr>
+          <a:xfrm>
+            <a:off x="6410344" y="4438650"/>
+            <a:ext cx="4810705" cy="1704350"/>
+            <a:chOff x="513570" y="1452155"/>
+            <a:chExt cx="11164679" cy="3955454"/>
+          </a:xfrm>
+          <a:solidFill>
+            <a:srgbClr val="000000"/>
+          </a:solidFill>
+        </p:grpSpPr>
+        <p:sp>
+          <p:nvSpPr>
+            <p:cNvPr id="13" name="Freeform: Shape 12">
+              <a:extLst>
+                <a:ext uri="{FF2B5EF4-FFF2-40B4-BE49-F238E27FC236}">
+                  <a16:creationId xmlns:a16="http://schemas.microsoft.com/office/drawing/2014/main" id="{A2F2D0E5-F51A-8D63-8803-3AA85F5AEBA9}"/>
+                </a:ext>
+              </a:extLst>
+            </p:cNvPr>
+            <p:cNvSpPr/>
+            <p:nvPr/>
+          </p:nvSpPr>
+          <p:spPr>
+            <a:xfrm>
+              <a:off x="5853595" y="3667276"/>
+              <a:ext cx="902412" cy="1740245"/>
+            </a:xfrm>
+            <a:custGeom>
+              <a:avLst/>
+              <a:gdLst>
+                <a:gd name="csX0" fmla="*/ 18846 w 902412"/>
+                <a:gd name="csY0" fmla="*/ 174551 h 1740245"/>
+                <a:gd name="csX1" fmla="*/ 436642 w 902412"/>
+                <a:gd name="csY1" fmla="*/ 1067229 h 1740245"/>
+                <a:gd name="csX2" fmla="*/ 436828 w 902412"/>
+                <a:gd name="csY2" fmla="*/ 1146593 h 1740245"/>
+                <a:gd name="csX3" fmla="*/ 461112 w 902412"/>
+                <a:gd name="csY3" fmla="*/ 1354627 h 1740245"/>
+                <a:gd name="csX4" fmla="*/ 481302 w 902412"/>
+                <a:gd name="csY4" fmla="*/ 1629365 h 1740245"/>
+                <a:gd name="csX5" fmla="*/ 496525 w 902412"/>
+                <a:gd name="csY5" fmla="*/ 1747310 h 1740245"/>
+                <a:gd name="csX6" fmla="*/ 847290 w 902412"/>
+                <a:gd name="csY6" fmla="*/ 1747310 h 1740245"/>
+                <a:gd name="csX7" fmla="*/ 865961 w 902412"/>
+                <a:gd name="csY7" fmla="*/ 1732137 h 1740245"/>
+                <a:gd name="csX8" fmla="*/ 879103 w 902412"/>
+                <a:gd name="csY8" fmla="*/ 1731766 h 1740245"/>
+                <a:gd name="csX9" fmla="*/ 913977 w 902412"/>
+                <a:gd name="csY9" fmla="*/ 1737207 h 1740245"/>
+                <a:gd name="csX10" fmla="*/ 920476 w 902412"/>
+                <a:gd name="csY10" fmla="*/ 1732181 h 1740245"/>
+                <a:gd name="csX11" fmla="*/ 890621 w 902412"/>
+                <a:gd name="csY11" fmla="*/ 1690530 h 1740245"/>
+                <a:gd name="csX12" fmla="*/ 853419 w 902412"/>
+                <a:gd name="csY12" fmla="*/ 1672269 h 1740245"/>
+                <a:gd name="csX13" fmla="*/ 837426 w 902412"/>
+                <a:gd name="csY13" fmla="*/ 1666015 h 1740245"/>
+                <a:gd name="csX14" fmla="*/ 730034 w 902412"/>
+                <a:gd name="csY14" fmla="*/ 1632323 h 1740245"/>
+                <a:gd name="csX15" fmla="*/ 695940 w 902412"/>
+                <a:gd name="csY15" fmla="*/ 1558809 h 1740245"/>
+                <a:gd name="csX16" fmla="*/ 732740 w 902412"/>
+                <a:gd name="csY16" fmla="*/ 1210584 h 1740245"/>
+                <a:gd name="csX17" fmla="*/ 736766 w 902412"/>
+                <a:gd name="csY17" fmla="*/ 997170 h 1740245"/>
+                <a:gd name="csX18" fmla="*/ 436430 w 902412"/>
+                <a:gd name="csY18" fmla="*/ 7064 h 1740245"/>
+              </a:gdLst>
+              <a:ahLst/>
+              <a:cxnLst>
+                <a:cxn ang="0">
+                  <a:pos x="csX0" y="csY0"/>
+                </a:cxn>
+                <a:cxn ang="0">
+                  <a:pos x="csX1" y="csY1"/>
+                </a:cxn>
+                <a:cxn ang="0">
+                  <a:pos x="csX2" y="csY2"/>
+                </a:cxn>
+                <a:cxn ang="0">
+                  <a:pos x="csX3" y="csY3"/>
+                </a:cxn>
+                <a:cxn ang="0">
+                  <a:pos x="csX4" y="csY4"/>
+                </a:cxn>
+                <a:cxn ang="0">
+                  <a:pos x="csX5" y="csY5"/>
+                </a:cxn>
+                <a:cxn ang="0">
+                  <a:pos x="csX6" y="csY6"/>
+                </a:cxn>
+                <a:cxn ang="0">
+                  <a:pos x="csX7" y="csY7"/>
+                </a:cxn>
+                <a:cxn ang="0">
+                  <a:pos x="csX8" y="csY8"/>
+                </a:cxn>
+                <a:cxn ang="0">
+                  <a:pos x="csX9" y="csY9"/>
+                </a:cxn>
+                <a:cxn ang="0">
+                  <a:pos x="csX10" y="csY10"/>
+                </a:cxn>
+                <a:cxn ang="0">
+                  <a:pos x="csX11" y="csY11"/>
+                </a:cxn>
+                <a:cxn ang="0">
+                  <a:pos x="csX12" y="csY12"/>
+                </a:cxn>
+                <a:cxn ang="0">
+                  <a:pos x="csX13" y="csY13"/>
+                </a:cxn>
+                <a:cxn ang="0">
+                  <a:pos x="csX14" y="csY14"/>
+                </a:cxn>
+                <a:cxn ang="0">
+                  <a:pos x="csX15" y="csY15"/>
+                </a:cxn>
+                <a:cxn ang="0">
+                  <a:pos x="csX16" y="csY16"/>
+                </a:cxn>
+                <a:cxn ang="0">
+                  <a:pos x="csX17" y="csY17"/>
+                </a:cxn>
+                <a:cxn ang="0">
+                  <a:pos x="csX18" y="csY18"/>
+                </a:cxn>
+              </a:cxnLst>
+              <a:rect l="l" t="t" r="r" b="b"/>
+              <a:pathLst>
+                <a:path w="902412" h="1740245">
+                  <a:moveTo>
+                    <a:pt x="18846" y="174551"/>
+                  </a:moveTo>
+                  <a:lnTo>
+                    <a:pt x="436642" y="1067229"/>
+                  </a:lnTo>
+                  <a:cubicBezTo>
+                    <a:pt x="436642" y="1067229"/>
+                    <a:pt x="435381" y="1120171"/>
+                    <a:pt x="436828" y="1146593"/>
+                  </a:cubicBezTo>
+                  <a:cubicBezTo>
+                    <a:pt x="440655" y="1216435"/>
+                    <a:pt x="456013" y="1284865"/>
+                    <a:pt x="461112" y="1354627"/>
+                  </a:cubicBezTo>
+                  <a:cubicBezTo>
+                    <a:pt x="468549" y="1456380"/>
+                    <a:pt x="480342" y="1502553"/>
+                    <a:pt x="481302" y="1629365"/>
+                  </a:cubicBezTo>
+                  <a:cubicBezTo>
+                    <a:pt x="481655" y="1676020"/>
+                    <a:pt x="466749" y="1747310"/>
+                    <a:pt x="496525" y="1747310"/>
+                  </a:cubicBezTo>
+                  <a:lnTo>
+                    <a:pt x="847290" y="1747310"/>
+                  </a:lnTo>
+                  <a:cubicBezTo>
+                    <a:pt x="855932" y="1747310"/>
+                    <a:pt x="865961" y="1732137"/>
+                    <a:pt x="865961" y="1732137"/>
+                  </a:cubicBezTo>
+                  <a:cubicBezTo>
+                    <a:pt x="865961" y="1732137"/>
+                    <a:pt x="875585" y="1731624"/>
+                    <a:pt x="879103" y="1731766"/>
+                  </a:cubicBezTo>
+                  <a:cubicBezTo>
+                    <a:pt x="890873" y="1732243"/>
+                    <a:pt x="899353" y="1733409"/>
+                    <a:pt x="913977" y="1737207"/>
+                  </a:cubicBezTo>
+                  <a:cubicBezTo>
+                    <a:pt x="920466" y="1738893"/>
+                    <a:pt x="922575" y="1737139"/>
+                    <a:pt x="920476" y="1732181"/>
+                  </a:cubicBezTo>
+                  <a:cubicBezTo>
+                    <a:pt x="912805" y="1714054"/>
+                    <a:pt x="907002" y="1704514"/>
+                    <a:pt x="890621" y="1690530"/>
+                  </a:cubicBezTo>
+                  <a:cubicBezTo>
+                    <a:pt x="881198" y="1682485"/>
+                    <a:pt x="867968" y="1676777"/>
+                    <a:pt x="853419" y="1672269"/>
+                  </a:cubicBezTo>
+                  <a:cubicBezTo>
+                    <a:pt x="847647" y="1670480"/>
+                    <a:pt x="843491" y="1667080"/>
+                    <a:pt x="837426" y="1666015"/>
+                  </a:cubicBezTo>
+                  <a:cubicBezTo>
+                    <a:pt x="809038" y="1661025"/>
+                    <a:pt x="753584" y="1648941"/>
+                    <a:pt x="730034" y="1632323"/>
+                  </a:cubicBezTo>
+                  <a:cubicBezTo>
+                    <a:pt x="713727" y="1620816"/>
+                    <a:pt x="696505" y="1578759"/>
+                    <a:pt x="695940" y="1558809"/>
+                  </a:cubicBezTo>
+                  <a:cubicBezTo>
+                    <a:pt x="692538" y="1438755"/>
+                    <a:pt x="711777" y="1346292"/>
+                    <a:pt x="732740" y="1210584"/>
+                  </a:cubicBezTo>
+                  <a:cubicBezTo>
+                    <a:pt x="745365" y="1128854"/>
+                    <a:pt x="751001" y="1066173"/>
+                    <a:pt x="736766" y="997170"/>
+                  </a:cubicBezTo>
+                  <a:cubicBezTo>
+                    <a:pt x="673391" y="689960"/>
+                    <a:pt x="436430" y="7064"/>
+                    <a:pt x="436430" y="7064"/>
+                  </a:cubicBezTo>
+                </a:path>
+              </a:pathLst>
+            </a:custGeom>
+            <a:solidFill>
+              <a:srgbClr val="000000"/>
+            </a:solidFill>
+            <a:ln w="12473" cap="rnd">
+              <a:noFill/>
+              <a:prstDash val="solid"/>
+              <a:miter/>
+            </a:ln>
+          </p:spPr>
+          <p:txBody>
+            <a:bodyPr/>
+            <a:lstStyle/>
+            <a:p>
+              <a:endParaRPr lang="en-US"/>
+            </a:p>
+          </p:txBody>
+        </p:sp>
+        <p:sp>
+          <p:nvSpPr>
+            <p:cNvPr id="14" name="Freeform: Shape 13">
+              <a:extLst>
+                <a:ext uri="{FF2B5EF4-FFF2-40B4-BE49-F238E27FC236}">
+                  <a16:creationId xmlns:a16="http://schemas.microsoft.com/office/drawing/2014/main" id="{4504D5C6-CED7-2190-96F5-E2AA9A131295}"/>
+                </a:ext>
+              </a:extLst>
+            </p:cNvPr>
+            <p:cNvSpPr/>
+            <p:nvPr/>
+          </p:nvSpPr>
+          <p:spPr>
+            <a:xfrm>
+              <a:off x="513570" y="1452155"/>
+              <a:ext cx="11095799" cy="3452736"/>
+            </a:xfrm>
+            <a:custGeom>
+              <a:avLst/>
+              <a:gdLst>
+                <a:gd name="csX0" fmla="*/ 7633707 w 11095799"/>
+                <a:gd name="csY0" fmla="*/ 2300736 h 3452736"/>
+                <a:gd name="csX1" fmla="*/ 7559583 w 11095799"/>
+                <a:gd name="csY1" fmla="*/ 2545803 h 3452736"/>
+                <a:gd name="csX2" fmla="*/ 7497706 w 11095799"/>
+                <a:gd name="csY2" fmla="*/ 2774099 h 3452736"/>
+                <a:gd name="csX3" fmla="*/ 6881446 w 11095799"/>
+                <a:gd name="csY3" fmla="*/ 3119121 h 3452736"/>
+                <a:gd name="csX4" fmla="*/ 6229565 w 11095799"/>
+                <a:gd name="csY4" fmla="*/ 3168165 h 3452736"/>
+                <a:gd name="csX5" fmla="*/ 5478086 w 11095799"/>
+                <a:gd name="csY5" fmla="*/ 2950610 h 3452736"/>
+                <a:gd name="csX6" fmla="*/ 4917211 w 11095799"/>
+                <a:gd name="csY6" fmla="*/ 2917979 h 3452736"/>
+                <a:gd name="csX7" fmla="*/ 3516956 w 11095799"/>
+                <a:gd name="csY7" fmla="*/ 3035143 h 3452736"/>
+                <a:gd name="csX8" fmla="*/ 2213813 w 11095799"/>
+                <a:gd name="csY8" fmla="*/ 2957828 h 3452736"/>
+                <a:gd name="csX9" fmla="*/ 1118307 w 11095799"/>
+                <a:gd name="csY9" fmla="*/ 3055254 h 3452736"/>
+                <a:gd name="csX10" fmla="*/ 68145 w 11095799"/>
+                <a:gd name="csY10" fmla="*/ 3449225 h 3452736"/>
+                <a:gd name="csX11" fmla="*/ 48063 w 11095799"/>
+                <a:gd name="csY11" fmla="*/ 3422679 h 3452736"/>
+                <a:gd name="csX12" fmla="*/ 1117040 w 11095799"/>
+                <a:gd name="csY12" fmla="*/ 2916495 h 3452736"/>
+                <a:gd name="csX13" fmla="*/ 2246955 w 11095799"/>
+                <a:gd name="csY13" fmla="*/ 2755465 h 3452736"/>
+                <a:gd name="csX14" fmla="*/ 3491143 w 11095799"/>
+                <a:gd name="csY14" fmla="*/ 2682162 h 3452736"/>
+                <a:gd name="csX15" fmla="*/ 4526093 w 11095799"/>
+                <a:gd name="csY15" fmla="*/ 2406991 h 3452736"/>
+                <a:gd name="csX16" fmla="*/ 5167783 w 11095799"/>
+                <a:gd name="csY16" fmla="*/ 2138518 h 3452736"/>
+                <a:gd name="csX17" fmla="*/ 5642459 w 11095799"/>
+                <a:gd name="csY17" fmla="*/ 1958927 h 3452736"/>
+                <a:gd name="csX18" fmla="*/ 6806731 w 11095799"/>
+                <a:gd name="csY18" fmla="*/ 1574665 h 3452736"/>
+                <a:gd name="csX19" fmla="*/ 7292925 w 11095799"/>
+                <a:gd name="csY19" fmla="*/ 1416055 h 3452736"/>
+                <a:gd name="csX20" fmla="*/ 8114454 w 11095799"/>
+                <a:gd name="csY20" fmla="*/ 1085866 h 3452736"/>
+                <a:gd name="csX21" fmla="*/ 9062780 w 11095799"/>
+                <a:gd name="csY21" fmla="*/ 594596 h 3452736"/>
+                <a:gd name="csX22" fmla="*/ 10071899 w 11095799"/>
+                <a:gd name="csY22" fmla="*/ 143787 h 3452736"/>
+                <a:gd name="csX23" fmla="*/ 10651608 w 11095799"/>
+                <a:gd name="csY23" fmla="*/ 15576 h 3452736"/>
+                <a:gd name="csX24" fmla="*/ 10912360 w 11095799"/>
+                <a:gd name="csY24" fmla="*/ 13800 h 3452736"/>
+                <a:gd name="csX25" fmla="*/ 10996309 w 11095799"/>
+                <a:gd name="csY25" fmla="*/ 35399 h 3452736"/>
+                <a:gd name="csX26" fmla="*/ 11114690 w 11095799"/>
+                <a:gd name="csY26" fmla="*/ 358277 h 3452736"/>
+                <a:gd name="csX27" fmla="*/ 10762288 w 11095799"/>
+                <a:gd name="csY27" fmla="*/ 301958 h 3452736"/>
+                <a:gd name="csX28" fmla="*/ 10146528 w 11095799"/>
+                <a:gd name="csY28" fmla="*/ 511530 h 3452736"/>
+                <a:gd name="csX29" fmla="*/ 9383220 w 11095799"/>
+                <a:gd name="csY29" fmla="*/ 1037468 h 3452736"/>
+                <a:gd name="csX30" fmla="*/ 8339724 w 11095799"/>
+                <a:gd name="csY30" fmla="*/ 1808553 h 3452736"/>
+              </a:gdLst>
+              <a:ahLst/>
+              <a:cxnLst>
+                <a:cxn ang="0">
+                  <a:pos x="csX0" y="csY0"/>
+                </a:cxn>
+                <a:cxn ang="0">
+                  <a:pos x="csX1" y="csY1"/>
+                </a:cxn>
+                <a:cxn ang="0">
+                  <a:pos x="csX2" y="csY2"/>
+                </a:cxn>
+                <a:cxn ang="0">
+                  <a:pos x="csX3" y="csY3"/>
+                </a:cxn>
+                <a:cxn ang="0">
+                  <a:pos x="csX4" y="csY4"/>
+                </a:cxn>
+                <a:cxn ang="0">
+                  <a:pos x="csX5" y="csY5"/>
+                </a:cxn>
+                <a:cxn ang="0">
+                  <a:pos x="csX6" y="csY6"/>
+                </a:cxn>
+                <a:cxn ang="0">
+                  <a:pos x="csX7" y="csY7"/>
+                </a:cxn>
+                <a:cxn ang="0">
+                  <a:pos x="csX8" y="csY8"/>
+                </a:cxn>
+                <a:cxn ang="0">
+                  <a:pos x="csX9" y="csY9"/>
+                </a:cxn>
+                <a:cxn ang="0">
+                  <a:pos x="csX10" y="csY10"/>
+                </a:cxn>
+                <a:cxn ang="0">
+                  <a:pos x="csX11" y="csY11"/>
+                </a:cxn>
+                <a:cxn ang="0">
+                  <a:pos x="csX12" y="csY12"/>
+                </a:cxn>
+                <a:cxn ang="0">
+                  <a:pos x="csX13" y="csY13"/>
+                </a:cxn>
+                <a:cxn ang="0">
+                  <a:pos x="csX14" y="csY14"/>
+                </a:cxn>
+                <a:cxn ang="0">
+                  <a:pos x="csX15" y="csY15"/>
+                </a:cxn>
+                <a:cxn ang="0">
+                  <a:pos x="csX16" y="csY16"/>
+                </a:cxn>
+                <a:cxn ang="0">
+                  <a:pos x="csX17" y="csY17"/>
+                </a:cxn>
+                <a:cxn ang="0">
+                  <a:pos x="csX18" y="csY18"/>
+                </a:cxn>
+                <a:cxn ang="0">
+                  <a:pos x="csX19" y="csY19"/>
+                </a:cxn>
+                <a:cxn ang="0">
+                  <a:pos x="csX20" y="csY20"/>
+                </a:cxn>
+                <a:cxn ang="0">
+                  <a:pos x="csX21" y="csY21"/>
+                </a:cxn>
+                <a:cxn ang="0">
+                  <a:pos x="csX22" y="csY22"/>
+                </a:cxn>
+                <a:cxn ang="0">
+                  <a:pos x="csX23" y="csY23"/>
+                </a:cxn>
+                <a:cxn ang="0">
+                  <a:pos x="csX24" y="csY24"/>
+                </a:cxn>
+                <a:cxn ang="0">
+                  <a:pos x="csX25" y="csY25"/>
+                </a:cxn>
+                <a:cxn ang="0">
+                  <a:pos x="csX26" y="csY26"/>
+                </a:cxn>
+                <a:cxn ang="0">
+                  <a:pos x="csX27" y="csY27"/>
+                </a:cxn>
+                <a:cxn ang="0">
+                  <a:pos x="csX28" y="csY28"/>
+                </a:cxn>
+                <a:cxn ang="0">
+                  <a:pos x="csX29" y="csY29"/>
+                </a:cxn>
+                <a:cxn ang="0">
+                  <a:pos x="csX30" y="csY30"/>
+                </a:cxn>
+              </a:cxnLst>
+              <a:rect l="l" t="t" r="r" b="b"/>
+              <a:pathLst>
+                <a:path w="11095799" h="3452736">
+                  <a:moveTo>
+                    <a:pt x="7633707" y="2300736"/>
+                  </a:moveTo>
+                  <a:cubicBezTo>
+                    <a:pt x="7578130" y="2339480"/>
+                    <a:pt x="7567666" y="2473787"/>
+                    <a:pt x="7559583" y="2545803"/>
+                  </a:cubicBezTo>
+                  <a:cubicBezTo>
+                    <a:pt x="7548631" y="2643372"/>
+                    <a:pt x="7548061" y="2712676"/>
+                    <a:pt x="7497706" y="2774099"/>
+                  </a:cubicBezTo>
+                  <a:cubicBezTo>
+                    <a:pt x="7356034" y="2946910"/>
+                    <a:pt x="7100567" y="3075259"/>
+                    <a:pt x="6881446" y="3119121"/>
+                  </a:cubicBezTo>
+                  <a:cubicBezTo>
+                    <a:pt x="6664166" y="3162615"/>
+                    <a:pt x="6421781" y="3175764"/>
+                    <a:pt x="6229565" y="3168165"/>
+                  </a:cubicBezTo>
+                  <a:cubicBezTo>
+                    <a:pt x="5966103" y="3157749"/>
+                    <a:pt x="5736631" y="3002333"/>
+                    <a:pt x="5478086" y="2950610"/>
+                  </a:cubicBezTo>
+                  <a:cubicBezTo>
+                    <a:pt x="5307537" y="2916492"/>
+                    <a:pt x="5089995" y="2898061"/>
+                    <a:pt x="4917211" y="2917979"/>
+                  </a:cubicBezTo>
+                  <a:cubicBezTo>
+                    <a:pt x="4614441" y="2952883"/>
+                    <a:pt x="3916387" y="3040882"/>
+                    <a:pt x="3516956" y="3035143"/>
+                  </a:cubicBezTo>
+                  <a:cubicBezTo>
+                    <a:pt x="3037596" y="3028256"/>
+                    <a:pt x="2633177" y="2977566"/>
+                    <a:pt x="2213813" y="2957828"/>
+                  </a:cubicBezTo>
+                  <a:cubicBezTo>
+                    <a:pt x="1846850" y="2940557"/>
+                    <a:pt x="1446710" y="2972737"/>
+                    <a:pt x="1118307" y="3055254"/>
+                  </a:cubicBezTo>
+                  <a:cubicBezTo>
+                    <a:pt x="751043" y="3147537"/>
+                    <a:pt x="407122" y="3284528"/>
+                    <a:pt x="68145" y="3449225"/>
+                  </a:cubicBezTo>
+                  <a:cubicBezTo>
+                    <a:pt x="22571" y="3471369"/>
+                    <a:pt x="-5380" y="3458071"/>
+                    <a:pt x="48063" y="3422679"/>
+                  </a:cubicBezTo>
+                  <a:cubicBezTo>
+                    <a:pt x="336723" y="3231519"/>
+                    <a:pt x="740192" y="3029006"/>
+                    <a:pt x="1117040" y="2916495"/>
+                  </a:cubicBezTo>
+                  <a:cubicBezTo>
+                    <a:pt x="1477252" y="2808950"/>
+                    <a:pt x="1808089" y="2770125"/>
+                    <a:pt x="2246955" y="2755465"/>
+                  </a:cubicBezTo>
+                  <a:cubicBezTo>
+                    <a:pt x="2663820" y="2741541"/>
+                    <a:pt x="3057872" y="2728226"/>
+                    <a:pt x="3491143" y="2682162"/>
+                  </a:cubicBezTo>
+                  <a:cubicBezTo>
+                    <a:pt x="3779947" y="2651457"/>
+                    <a:pt x="4197498" y="2544141"/>
+                    <a:pt x="4526093" y="2406991"/>
+                  </a:cubicBezTo>
+                  <a:cubicBezTo>
+                    <a:pt x="4711871" y="2329451"/>
+                    <a:pt x="4946601" y="2214064"/>
+                    <a:pt x="5167783" y="2138518"/>
+                  </a:cubicBezTo>
+                  <a:cubicBezTo>
+                    <a:pt x="5330340" y="2082995"/>
+                    <a:pt x="5453547" y="2029484"/>
+                    <a:pt x="5642459" y="1958927"/>
+                  </a:cubicBezTo>
+                  <a:cubicBezTo>
+                    <a:pt x="6107694" y="1785166"/>
+                    <a:pt x="6356656" y="1704483"/>
+                    <a:pt x="6806731" y="1574665"/>
+                  </a:cubicBezTo>
+                  <a:cubicBezTo>
+                    <a:pt x="6915934" y="1543168"/>
+                    <a:pt x="7186433" y="1455764"/>
+                    <a:pt x="7292925" y="1416055"/>
+                  </a:cubicBezTo>
+                  <a:cubicBezTo>
+                    <a:pt x="7726324" y="1254447"/>
+                    <a:pt x="7858727" y="1203455"/>
+                    <a:pt x="8114454" y="1085866"/>
+                  </a:cubicBezTo>
+                  <a:cubicBezTo>
+                    <a:pt x="8371678" y="967588"/>
+                    <a:pt x="8727923" y="782286"/>
+                    <a:pt x="9062780" y="594596"/>
+                  </a:cubicBezTo>
+                  <a:cubicBezTo>
+                    <a:pt x="9468460" y="367208"/>
+                    <a:pt x="9674369" y="275118"/>
+                    <a:pt x="10071899" y="143787"/>
+                  </a:cubicBezTo>
+                  <a:cubicBezTo>
+                    <a:pt x="10259681" y="81750"/>
+                    <a:pt x="10453389" y="35427"/>
+                    <a:pt x="10651608" y="15576"/>
+                  </a:cubicBezTo>
+                  <a:cubicBezTo>
+                    <a:pt x="10738094" y="6915"/>
+                    <a:pt x="10826092" y="3178"/>
+                    <a:pt x="10912360" y="13800"/>
+                  </a:cubicBezTo>
+                  <a:cubicBezTo>
+                    <a:pt x="10941038" y="17331"/>
+                    <a:pt x="10969574" y="25649"/>
+                    <a:pt x="10996309" y="35399"/>
+                  </a:cubicBezTo>
+                  <a:lnTo>
+                    <a:pt x="11114690" y="358277"/>
+                  </a:lnTo>
+                  <a:cubicBezTo>
+                    <a:pt x="10974957" y="298956"/>
+                    <a:pt x="10880819" y="291884"/>
+                    <a:pt x="10762288" y="301958"/>
+                  </a:cubicBezTo>
+                  <a:cubicBezTo>
+                    <a:pt x="10546251" y="320319"/>
+                    <a:pt x="10329625" y="420845"/>
+                    <a:pt x="10146528" y="511530"/>
+                  </a:cubicBezTo>
+                  <a:cubicBezTo>
+                    <a:pt x="9830290" y="668159"/>
+                    <a:pt x="9671338" y="818097"/>
+                    <a:pt x="9383220" y="1037468"/>
+                  </a:cubicBezTo>
+                  <a:cubicBezTo>
+                    <a:pt x="9041001" y="1298032"/>
+                    <a:pt x="8692571" y="1562573"/>
+                    <a:pt x="8339724" y="1808553"/>
+                  </a:cubicBezTo>
+                  <a:close/>
+                </a:path>
+              </a:pathLst>
+            </a:custGeom>
+            <a:solidFill>
+              <a:srgbClr val="000000"/>
+            </a:solidFill>
+            <a:ln w="12473" cap="rnd">
+              <a:noFill/>
+              <a:prstDash val="solid"/>
+              <a:miter/>
+            </a:ln>
+          </p:spPr>
+          <p:txBody>
+            <a:bodyPr/>
+            <a:lstStyle/>
+            <a:p>
+              <a:endParaRPr lang="en-US"/>
+            </a:p>
+          </p:txBody>
+        </p:sp>
+        <p:sp>
+          <p:nvSpPr>
+            <p:cNvPr id="15" name="Freeform: Shape 14">
+              <a:extLst>
+                <a:ext uri="{FF2B5EF4-FFF2-40B4-BE49-F238E27FC236}">
+                  <a16:creationId xmlns:a16="http://schemas.microsoft.com/office/drawing/2014/main" id="{4DA174FA-F2E4-E378-D636-DC239E514E4C}"/>
+                </a:ext>
+              </a:extLst>
+            </p:cNvPr>
+            <p:cNvSpPr/>
+            <p:nvPr/>
+          </p:nvSpPr>
+          <p:spPr>
+            <a:xfrm>
+              <a:off x="5662990" y="3728887"/>
+              <a:ext cx="820236" cy="1678722"/>
+            </a:xfrm>
+            <a:custGeom>
+              <a:avLst/>
+              <a:gdLst>
+                <a:gd name="csX0" fmla="*/ 236444 w 820236"/>
+                <a:gd name="csY0" fmla="*/ 7059 h 1678722"/>
+                <a:gd name="csX1" fmla="*/ 277875 w 820236"/>
+                <a:gd name="csY1" fmla="*/ 975554 h 1678722"/>
+                <a:gd name="csX2" fmla="*/ 242339 w 820236"/>
+                <a:gd name="csY2" fmla="*/ 1037324 h 1678722"/>
+                <a:gd name="csX3" fmla="*/ 173407 w 820236"/>
+                <a:gd name="csY3" fmla="*/ 1226748 h 1678722"/>
+                <a:gd name="csX4" fmla="*/ 57970 w 820236"/>
+                <a:gd name="csY4" fmla="*/ 1505383 h 1678722"/>
+                <a:gd name="csX5" fmla="*/ 19214 w 820236"/>
+                <a:gd name="csY5" fmla="*/ 1620585 h 1678722"/>
+                <a:gd name="csX6" fmla="*/ 23727 w 820236"/>
+                <a:gd name="csY6" fmla="*/ 1637756 h 1678722"/>
+                <a:gd name="csX7" fmla="*/ 180463 w 820236"/>
+                <a:gd name="csY7" fmla="*/ 1685781 h 1678722"/>
+                <a:gd name="csX8" fmla="*/ 410785 w 820236"/>
+                <a:gd name="csY8" fmla="*/ 1685781 h 1678722"/>
+                <a:gd name="csX9" fmla="*/ 429456 w 820236"/>
+                <a:gd name="csY9" fmla="*/ 1671514 h 1678722"/>
+                <a:gd name="csX10" fmla="*/ 442598 w 820236"/>
+                <a:gd name="csY10" fmla="*/ 1671142 h 1678722"/>
+                <a:gd name="csX11" fmla="*/ 477472 w 820236"/>
+                <a:gd name="csY11" fmla="*/ 1676584 h 1678722"/>
+                <a:gd name="csX12" fmla="*/ 483971 w 820236"/>
+                <a:gd name="csY12" fmla="*/ 1671558 h 1678722"/>
+                <a:gd name="csX13" fmla="*/ 454116 w 820236"/>
+                <a:gd name="csY13" fmla="*/ 1629906 h 1678722"/>
+                <a:gd name="csX14" fmla="*/ 416914 w 820236"/>
+                <a:gd name="csY14" fmla="*/ 1611645 h 1678722"/>
+                <a:gd name="csX15" fmla="*/ 400921 w 820236"/>
+                <a:gd name="csY15" fmla="*/ 1605391 h 1678722"/>
+                <a:gd name="csX16" fmla="*/ 301365 w 820236"/>
+                <a:gd name="csY16" fmla="*/ 1572177 h 1678722"/>
+                <a:gd name="csX17" fmla="*/ 281887 w 820236"/>
+                <a:gd name="csY17" fmla="*/ 1524343 h 1678722"/>
+                <a:gd name="csX18" fmla="*/ 478470 w 820236"/>
+                <a:gd name="csY18" fmla="*/ 1238616 h 1678722"/>
+                <a:gd name="csX19" fmla="*/ 576152 w 820236"/>
+                <a:gd name="csY19" fmla="*/ 1044235 h 1678722"/>
+                <a:gd name="csX20" fmla="*/ 839125 w 820236"/>
+                <a:gd name="csY20" fmla="*/ 8285 h 1678722"/>
+              </a:gdLst>
+              <a:ahLst/>
+              <a:cxnLst>
+                <a:cxn ang="0">
+                  <a:pos x="csX0" y="csY0"/>
+                </a:cxn>
+                <a:cxn ang="0">
+                  <a:pos x="csX1" y="csY1"/>
+                </a:cxn>
+                <a:cxn ang="0">
+                  <a:pos x="csX2" y="csY2"/>
+                </a:cxn>
+                <a:cxn ang="0">
+                  <a:pos x="csX3" y="csY3"/>
+                </a:cxn>
+                <a:cxn ang="0">
+                  <a:pos x="csX4" y="csY4"/>
+                </a:cxn>
+                <a:cxn ang="0">
+                  <a:pos x="csX5" y="csY5"/>
+                </a:cxn>
+                <a:cxn ang="0">
+                  <a:pos x="csX6" y="csY6"/>
+                </a:cxn>
+                <a:cxn ang="0">
+                  <a:pos x="csX7" y="csY7"/>
+                </a:cxn>
+                <a:cxn ang="0">
+                  <a:pos x="csX8" y="csY8"/>
+                </a:cxn>
+                <a:cxn ang="0">
+                  <a:pos x="csX9" y="csY9"/>
+                </a:cxn>
+                <a:cxn ang="0">
+                  <a:pos x="csX10" y="csY10"/>
+                </a:cxn>
+                <a:cxn ang="0">
+                  <a:pos x="csX11" y="csY11"/>
+                </a:cxn>
+                <a:cxn ang="0">
+                  <a:pos x="csX12" y="csY12"/>
+                </a:cxn>
+                <a:cxn ang="0">
+                  <a:pos x="csX13" y="csY13"/>
+                </a:cxn>
+                <a:cxn ang="0">
+                  <a:pos x="csX14" y="csY14"/>
+                </a:cxn>
+                <a:cxn ang="0">
+                  <a:pos x="csX15" y="csY15"/>
+                </a:cxn>
+                <a:cxn ang="0">
+                  <a:pos x="csX16" y="csY16"/>
+                </a:cxn>
+                <a:cxn ang="0">
+                  <a:pos x="csX17" y="csY17"/>
+                </a:cxn>
+                <a:cxn ang="0">
+                  <a:pos x="csX18" y="csY18"/>
+                </a:cxn>
+                <a:cxn ang="0">
+                  <a:pos x="csX19" y="csY19"/>
+                </a:cxn>
+                <a:cxn ang="0">
+                  <a:pos x="csX20" y="csY20"/>
+                </a:cxn>
+              </a:cxnLst>
+              <a:rect l="l" t="t" r="r" b="b"/>
+              <a:pathLst>
+                <a:path w="820236" h="1678722">
+                  <a:moveTo>
+                    <a:pt x="236444" y="7059"/>
+                  </a:moveTo>
+                  <a:lnTo>
+                    <a:pt x="277875" y="975554"/>
+                  </a:lnTo>
+                  <a:cubicBezTo>
+                    <a:pt x="277875" y="975554"/>
+                    <a:pt x="253238" y="1013212"/>
+                    <a:pt x="242339" y="1037324"/>
+                  </a:cubicBezTo>
+                  <a:cubicBezTo>
+                    <a:pt x="213527" y="1101063"/>
+                    <a:pt x="201584" y="1155625"/>
+                    <a:pt x="173407" y="1226748"/>
+                  </a:cubicBezTo>
+                  <a:cubicBezTo>
+                    <a:pt x="131137" y="1333441"/>
+                    <a:pt x="106923" y="1388396"/>
+                    <a:pt x="57970" y="1505383"/>
+                  </a:cubicBezTo>
+                  <a:cubicBezTo>
+                    <a:pt x="42576" y="1542170"/>
+                    <a:pt x="25439" y="1583629"/>
+                    <a:pt x="19214" y="1620585"/>
+                  </a:cubicBezTo>
+                  <a:cubicBezTo>
+                    <a:pt x="18265" y="1626214"/>
+                    <a:pt x="19276" y="1634137"/>
+                    <a:pt x="23727" y="1637756"/>
+                  </a:cubicBezTo>
+                  <a:cubicBezTo>
+                    <a:pt x="63959" y="1670329"/>
+                    <a:pt x="126001" y="1685781"/>
+                    <a:pt x="180463" y="1685781"/>
+                  </a:cubicBezTo>
+                  <a:lnTo>
+                    <a:pt x="410785" y="1685781"/>
+                  </a:lnTo>
+                  <a:cubicBezTo>
+                    <a:pt x="418557" y="1685781"/>
+                    <a:pt x="429456" y="1671514"/>
+                    <a:pt x="429456" y="1671514"/>
+                  </a:cubicBezTo>
+                  <a:cubicBezTo>
+                    <a:pt x="429456" y="1671514"/>
+                    <a:pt x="439080" y="1671000"/>
+                    <a:pt x="442598" y="1671142"/>
+                  </a:cubicBezTo>
+                  <a:cubicBezTo>
+                    <a:pt x="454368" y="1671619"/>
+                    <a:pt x="462848" y="1672785"/>
+                    <a:pt x="477472" y="1676584"/>
+                  </a:cubicBezTo>
+                  <a:cubicBezTo>
+                    <a:pt x="483961" y="1678270"/>
+                    <a:pt x="486070" y="1676516"/>
+                    <a:pt x="483971" y="1671558"/>
+                  </a:cubicBezTo>
+                  <a:cubicBezTo>
+                    <a:pt x="476300" y="1653430"/>
+                    <a:pt x="470497" y="1643890"/>
+                    <a:pt x="454116" y="1629906"/>
+                  </a:cubicBezTo>
+                  <a:cubicBezTo>
+                    <a:pt x="444693" y="1621861"/>
+                    <a:pt x="431464" y="1616153"/>
+                    <a:pt x="416914" y="1611645"/>
+                  </a:cubicBezTo>
+                  <a:cubicBezTo>
+                    <a:pt x="411142" y="1609856"/>
+                    <a:pt x="406986" y="1606457"/>
+                    <a:pt x="400921" y="1605391"/>
+                  </a:cubicBezTo>
+                  <a:cubicBezTo>
+                    <a:pt x="372533" y="1600401"/>
+                    <a:pt x="322324" y="1591962"/>
+                    <a:pt x="301365" y="1572177"/>
+                  </a:cubicBezTo>
+                  <a:cubicBezTo>
+                    <a:pt x="286852" y="1558478"/>
+                    <a:pt x="274567" y="1542910"/>
+                    <a:pt x="281887" y="1524343"/>
+                  </a:cubicBezTo>
+                  <a:cubicBezTo>
+                    <a:pt x="325940" y="1412610"/>
+                    <a:pt x="391018" y="1344489"/>
+                    <a:pt x="478470" y="1238616"/>
+                  </a:cubicBezTo>
+                  <a:cubicBezTo>
+                    <a:pt x="523341" y="1184295"/>
+                    <a:pt x="556962" y="1112027"/>
+                    <a:pt x="576152" y="1044235"/>
+                  </a:cubicBezTo>
+                  <a:cubicBezTo>
+                    <a:pt x="661585" y="742414"/>
+                    <a:pt x="839125" y="8285"/>
+                    <a:pt x="839125" y="8285"/>
+                  </a:cubicBezTo>
+                </a:path>
+              </a:pathLst>
+            </a:custGeom>
+            <a:solidFill>
+              <a:srgbClr val="000000"/>
+            </a:solidFill>
+            <a:ln w="12473" cap="rnd">
+              <a:noFill/>
+              <a:prstDash val="solid"/>
+              <a:miter/>
+            </a:ln>
+          </p:spPr>
+          <p:txBody>
+            <a:bodyPr/>
+            <a:lstStyle/>
+            <a:p>
+              <a:endParaRPr lang="en-US"/>
+            </a:p>
+          </p:txBody>
+        </p:sp>
+        <p:grpSp>
+          <p:nvGrpSpPr>
+            <p:cNvPr id="17" name="Graphic 4">
+              <a:extLst>
+                <a:ext uri="{FF2B5EF4-FFF2-40B4-BE49-F238E27FC236}">
+                  <a16:creationId xmlns:a16="http://schemas.microsoft.com/office/drawing/2014/main" id="{8765FE2A-35DE-D9FB-2953-2AD6AE6F9254}"/>
+                </a:ext>
+              </a:extLst>
+            </p:cNvPr>
+            <p:cNvGrpSpPr/>
+            <p:nvPr/>
+          </p:nvGrpSpPr>
+          <p:grpSpPr>
+            <a:xfrm>
+              <a:off x="7148435" y="4005987"/>
+              <a:ext cx="771278" cy="1401534"/>
+              <a:chOff x="7148435" y="4005987"/>
+              <a:chExt cx="771278" cy="1401533"/>
+            </a:xfrm>
+            <a:solidFill>
+              <a:srgbClr val="000000"/>
+            </a:solidFill>
+          </p:grpSpPr>
+          <p:sp>
+            <p:nvSpPr>
+              <p:cNvPr id="18" name="Freeform: Shape 17">
+                <a:extLst>
+                  <a:ext uri="{FF2B5EF4-FFF2-40B4-BE49-F238E27FC236}">
+                    <a16:creationId xmlns:a16="http://schemas.microsoft.com/office/drawing/2014/main" id="{B00EDB89-C30E-72ED-7A99-7D1335EC3AC0}"/>
+                  </a:ext>
+                </a:extLst>
+              </p:cNvPr>
+              <p:cNvSpPr/>
+              <p:nvPr/>
+            </p:nvSpPr>
+            <p:spPr>
+              <a:xfrm>
+                <a:off x="7148435" y="4005987"/>
+                <a:ext cx="771278" cy="1300954"/>
+              </a:xfrm>
+              <a:custGeom>
+                <a:avLst/>
+                <a:gdLst>
+                  <a:gd name="csX0" fmla="*/ 789900 w 771278"/>
+                  <a:gd name="csY0" fmla="*/ 170429 h 1300954"/>
+                  <a:gd name="csX1" fmla="*/ 610527 w 771278"/>
+                  <a:gd name="csY1" fmla="*/ 394588 h 1300954"/>
+                  <a:gd name="csX2" fmla="*/ 509406 w 771278"/>
+                  <a:gd name="csY2" fmla="*/ 502732 h 1300954"/>
+                  <a:gd name="csX3" fmla="*/ 377207 w 771278"/>
+                  <a:gd name="csY3" fmla="*/ 665784 h 1300954"/>
+                  <a:gd name="csX4" fmla="*/ 372229 w 771278"/>
+                  <a:gd name="csY4" fmla="*/ 727154 h 1300954"/>
+                  <a:gd name="csX5" fmla="*/ 353734 w 771278"/>
+                  <a:gd name="csY5" fmla="*/ 842069 h 1300954"/>
+                  <a:gd name="csX6" fmla="*/ 346178 w 771278"/>
+                  <a:gd name="csY6" fmla="*/ 949344 h 1300954"/>
+                  <a:gd name="csX7" fmla="*/ 336624 w 771278"/>
+                  <a:gd name="csY7" fmla="*/ 1018849 h 1300954"/>
+                  <a:gd name="csX8" fmla="*/ 319391 w 771278"/>
+                  <a:gd name="csY8" fmla="*/ 1080141 h 1300954"/>
+                  <a:gd name="csX9" fmla="*/ 286690 w 771278"/>
+                  <a:gd name="csY9" fmla="*/ 1134565 h 1300954"/>
+                  <a:gd name="csX10" fmla="*/ 248292 w 771278"/>
+                  <a:gd name="csY10" fmla="*/ 1173509 h 1300954"/>
+                  <a:gd name="csX11" fmla="*/ 206472 w 771278"/>
+                  <a:gd name="csY11" fmla="*/ 1238179 h 1300954"/>
+                  <a:gd name="csX12" fmla="*/ 194720 w 771278"/>
+                  <a:gd name="csY12" fmla="*/ 1282542 h 1300954"/>
+                  <a:gd name="csX13" fmla="*/ 187349 w 771278"/>
+                  <a:gd name="csY13" fmla="*/ 1296823 h 1300954"/>
+                  <a:gd name="csX14" fmla="*/ 166053 w 771278"/>
+                  <a:gd name="csY14" fmla="*/ 1307908 h 1300954"/>
+                  <a:gd name="csX15" fmla="*/ 19692 w 771278"/>
+                  <a:gd name="csY15" fmla="*/ 1219774 h 1300954"/>
+                  <a:gd name="csX16" fmla="*/ 19604 w 771278"/>
+                  <a:gd name="csY16" fmla="*/ 1199944 h 1300954"/>
+                  <a:gd name="csX17" fmla="*/ 29177 w 771278"/>
+                  <a:gd name="csY17" fmla="*/ 1182003 h 1300954"/>
+                  <a:gd name="csX18" fmla="*/ 75237 w 771278"/>
+                  <a:gd name="csY18" fmla="*/ 1131646 h 1300954"/>
+                  <a:gd name="csX19" fmla="*/ 136570 w 771278"/>
+                  <a:gd name="csY19" fmla="*/ 1048615 h 1300954"/>
+                  <a:gd name="csX20" fmla="*/ 147060 w 771278"/>
+                  <a:gd name="csY20" fmla="*/ 1022255 h 1300954"/>
+                  <a:gd name="csX21" fmla="*/ 140655 w 771278"/>
+                  <a:gd name="csY21" fmla="*/ 839883 h 1300954"/>
+                  <a:gd name="csX22" fmla="*/ 134221 w 771278"/>
+                  <a:gd name="csY22" fmla="*/ 721427 h 1300954"/>
+                  <a:gd name="csX23" fmla="*/ 132601 w 771278"/>
+                  <a:gd name="csY23" fmla="*/ 638670 h 1300954"/>
+                  <a:gd name="csX24" fmla="*/ 135064 w 771278"/>
+                  <a:gd name="csY24" fmla="*/ 611562 h 1300954"/>
+                  <a:gd name="csX25" fmla="*/ 171878 w 771278"/>
+                  <a:gd name="csY25" fmla="*/ 529036 h 1300954"/>
+                  <a:gd name="csX26" fmla="*/ 532248 w 771278"/>
+                  <a:gd name="csY26" fmla="*/ 7030 h 1300954"/>
+                </a:gdLst>
+                <a:ahLst/>
+                <a:cxnLst>
+                  <a:cxn ang="0">
+                    <a:pos x="csX0" y="csY0"/>
+                  </a:cxn>
+                  <a:cxn ang="0">
+                    <a:pos x="csX1" y="csY1"/>
+                  </a:cxn>
+                  <a:cxn ang="0">
+                    <a:pos x="csX2" y="csY2"/>
+                  </a:cxn>
+                  <a:cxn ang="0">
+                    <a:pos x="csX3" y="csY3"/>
+                  </a:cxn>
+                  <a:cxn ang="0">
+                    <a:pos x="csX4" y="csY4"/>
+                  </a:cxn>
+                  <a:cxn ang="0">
+                    <a:pos x="csX5" y="csY5"/>
+                  </a:cxn>
+                  <a:cxn ang="0">
+                    <a:pos x="csX6" y="csY6"/>
+                  </a:cxn>
+                  <a:cxn ang="0">
+                    <a:pos x="csX7" y="csY7"/>
+                  </a:cxn>
+                  <a:cxn ang="0">
+                    <a:pos x="csX8" y="csY8"/>
+                  </a:cxn>
+                  <a:cxn ang="0">
+                    <a:pos x="csX9" y="csY9"/>
+                  </a:cxn>
+                  <a:cxn ang="0">
+                    <a:pos x="csX10" y="csY10"/>
+                  </a:cxn>
+                  <a:cxn ang="0">
+                    <a:pos x="csX11" y="csY11"/>
+                  </a:cxn>
+                  <a:cxn ang="0">
+                    <a:pos x="csX12" y="csY12"/>
+                  </a:cxn>
+                  <a:cxn ang="0">
+                    <a:pos x="csX13" y="csY13"/>
+                  </a:cxn>
+                  <a:cxn ang="0">
+                    <a:pos x="csX14" y="csY14"/>
+                  </a:cxn>
+                  <a:cxn ang="0">
+                    <a:pos x="csX15" y="csY15"/>
+                  </a:cxn>
+                  <a:cxn ang="0">
+                    <a:pos x="csX16" y="csY16"/>
+                  </a:cxn>
+                  <a:cxn ang="0">
+                    <a:pos x="csX17" y="csY17"/>
+                  </a:cxn>
+                  <a:cxn ang="0">
+                    <a:pos x="csX18" y="csY18"/>
+                  </a:cxn>
+                  <a:cxn ang="0">
+                    <a:pos x="csX19" y="csY19"/>
+                  </a:cxn>
+                  <a:cxn ang="0">
+                    <a:pos x="csX20" y="csY20"/>
+                  </a:cxn>
+                  <a:cxn ang="0">
+                    <a:pos x="csX21" y="csY21"/>
+                  </a:cxn>
+                  <a:cxn ang="0">
+                    <a:pos x="csX22" y="csY22"/>
+                  </a:cxn>
+                  <a:cxn ang="0">
+                    <a:pos x="csX23" y="csY23"/>
+                  </a:cxn>
+                  <a:cxn ang="0">
+                    <a:pos x="csX24" y="csY24"/>
+                  </a:cxn>
+                  <a:cxn ang="0">
+                    <a:pos x="csX25" y="csY25"/>
+                  </a:cxn>
+                  <a:cxn ang="0">
+                    <a:pos x="csX26" y="csY26"/>
+                  </a:cxn>
+                </a:cxnLst>
+                <a:rect l="l" t="t" r="r" b="b"/>
+                <a:pathLst>
+                  <a:path w="771278" h="1300954">
+                    <a:moveTo>
+                      <a:pt x="789900" y="170429"/>
+                    </a:moveTo>
+                    <a:cubicBezTo>
+                      <a:pt x="789900" y="170429"/>
+                      <a:pt x="672548" y="321951"/>
+                      <a:pt x="610527" y="394588"/>
+                    </a:cubicBezTo>
+                    <a:cubicBezTo>
+                      <a:pt x="578482" y="432121"/>
+                      <a:pt x="541768" y="465472"/>
+                      <a:pt x="509406" y="502732"/>
+                    </a:cubicBezTo>
+                    <a:cubicBezTo>
+                      <a:pt x="462317" y="556951"/>
+                      <a:pt x="377207" y="665784"/>
+                      <a:pt x="377207" y="665784"/>
+                    </a:cubicBezTo>
+                    <a:cubicBezTo>
+                      <a:pt x="377207" y="665784"/>
+                      <a:pt x="376004" y="699184"/>
+                      <a:pt x="372229" y="727154"/>
+                    </a:cubicBezTo>
+                    <a:cubicBezTo>
+                      <a:pt x="366669" y="768325"/>
+                      <a:pt x="358616" y="800811"/>
+                      <a:pt x="353734" y="842069"/>
+                    </a:cubicBezTo>
+                    <a:cubicBezTo>
+                      <a:pt x="349524" y="877667"/>
+                      <a:pt x="349882" y="913689"/>
+                      <a:pt x="346178" y="949344"/>
+                    </a:cubicBezTo>
+                    <a:cubicBezTo>
+                      <a:pt x="343764" y="972605"/>
+                      <a:pt x="340914" y="995859"/>
+                      <a:pt x="336624" y="1018849"/>
+                    </a:cubicBezTo>
+                    <a:cubicBezTo>
+                      <a:pt x="333983" y="1032999"/>
+                      <a:pt x="324539" y="1066699"/>
+                      <a:pt x="319391" y="1080141"/>
+                    </a:cubicBezTo>
+                    <a:cubicBezTo>
+                      <a:pt x="314415" y="1093135"/>
+                      <a:pt x="302552" y="1120392"/>
+                      <a:pt x="286690" y="1134565"/>
+                    </a:cubicBezTo>
+                    <a:cubicBezTo>
+                      <a:pt x="275573" y="1144498"/>
+                      <a:pt x="257349" y="1161669"/>
+                      <a:pt x="248292" y="1173509"/>
+                    </a:cubicBezTo>
+                    <a:cubicBezTo>
+                      <a:pt x="232698" y="1193901"/>
+                      <a:pt x="216857" y="1214702"/>
+                      <a:pt x="206472" y="1238179"/>
+                    </a:cubicBezTo>
+                    <a:cubicBezTo>
+                      <a:pt x="200282" y="1252169"/>
+                      <a:pt x="200222" y="1268269"/>
+                      <a:pt x="194720" y="1282542"/>
+                    </a:cubicBezTo>
+                    <a:cubicBezTo>
+                      <a:pt x="192794" y="1287541"/>
+                      <a:pt x="190994" y="1292899"/>
+                      <a:pt x="187349" y="1296823"/>
+                    </a:cubicBezTo>
+                    <a:cubicBezTo>
+                      <a:pt x="182904" y="1301602"/>
+                      <a:pt x="172518" y="1308802"/>
+                      <a:pt x="166053" y="1307908"/>
+                    </a:cubicBezTo>
+                    <a:cubicBezTo>
+                      <a:pt x="109825" y="1300131"/>
+                      <a:pt x="55750" y="1268225"/>
+                      <a:pt x="19692" y="1219774"/>
+                    </a:cubicBezTo>
+                    <a:cubicBezTo>
+                      <a:pt x="17665" y="1217051"/>
+                      <a:pt x="19035" y="1203288"/>
+                      <a:pt x="19604" y="1199944"/>
+                    </a:cubicBezTo>
+                    <a:cubicBezTo>
+                      <a:pt x="20554" y="1194349"/>
+                      <a:pt x="25877" y="1186619"/>
+                      <a:pt x="29177" y="1182003"/>
+                    </a:cubicBezTo>
+                    <a:cubicBezTo>
+                      <a:pt x="42632" y="1163183"/>
+                      <a:pt x="59374" y="1148486"/>
+                      <a:pt x="75237" y="1131646"/>
+                    </a:cubicBezTo>
+                    <a:cubicBezTo>
+                      <a:pt x="99177" y="1106232"/>
+                      <a:pt x="111665" y="1088986"/>
+                      <a:pt x="136570" y="1048615"/>
+                    </a:cubicBezTo>
+                    <a:cubicBezTo>
+                      <a:pt x="146022" y="1033294"/>
+                      <a:pt x="147060" y="1022255"/>
+                      <a:pt x="147060" y="1022255"/>
+                    </a:cubicBezTo>
+                    <a:cubicBezTo>
+                      <a:pt x="147060" y="1022255"/>
+                      <a:pt x="140384" y="901061"/>
+                      <a:pt x="140655" y="839883"/>
+                    </a:cubicBezTo>
+                    <a:cubicBezTo>
+                      <a:pt x="140831" y="800278"/>
+                      <a:pt x="137577" y="760891"/>
+                      <a:pt x="134221" y="721427"/>
+                    </a:cubicBezTo>
+                    <a:cubicBezTo>
+                      <a:pt x="131968" y="694956"/>
+                      <a:pt x="130909" y="673019"/>
+                      <a:pt x="132601" y="638670"/>
+                    </a:cubicBezTo>
+                    <a:cubicBezTo>
+                      <a:pt x="133057" y="629415"/>
+                      <a:pt x="133907" y="620756"/>
+                      <a:pt x="135064" y="611562"/>
+                    </a:cubicBezTo>
+                    <a:cubicBezTo>
+                      <a:pt x="137070" y="595648"/>
+                      <a:pt x="162358" y="544114"/>
+                      <a:pt x="171878" y="529036"/>
+                    </a:cubicBezTo>
+                    <a:cubicBezTo>
+                      <a:pt x="284756" y="350249"/>
+                      <a:pt x="532248" y="7030"/>
+                      <a:pt x="532248" y="7030"/>
+                    </a:cubicBezTo>
+                  </a:path>
+                </a:pathLst>
+              </a:custGeom>
+              <a:solidFill>
+                <a:srgbClr val="000000"/>
+              </a:solidFill>
+              <a:ln w="3909" cap="flat">
+                <a:noFill/>
+                <a:prstDash val="solid"/>
+                <a:miter/>
+              </a:ln>
+            </p:spPr>
+            <p:txBody>
+              <a:bodyPr/>
+              <a:lstStyle/>
+              <a:p>
+                <a:endParaRPr lang="en-US"/>
+              </a:p>
+            </p:txBody>
+          </p:sp>
+          <p:sp>
+            <p:nvSpPr>
+              <p:cNvPr id="19" name="Freeform: Shape 18">
+                <a:extLst>
+                  <a:ext uri="{FF2B5EF4-FFF2-40B4-BE49-F238E27FC236}">
+                    <a16:creationId xmlns:a16="http://schemas.microsoft.com/office/drawing/2014/main" id="{3DC3757A-0699-B98C-3C25-D9B4A341C2DD}"/>
+                  </a:ext>
+                </a:extLst>
+              </p:cNvPr>
+              <p:cNvSpPr/>
+              <p:nvPr/>
+            </p:nvSpPr>
+            <p:spPr>
+              <a:xfrm>
+                <a:off x="7560111" y="4071723"/>
+                <a:ext cx="356893" cy="1335797"/>
+              </a:xfrm>
+              <a:custGeom>
+                <a:avLst/>
+                <a:gdLst>
+                  <a:gd name="csX0" fmla="*/ 375478 w 356893"/>
+                  <a:gd name="csY0" fmla="*/ 19703 h 1335797"/>
+                  <a:gd name="csX1" fmla="*/ 332222 w 356893"/>
+                  <a:gd name="csY1" fmla="*/ 303513 h 1335797"/>
+                  <a:gd name="csX2" fmla="*/ 298724 w 356893"/>
+                  <a:gd name="csY2" fmla="*/ 447726 h 1335797"/>
+                  <a:gd name="csX3" fmla="*/ 265766 w 356893"/>
+                  <a:gd name="csY3" fmla="*/ 655029 h 1335797"/>
+                  <a:gd name="csX4" fmla="*/ 277820 w 356893"/>
+                  <a:gd name="csY4" fmla="*/ 738836 h 1335797"/>
+                  <a:gd name="csX5" fmla="*/ 287880 w 356893"/>
+                  <a:gd name="csY5" fmla="*/ 863066 h 1335797"/>
+                  <a:gd name="csX6" fmla="*/ 306682 w 356893"/>
+                  <a:gd name="csY6" fmla="*/ 968951 h 1335797"/>
+                  <a:gd name="csX7" fmla="*/ 314345 w 356893"/>
+                  <a:gd name="csY7" fmla="*/ 1038690 h 1335797"/>
+                  <a:gd name="csX8" fmla="*/ 314934 w 356893"/>
+                  <a:gd name="csY8" fmla="*/ 1081867 h 1335797"/>
+                  <a:gd name="csX9" fmla="*/ 310174 w 356893"/>
+                  <a:gd name="csY9" fmla="*/ 1141495 h 1335797"/>
+                  <a:gd name="csX10" fmla="*/ 303739 w 356893"/>
+                  <a:gd name="csY10" fmla="*/ 1185751 h 1335797"/>
+                  <a:gd name="csX11" fmla="*/ 304777 w 356893"/>
+                  <a:gd name="csY11" fmla="*/ 1262756 h 1335797"/>
+                  <a:gd name="csX12" fmla="*/ 319585 w 356893"/>
+                  <a:gd name="csY12" fmla="*/ 1306195 h 1335797"/>
+                  <a:gd name="csX13" fmla="*/ 321366 w 356893"/>
+                  <a:gd name="csY13" fmla="*/ 1322167 h 1335797"/>
+                  <a:gd name="csX14" fmla="*/ 309264 w 356893"/>
+                  <a:gd name="csY14" fmla="*/ 1342813 h 1335797"/>
+                  <a:gd name="csX15" fmla="*/ 136932 w 356893"/>
+                  <a:gd name="csY15" fmla="*/ 1342813 h 1335797"/>
+                  <a:gd name="csX16" fmla="*/ 128045 w 356893"/>
+                  <a:gd name="csY16" fmla="*/ 1334501 h 1335797"/>
+                  <a:gd name="csX17" fmla="*/ 126069 w 356893"/>
+                  <a:gd name="csY17" fmla="*/ 1314262 h 1335797"/>
+                  <a:gd name="csX18" fmla="*/ 134366 w 356893"/>
+                  <a:gd name="csY18" fmla="*/ 1243623 h 1335797"/>
+                  <a:gd name="csX19" fmla="*/ 134081 w 356893"/>
+                  <a:gd name="csY19" fmla="*/ 1128598 h 1335797"/>
+                  <a:gd name="csX20" fmla="*/ 131319 w 356893"/>
+                  <a:gd name="csY20" fmla="*/ 1088161 h 1335797"/>
+                  <a:gd name="csX21" fmla="*/ 80686 w 356893"/>
+                  <a:gd name="csY21" fmla="*/ 912842 h 1335797"/>
+                  <a:gd name="csX22" fmla="*/ 45533 w 356893"/>
+                  <a:gd name="csY22" fmla="*/ 799031 h 1335797"/>
+                  <a:gd name="csX23" fmla="*/ 23865 w 356893"/>
+                  <a:gd name="csY23" fmla="*/ 719649 h 1335797"/>
+                  <a:gd name="csX24" fmla="*/ 19650 w 356893"/>
+                  <a:gd name="csY24" fmla="*/ 692757 h 1335797"/>
+                  <a:gd name="csX25" fmla="*/ 19568 w 356893"/>
+                  <a:gd name="csY25" fmla="*/ 639261 h 1335797"/>
+                  <a:gd name="csX26" fmla="*/ 70641 w 356893"/>
+                  <a:gd name="csY26" fmla="*/ 7015 h 1335797"/>
+                </a:gdLst>
+                <a:ahLst/>
+                <a:cxnLst>
+                  <a:cxn ang="0">
+                    <a:pos x="csX0" y="csY0"/>
+                  </a:cxn>
+                  <a:cxn ang="0">
+                    <a:pos x="csX1" y="csY1"/>
+                  </a:cxn>
+                  <a:cxn ang="0">
+                    <a:pos x="csX2" y="csY2"/>
+                  </a:cxn>
+                  <a:cxn ang="0">
+                    <a:pos x="csX3" y="csY3"/>
+                  </a:cxn>
+                  <a:cxn ang="0">
+                    <a:pos x="csX4" y="csY4"/>
+                  </a:cxn>
+                  <a:cxn ang="0">
+                    <a:pos x="csX5" y="csY5"/>
+                  </a:cxn>
+                  <a:cxn ang="0">
+                    <a:pos x="csX6" y="csY6"/>
+                  </a:cxn>
+                  <a:cxn ang="0">
+                    <a:pos x="csX7" y="csY7"/>
+                  </a:cxn>
+                  <a:cxn ang="0">
+                    <a:pos x="csX8" y="csY8"/>
+                  </a:cxn>
+                  <a:cxn ang="0">
+                    <a:pos x="csX9" y="csY9"/>
+                  </a:cxn>
+                  <a:cxn ang="0">
+                    <a:pos x="csX10" y="csY10"/>
+                  </a:cxn>
+                  <a:cxn ang="0">
+                    <a:pos x="csX11" y="csY11"/>
+                  </a:cxn>
+                  <a:cxn ang="0">
+                    <a:pos x="csX12" y="csY12"/>
+                  </a:cxn>
+                  <a:cxn ang="0">
+                    <a:pos x="csX13" y="csY13"/>
+                  </a:cxn>
+                  <a:cxn ang="0">
+                    <a:pos x="csX14" y="csY14"/>
+                  </a:cxn>
+                  <a:cxn ang="0">
+                    <a:pos x="csX15" y="csY15"/>
+                  </a:cxn>
+                  <a:cxn ang="0">
+                    <a:pos x="csX16" y="csY16"/>
+                  </a:cxn>
+                  <a:cxn ang="0">
+                    <a:pos x="csX17" y="csY17"/>
+                  </a:cxn>
+                  <a:cxn ang="0">
+                    <a:pos x="csX18" y="csY18"/>
+                  </a:cxn>
+                  <a:cxn ang="0">
+                    <a:pos x="csX19" y="csY19"/>
+                  </a:cxn>
+                  <a:cxn ang="0">
+                    <a:pos x="csX20" y="csY20"/>
+                  </a:cxn>
+                  <a:cxn ang="0">
+                    <a:pos x="csX21" y="csY21"/>
+                  </a:cxn>
+                  <a:cxn ang="0">
+                    <a:pos x="csX22" y="csY22"/>
+                  </a:cxn>
+                  <a:cxn ang="0">
+                    <a:pos x="csX23" y="csY23"/>
+                  </a:cxn>
+                  <a:cxn ang="0">
+                    <a:pos x="csX24" y="csY24"/>
+                  </a:cxn>
+                  <a:cxn ang="0">
+                    <a:pos x="csX25" y="csY25"/>
+                  </a:cxn>
+                  <a:cxn ang="0">
+                    <a:pos x="csX26" y="csY26"/>
+                  </a:cxn>
+                </a:cxnLst>
+                <a:rect l="l" t="t" r="r" b="b"/>
+                <a:pathLst>
+                  <a:path w="356893" h="1335797">
+                    <a:moveTo>
+                      <a:pt x="375478" y="19703"/>
+                    </a:moveTo>
+                    <a:cubicBezTo>
+                      <a:pt x="375478" y="19703"/>
+                      <a:pt x="349613" y="209598"/>
+                      <a:pt x="332222" y="303513"/>
+                    </a:cubicBezTo>
+                    <a:cubicBezTo>
+                      <a:pt x="323238" y="352038"/>
+                      <a:pt x="308119" y="399277"/>
+                      <a:pt x="298724" y="447726"/>
+                    </a:cubicBezTo>
+                    <a:cubicBezTo>
+                      <a:pt x="285054" y="518224"/>
+                      <a:pt x="265766" y="655029"/>
+                      <a:pt x="265766" y="655029"/>
+                    </a:cubicBezTo>
+                    <a:cubicBezTo>
+                      <a:pt x="265766" y="655029"/>
+                      <a:pt x="274668" y="710790"/>
+                      <a:pt x="277820" y="738836"/>
+                    </a:cubicBezTo>
+                    <a:cubicBezTo>
+                      <a:pt x="282455" y="780122"/>
+                      <a:pt x="282566" y="821862"/>
+                      <a:pt x="287880" y="863066"/>
+                    </a:cubicBezTo>
+                    <a:cubicBezTo>
+                      <a:pt x="292469" y="898618"/>
+                      <a:pt x="301589" y="933468"/>
+                      <a:pt x="306682" y="968951"/>
+                    </a:cubicBezTo>
+                    <a:cubicBezTo>
+                      <a:pt x="310006" y="992100"/>
+                      <a:pt x="312906" y="1015348"/>
+                      <a:pt x="314345" y="1038690"/>
+                    </a:cubicBezTo>
+                    <a:cubicBezTo>
+                      <a:pt x="315230" y="1053057"/>
+                      <a:pt x="315035" y="1067473"/>
+                      <a:pt x="314934" y="1081867"/>
+                    </a:cubicBezTo>
+                    <a:cubicBezTo>
+                      <a:pt x="314827" y="1097761"/>
+                      <a:pt x="312717" y="1125805"/>
+                      <a:pt x="310174" y="1141495"/>
+                    </a:cubicBezTo>
+                    <a:cubicBezTo>
+                      <a:pt x="307788" y="1156210"/>
+                      <a:pt x="304715" y="1170876"/>
+                      <a:pt x="303739" y="1185751"/>
+                    </a:cubicBezTo>
+                    <a:cubicBezTo>
+                      <a:pt x="302063" y="1211367"/>
+                      <a:pt x="300407" y="1237460"/>
+                      <a:pt x="304777" y="1262756"/>
+                    </a:cubicBezTo>
+                    <a:cubicBezTo>
+                      <a:pt x="307380" y="1277831"/>
+                      <a:pt x="316254" y="1291265"/>
+                      <a:pt x="319585" y="1306195"/>
+                    </a:cubicBezTo>
+                    <a:cubicBezTo>
+                      <a:pt x="320753" y="1311423"/>
+                      <a:pt x="322225" y="1316880"/>
+                      <a:pt x="321366" y="1322167"/>
+                    </a:cubicBezTo>
+                    <a:cubicBezTo>
+                      <a:pt x="320315" y="1328608"/>
+                      <a:pt x="315791" y="1342813"/>
+                      <a:pt x="309264" y="1342813"/>
+                    </a:cubicBezTo>
+                    <a:lnTo>
+                      <a:pt x="136932" y="1342813"/>
+                    </a:lnTo>
+                    <a:cubicBezTo>
+                      <a:pt x="133538" y="1342813"/>
+                      <a:pt x="129426" y="1337599"/>
+                      <a:pt x="128045" y="1334501"/>
+                    </a:cubicBezTo>
+                    <a:cubicBezTo>
+                      <a:pt x="125735" y="1329318"/>
+                      <a:pt x="125881" y="1319933"/>
+                      <a:pt x="126069" y="1314262"/>
+                    </a:cubicBezTo>
+                    <a:cubicBezTo>
+                      <a:pt x="126836" y="1291140"/>
+                      <a:pt x="133248" y="1266731"/>
+                      <a:pt x="134366" y="1243623"/>
+                    </a:cubicBezTo>
+                    <a:cubicBezTo>
+                      <a:pt x="136313" y="1203358"/>
+                      <a:pt x="135729" y="1176003"/>
+                      <a:pt x="134081" y="1128598"/>
+                    </a:cubicBezTo>
+                    <a:cubicBezTo>
+                      <a:pt x="133456" y="1110607"/>
+                      <a:pt x="131319" y="1088161"/>
+                      <a:pt x="131319" y="1088161"/>
+                    </a:cubicBezTo>
+                    <a:cubicBezTo>
+                      <a:pt x="131319" y="1088161"/>
+                      <a:pt x="95325" y="972243"/>
+                      <a:pt x="80686" y="912842"/>
+                    </a:cubicBezTo>
+                    <a:cubicBezTo>
+                      <a:pt x="71210" y="874385"/>
+                      <a:pt x="58400" y="836489"/>
+                      <a:pt x="45533" y="799031"/>
+                    </a:cubicBezTo>
+                    <a:cubicBezTo>
+                      <a:pt x="36900" y="773905"/>
+                      <a:pt x="30590" y="753375"/>
+                      <a:pt x="23865" y="719649"/>
+                    </a:cubicBezTo>
+                    <a:cubicBezTo>
+                      <a:pt x="22053" y="710562"/>
+                      <a:pt x="20768" y="701957"/>
+                      <a:pt x="19650" y="692757"/>
+                    </a:cubicBezTo>
+                    <a:cubicBezTo>
+                      <a:pt x="17720" y="676834"/>
+                      <a:pt x="18863" y="657079"/>
+                      <a:pt x="19568" y="639261"/>
+                    </a:cubicBezTo>
+                    <a:cubicBezTo>
+                      <a:pt x="27925" y="427991"/>
+                      <a:pt x="70641" y="7015"/>
+                      <a:pt x="70641" y="7015"/>
+                    </a:cubicBezTo>
+                  </a:path>
+                </a:pathLst>
+              </a:custGeom>
+              <a:solidFill>
+                <a:srgbClr val="000000"/>
+              </a:solidFill>
+              <a:ln w="3909" cap="flat">
+                <a:noFill/>
+                <a:prstDash val="solid"/>
+                <a:miter/>
+              </a:ln>
+            </p:spPr>
+            <p:txBody>
+              <a:bodyPr/>
+              <a:lstStyle/>
+              <a:p>
+                <a:endParaRPr lang="en-US"/>
+              </a:p>
+            </p:txBody>
+          </p:sp>
+        </p:grpSp>
+        <p:sp>
+          <p:nvSpPr>
+            <p:cNvPr id="20" name="Freeform: Shape 19">
+              <a:extLst>
+                <a:ext uri="{FF2B5EF4-FFF2-40B4-BE49-F238E27FC236}">
+                  <a16:creationId xmlns:a16="http://schemas.microsoft.com/office/drawing/2014/main" id="{5D6F8B79-15B3-B0CE-1A06-80FF7395337A}"/>
+                </a:ext>
+              </a:extLst>
+            </p:cNvPr>
+            <p:cNvSpPr/>
+            <p:nvPr/>
+          </p:nvSpPr>
+          <p:spPr>
+            <a:xfrm>
+              <a:off x="11368757" y="1469660"/>
+              <a:ext cx="309492" cy="360159"/>
+            </a:xfrm>
+            <a:custGeom>
+              <a:avLst/>
+              <a:gdLst>
+                <a:gd name="csX0" fmla="*/ 35813 w 309492"/>
+                <a:gd name="csY0" fmla="*/ 176463 h 360159"/>
+                <a:gd name="csX1" fmla="*/ 21602 w 309492"/>
+                <a:gd name="csY1" fmla="*/ 111238 h 360159"/>
+                <a:gd name="csX2" fmla="*/ 20098 w 309492"/>
+                <a:gd name="csY2" fmla="*/ 72045 h 360159"/>
+                <a:gd name="csX3" fmla="*/ 45100 w 309492"/>
+                <a:gd name="csY3" fmla="*/ 35647 h 360159"/>
+                <a:gd name="csX4" fmla="*/ 85644 w 309492"/>
+                <a:gd name="csY4" fmla="*/ 11079 h 360159"/>
+                <a:gd name="csX5" fmla="*/ 148154 w 309492"/>
+                <a:gd name="csY5" fmla="*/ 15073 h 360159"/>
+                <a:gd name="csX6" fmla="*/ 182486 w 309492"/>
+                <a:gd name="csY6" fmla="*/ 37288 h 360159"/>
+                <a:gd name="csX7" fmla="*/ 246398 w 309492"/>
+                <a:gd name="csY7" fmla="*/ 118896 h 360159"/>
+                <a:gd name="csX8" fmla="*/ 294452 w 309492"/>
+                <a:gd name="csY8" fmla="*/ 196683 h 360159"/>
+                <a:gd name="csX9" fmla="*/ 296149 w 309492"/>
+                <a:gd name="csY9" fmla="*/ 208383 h 360159"/>
+                <a:gd name="csX10" fmla="*/ 316720 w 309492"/>
+                <a:gd name="csY10" fmla="*/ 236032 h 360159"/>
+                <a:gd name="csX11" fmla="*/ 327362 w 309492"/>
+                <a:gd name="csY11" fmla="*/ 265899 h 360159"/>
+                <a:gd name="csX12" fmla="*/ 314352 w 309492"/>
+                <a:gd name="csY12" fmla="*/ 316885 h 360159"/>
+                <a:gd name="csX13" fmla="*/ 307939 w 309492"/>
+                <a:gd name="csY13" fmla="*/ 322062 h 360159"/>
+                <a:gd name="csX14" fmla="*/ 283760 w 309492"/>
+                <a:gd name="csY14" fmla="*/ 359536 h 360159"/>
+                <a:gd name="csX15" fmla="*/ 266542 w 309492"/>
+                <a:gd name="csY15" fmla="*/ 367226 h 360159"/>
+                <a:gd name="csX16" fmla="*/ 253558 w 309492"/>
+                <a:gd name="csY16" fmla="*/ 357068 h 360159"/>
+                <a:gd name="csX17" fmla="*/ 191155 w 309492"/>
+                <a:gd name="csY17" fmla="*/ 309844 h 360159"/>
+                <a:gd name="csX18" fmla="*/ 114494 w 309492"/>
+                <a:gd name="csY18" fmla="*/ 272740 h 360159"/>
+                <a:gd name="csX19" fmla="*/ 45708 w 309492"/>
+                <a:gd name="csY19" fmla="*/ 252385 h 360159"/>
+                <a:gd name="csX20" fmla="*/ 29844 w 309492"/>
+                <a:gd name="csY20" fmla="*/ 242962 h 360159"/>
+                <a:gd name="csX21" fmla="*/ 22852 w 309492"/>
+                <a:gd name="csY21" fmla="*/ 227311 h 360159"/>
+              </a:gdLst>
+              <a:ahLst/>
+              <a:cxnLst>
+                <a:cxn ang="0">
+                  <a:pos x="csX0" y="csY0"/>
+                </a:cxn>
+                <a:cxn ang="0">
+                  <a:pos x="csX1" y="csY1"/>
+                </a:cxn>
+                <a:cxn ang="0">
+                  <a:pos x="csX2" y="csY2"/>
+                </a:cxn>
+                <a:cxn ang="0">
+                  <a:pos x="csX3" y="csY3"/>
+                </a:cxn>
+                <a:cxn ang="0">
+                  <a:pos x="csX4" y="csY4"/>
+                </a:cxn>
+                <a:cxn ang="0">
+                  <a:pos x="csX5" y="csY5"/>
+                </a:cxn>
+                <a:cxn ang="0">
+                  <a:pos x="csX6" y="csY6"/>
+                </a:cxn>
+                <a:cxn ang="0">
+                  <a:pos x="csX7" y="csY7"/>
+                </a:cxn>
+                <a:cxn ang="0">
+                  <a:pos x="csX8" y="csY8"/>
+                </a:cxn>
+                <a:cxn ang="0">
+                  <a:pos x="csX9" y="csY9"/>
+                </a:cxn>
+                <a:cxn ang="0">
+                  <a:pos x="csX10" y="csY10"/>
+                </a:cxn>
+                <a:cxn ang="0">
+                  <a:pos x="csX11" y="csY11"/>
+                </a:cxn>
+                <a:cxn ang="0">
+                  <a:pos x="csX12" y="csY12"/>
+                </a:cxn>
+                <a:cxn ang="0">
+                  <a:pos x="csX13" y="csY13"/>
+                </a:cxn>
+                <a:cxn ang="0">
+                  <a:pos x="csX14" y="csY14"/>
+                </a:cxn>
+                <a:cxn ang="0">
+                  <a:pos x="csX15" y="csY15"/>
+                </a:cxn>
+                <a:cxn ang="0">
+                  <a:pos x="csX16" y="csY16"/>
+                </a:cxn>
+                <a:cxn ang="0">
+                  <a:pos x="csX17" y="csY17"/>
+                </a:cxn>
+                <a:cxn ang="0">
+                  <a:pos x="csX18" y="csY18"/>
+                </a:cxn>
+                <a:cxn ang="0">
+                  <a:pos x="csX19" y="csY19"/>
+                </a:cxn>
+                <a:cxn ang="0">
+                  <a:pos x="csX20" y="csY20"/>
+                </a:cxn>
+                <a:cxn ang="0">
+                  <a:pos x="csX21" y="csY21"/>
+                </a:cxn>
+              </a:cxnLst>
+              <a:rect l="l" t="t" r="r" b="b"/>
+              <a:pathLst>
+                <a:path w="309492" h="360159">
+                  <a:moveTo>
+                    <a:pt x="35813" y="176463"/>
+                  </a:moveTo>
+                  <a:cubicBezTo>
+                    <a:pt x="35813" y="176463"/>
+                    <a:pt x="29060" y="139684"/>
+                    <a:pt x="21602" y="111238"/>
+                  </a:cubicBezTo>
+                  <a:cubicBezTo>
+                    <a:pt x="17907" y="97146"/>
+                    <a:pt x="16232" y="86091"/>
+                    <a:pt x="20098" y="72045"/>
+                  </a:cubicBezTo>
+                  <a:cubicBezTo>
+                    <a:pt x="23786" y="58658"/>
+                    <a:pt x="35606" y="45781"/>
+                    <a:pt x="45100" y="35647"/>
+                  </a:cubicBezTo>
+                  <a:cubicBezTo>
+                    <a:pt x="56372" y="23614"/>
+                    <a:pt x="69836" y="15763"/>
+                    <a:pt x="85644" y="11079"/>
+                  </a:cubicBezTo>
+                  <a:cubicBezTo>
+                    <a:pt x="108453" y="4321"/>
+                    <a:pt x="125343" y="8330"/>
+                    <a:pt x="148154" y="15073"/>
+                  </a:cubicBezTo>
+                  <a:cubicBezTo>
+                    <a:pt x="161226" y="18938"/>
+                    <a:pt x="172587" y="27920"/>
+                    <a:pt x="182486" y="37288"/>
+                  </a:cubicBezTo>
+                  <a:cubicBezTo>
+                    <a:pt x="208139" y="61554"/>
+                    <a:pt x="226708" y="89587"/>
+                    <a:pt x="246398" y="118896"/>
+                  </a:cubicBezTo>
+                  <a:cubicBezTo>
+                    <a:pt x="263391" y="144195"/>
+                    <a:pt x="274008" y="165072"/>
+                    <a:pt x="294452" y="196683"/>
+                  </a:cubicBezTo>
+                  <a:cubicBezTo>
+                    <a:pt x="296591" y="199993"/>
+                    <a:pt x="293900" y="205151"/>
+                    <a:pt x="296149" y="208383"/>
+                  </a:cubicBezTo>
+                  <a:cubicBezTo>
+                    <a:pt x="302473" y="217447"/>
+                    <a:pt x="310404" y="226964"/>
+                    <a:pt x="316720" y="236032"/>
+                  </a:cubicBezTo>
+                  <a:cubicBezTo>
+                    <a:pt x="323144" y="245251"/>
+                    <a:pt x="327122" y="254668"/>
+                    <a:pt x="327362" y="265899"/>
+                  </a:cubicBezTo>
+                  <a:cubicBezTo>
+                    <a:pt x="327734" y="283435"/>
+                    <a:pt x="323825" y="302124"/>
+                    <a:pt x="314352" y="316885"/>
+                  </a:cubicBezTo>
+                  <a:cubicBezTo>
+                    <a:pt x="312867" y="319196"/>
+                    <a:pt x="307939" y="322062"/>
+                    <a:pt x="307939" y="322062"/>
+                  </a:cubicBezTo>
+                  <a:cubicBezTo>
+                    <a:pt x="307939" y="322062"/>
+                    <a:pt x="292646" y="347617"/>
+                    <a:pt x="283760" y="359536"/>
+                  </a:cubicBezTo>
+                  <a:cubicBezTo>
+                    <a:pt x="280003" y="364575"/>
+                    <a:pt x="272454" y="369369"/>
+                    <a:pt x="266542" y="367226"/>
+                  </a:cubicBezTo>
+                  <a:cubicBezTo>
+                    <a:pt x="261477" y="365390"/>
+                    <a:pt x="257610" y="360622"/>
+                    <a:pt x="253558" y="357068"/>
+                  </a:cubicBezTo>
+                  <a:cubicBezTo>
+                    <a:pt x="233856" y="339796"/>
+                    <a:pt x="213399" y="323688"/>
+                    <a:pt x="191155" y="309844"/>
+                  </a:cubicBezTo>
+                  <a:cubicBezTo>
+                    <a:pt x="167050" y="294843"/>
+                    <a:pt x="141089" y="282670"/>
+                    <a:pt x="114494" y="272740"/>
+                  </a:cubicBezTo>
+                  <a:cubicBezTo>
+                    <a:pt x="92045" y="264358"/>
+                    <a:pt x="68897" y="258420"/>
+                    <a:pt x="45708" y="252385"/>
+                  </a:cubicBezTo>
+                  <a:cubicBezTo>
+                    <a:pt x="39639" y="250805"/>
+                    <a:pt x="33802" y="247830"/>
+                    <a:pt x="29844" y="242962"/>
+                  </a:cubicBezTo>
+                  <a:cubicBezTo>
+                    <a:pt x="26242" y="238528"/>
+                    <a:pt x="22852" y="227311"/>
+                    <a:pt x="22852" y="227311"/>
+                  </a:cubicBezTo>
+                </a:path>
+              </a:pathLst>
+            </a:custGeom>
+            <a:solidFill>
+              <a:srgbClr val="000000"/>
+            </a:solidFill>
+            <a:ln w="3394" cap="flat">
+              <a:noFill/>
+              <a:prstDash val="solid"/>
+              <a:miter/>
+            </a:ln>
+          </p:spPr>
+          <p:txBody>
+            <a:bodyPr/>
+            <a:lstStyle/>
+            <a:p>
+              <a:endParaRPr lang="en-US"/>
+            </a:p>
+          </p:txBody>
+        </p:sp>
+      </p:grpSp>
+      <p:pic>
+        <p:nvPicPr>
+          <p:cNvPr id="198" name="Graphic 197">
+            <a:extLst>
+              <a:ext uri="{FF2B5EF4-FFF2-40B4-BE49-F238E27FC236}">
+                <a16:creationId xmlns:a16="http://schemas.microsoft.com/office/drawing/2014/main" id="{75CE3F9F-8135-E69C-694F-4DC1C3A223A4}"/>
+              </a:ext>
+            </a:extLst>
+          </p:cNvPr>
+          <p:cNvPicPr>
+            <a:picLocks noChangeAspect="1"/>
+          </p:cNvPicPr>
+          <p:nvPr/>
+        </p:nvPicPr>
+        <p:blipFill>
+          <a:blip r:embed="rId2">
+            <a:extLst>
+              <a:ext uri="{96DAC541-7B7A-43D3-8B79-37D633B846F1}">
+                <asvg:svgBlip xmlns:asvg="http://schemas.microsoft.com/office/drawing/2016/SVG/main" r:embed="rId3"/>
+              </a:ext>
+            </a:extLst>
+          </a:blip>
+          <a:stretch>
+            <a:fillRect/>
+          </a:stretch>
+        </p:blipFill>
+        <p:spPr>
+          <a:xfrm flipH="1">
+            <a:off x="-5064354" y="-1242750"/>
+            <a:ext cx="3810000" cy="1905000"/>
+          </a:xfrm>
+          <a:prstGeom prst="rect">
+            <a:avLst/>
+          </a:prstGeom>
+        </p:spPr>
+      </p:pic>
+      <p:pic>
+        <p:nvPicPr>
+          <p:cNvPr id="202" name="Graphic 201">
+            <a:extLst>
+              <a:ext uri="{FF2B5EF4-FFF2-40B4-BE49-F238E27FC236}">
+                <a16:creationId xmlns:a16="http://schemas.microsoft.com/office/drawing/2014/main" id="{D2E016FB-87D4-82A6-34C2-28304A5F4E1B}"/>
+              </a:ext>
+            </a:extLst>
+          </p:cNvPr>
+          <p:cNvPicPr>
+            <a:picLocks noChangeAspect="1"/>
+          </p:cNvPicPr>
+          <p:nvPr/>
+        </p:nvPicPr>
+        <p:blipFill>
+          <a:blip r:embed="rId4">
+            <a:extLst>
+              <a:ext uri="{96DAC541-7B7A-43D3-8B79-37D633B846F1}">
+                <asvg:svgBlip xmlns:asvg="http://schemas.microsoft.com/office/drawing/2016/SVG/main" r:embed="rId5"/>
+              </a:ext>
+            </a:extLst>
+          </a:blip>
+          <a:stretch>
+            <a:fillRect/>
+          </a:stretch>
+        </p:blipFill>
+        <p:spPr>
+          <a:xfrm flipH="1">
+            <a:off x="-4803216" y="1957488"/>
+            <a:ext cx="3810000" cy="1905000"/>
+          </a:xfrm>
+          <a:prstGeom prst="rect">
+            <a:avLst/>
+          </a:prstGeom>
+        </p:spPr>
+      </p:pic>
+      <p:pic>
+        <p:nvPicPr>
+          <p:cNvPr id="204" name="Graphic 203">
+            <a:extLst>
+              <a:ext uri="{FF2B5EF4-FFF2-40B4-BE49-F238E27FC236}">
+                <a16:creationId xmlns:a16="http://schemas.microsoft.com/office/drawing/2014/main" id="{34E8D5DB-061F-B850-AE27-B93820B1FD82}"/>
+              </a:ext>
+            </a:extLst>
+          </p:cNvPr>
+          <p:cNvPicPr>
+            <a:picLocks noChangeAspect="1"/>
+          </p:cNvPicPr>
+          <p:nvPr/>
+        </p:nvPicPr>
+        <p:blipFill>
+          <a:blip r:embed="rId6">
+            <a:extLst>
+              <a:ext uri="{96DAC541-7B7A-43D3-8B79-37D633B846F1}">
+                <asvg:svgBlip xmlns:asvg="http://schemas.microsoft.com/office/drawing/2016/SVG/main" r:embed="rId7"/>
+              </a:ext>
+            </a:extLst>
+          </a:blip>
+          <a:stretch>
+            <a:fillRect/>
+          </a:stretch>
+        </p:blipFill>
+        <p:spPr>
+          <a:xfrm flipH="1">
+            <a:off x="-4281974" y="5926386"/>
+            <a:ext cx="3810000" cy="1905000"/>
+          </a:xfrm>
+          <a:prstGeom prst="rect">
+            <a:avLst/>
+          </a:prstGeom>
+        </p:spPr>
+      </p:pic>
+      <p:pic>
+        <p:nvPicPr>
+          <p:cNvPr id="206" name="Graphic 205">
+            <a:extLst>
+              <a:ext uri="{FF2B5EF4-FFF2-40B4-BE49-F238E27FC236}">
+                <a16:creationId xmlns:a16="http://schemas.microsoft.com/office/drawing/2014/main" id="{12A5D111-6C1F-C72F-CEBD-46E0FCE63E5C}"/>
+              </a:ext>
+            </a:extLst>
+          </p:cNvPr>
+          <p:cNvPicPr>
+            <a:picLocks noChangeAspect="1"/>
+          </p:cNvPicPr>
+          <p:nvPr/>
+        </p:nvPicPr>
+        <p:blipFill>
+          <a:blip r:embed="rId8">
+            <a:extLst>
+              <a:ext uri="{96DAC541-7B7A-43D3-8B79-37D633B846F1}">
+                <asvg:svgBlip xmlns:asvg="http://schemas.microsoft.com/office/drawing/2016/SVG/main" r:embed="rId9"/>
+              </a:ext>
+            </a:extLst>
+          </a:blip>
+          <a:stretch>
+            <a:fillRect/>
+          </a:stretch>
+        </p:blipFill>
+        <p:spPr>
+          <a:xfrm flipH="1">
+            <a:off x="7752519" y="1131144"/>
+            <a:ext cx="3810000" cy="1905000"/>
+          </a:xfrm>
+          <a:prstGeom prst="rect">
+            <a:avLst/>
+          </a:prstGeom>
+        </p:spPr>
+      </p:pic>
+      <p:pic>
+        <p:nvPicPr>
+          <p:cNvPr id="208" name="Graphic 207">
+            <a:extLst>
+              <a:ext uri="{FF2B5EF4-FFF2-40B4-BE49-F238E27FC236}">
+                <a16:creationId xmlns:a16="http://schemas.microsoft.com/office/drawing/2014/main" id="{A7E1434E-0C95-9EAE-E184-2BBB03EE5149}"/>
+              </a:ext>
+            </a:extLst>
+          </p:cNvPr>
+          <p:cNvPicPr>
+            <a:picLocks noChangeAspect="1"/>
+          </p:cNvPicPr>
+          <p:nvPr/>
+        </p:nvPicPr>
+        <p:blipFill>
+          <a:blip r:embed="rId10">
+            <a:extLst>
+              <a:ext uri="{96DAC541-7B7A-43D3-8B79-37D633B846F1}">
+                <asvg:svgBlip xmlns:asvg="http://schemas.microsoft.com/office/drawing/2016/SVG/main" r:embed="rId11"/>
+              </a:ext>
+            </a:extLst>
+          </a:blip>
+          <a:stretch>
+            <a:fillRect/>
+          </a:stretch>
+        </p:blipFill>
+        <p:spPr>
+          <a:xfrm flipH="1">
+            <a:off x="1657843" y="5704103"/>
+            <a:ext cx="3810000" cy="1905000"/>
+          </a:xfrm>
+          <a:prstGeom prst="rect">
+            <a:avLst/>
+          </a:prstGeom>
+        </p:spPr>
+      </p:pic>
     </p:spTree>
     <p:extLst>
       <p:ext uri="{BB962C8B-B14F-4D97-AF65-F5344CB8AC3E}">
         <p14:creationId xmlns:p14="http://schemas.microsoft.com/office/powerpoint/2010/main" val="17930377"/>
+      </p:ext>
+    </p:extLst>
+  </p:cSld>
+  <p:clrMapOvr>
+    <a:masterClrMapping/>
+  </p:clrMapOvr>
+</p:sld>
+</file>
+
+<file path=ppt/slides/slide3.xml><?xml version="1.0" encoding="utf-8"?>
+<p:sld xmlns:a="http://schemas.openxmlformats.org/drawingml/2006/main" xmlns:r="http://schemas.openxmlformats.org/officeDocument/2006/relationships" xmlns:p="http://schemas.openxmlformats.org/presentationml/2006/main">
+  <p:cSld>
+    <p:spTree>
+      <p:nvGrpSpPr>
+        <p:cNvPr id="1" name=""/>
+        <p:cNvGrpSpPr/>
+        <p:nvPr/>
+      </p:nvGrpSpPr>
+      <p:grpSpPr>
+        <a:xfrm>
+          <a:off x="0" y="0"/>
+          <a:ext cx="0" cy="0"/>
+          <a:chOff x="0" y="0"/>
+          <a:chExt cx="0" cy="0"/>
+        </a:xfrm>
+      </p:grpSpPr>
+      <p:pic>
+        <p:nvPicPr>
+          <p:cNvPr id="3" name="Graphic 2">
+            <a:extLst>
+              <a:ext uri="{FF2B5EF4-FFF2-40B4-BE49-F238E27FC236}">
+                <a16:creationId xmlns:a16="http://schemas.microsoft.com/office/drawing/2014/main" id="{9C2DA5D5-57C8-98DF-4B9B-95CF6889D301}"/>
+              </a:ext>
+            </a:extLst>
+          </p:cNvPr>
+          <p:cNvPicPr>
+            <a:picLocks noChangeAspect="1"/>
+          </p:cNvPicPr>
+          <p:nvPr/>
+        </p:nvPicPr>
+        <p:blipFill>
+          <a:blip r:embed="rId2">
+            <a:extLst>
+              <a:ext uri="{96DAC541-7B7A-43D3-8B79-37D633B846F1}">
+                <asvg:svgBlip xmlns:asvg="http://schemas.microsoft.com/office/drawing/2016/SVG/main" r:embed="rId3"/>
+              </a:ext>
+            </a:extLst>
+          </a:blip>
+          <a:stretch>
+            <a:fillRect/>
+          </a:stretch>
+        </p:blipFill>
+        <p:spPr>
+          <a:xfrm rot="1415675">
+            <a:off x="662206" y="116277"/>
+            <a:ext cx="3084527" cy="3084527"/>
+          </a:xfrm>
+          <a:prstGeom prst="rect">
+            <a:avLst/>
+          </a:prstGeom>
+        </p:spPr>
+      </p:pic>
+    </p:spTree>
+    <p:extLst>
+      <p:ext uri="{BB962C8B-B14F-4D97-AF65-F5344CB8AC3E}">
+        <p14:creationId xmlns:p14="http://schemas.microsoft.com/office/powerpoint/2010/main" val="417902183"/>
       </p:ext>
     </p:extLst>
   </p:cSld>

</xml_diff>

<commit_message>
update dbtm + 2 TM icon(s)
</commit_message>
<xml_diff>
--- a/Icons_TimeMarks/BACKUP tm_icons/skulls.pptx
+++ b/Icons_TimeMarks/BACKUP tm_icons/skulls.pptx
@@ -27367,42 +27367,2354 @@
           <a:chExt cx="0" cy="0"/>
         </a:xfrm>
       </p:grpSpPr>
-      <p:pic>
-        <p:nvPicPr>
-          <p:cNvPr id="3" name="Graphic 2">
+      <p:grpSp>
+        <p:nvGrpSpPr>
+          <p:cNvPr id="21" name="Graphic 2">
             <a:extLst>
               <a:ext uri="{FF2B5EF4-FFF2-40B4-BE49-F238E27FC236}">
-                <a16:creationId xmlns:a16="http://schemas.microsoft.com/office/drawing/2014/main" id="{9C2DA5D5-57C8-98DF-4B9B-95CF6889D301}"/>
+                <a16:creationId xmlns:a16="http://schemas.microsoft.com/office/drawing/2014/main" id="{DD6EB731-AD3E-CB98-2F7A-C59F22A06825}"/>
               </a:ext>
             </a:extLst>
           </p:cNvPr>
-          <p:cNvPicPr>
-            <a:picLocks noChangeAspect="1"/>
-          </p:cNvPicPr>
+          <p:cNvGrpSpPr/>
           <p:nvPr/>
-        </p:nvPicPr>
-        <p:blipFill>
-          <a:blip r:embed="rId2">
+        </p:nvGrpSpPr>
+        <p:grpSpPr>
+          <a:xfrm rot="1415675">
+            <a:off x="662202" y="116276"/>
+            <a:ext cx="3084530" cy="3084527"/>
+            <a:chOff x="662202" y="116276"/>
+            <a:chExt cx="3084530" cy="3084527"/>
+          </a:xfrm>
+          <a:solidFill>
+            <a:srgbClr val="000000"/>
+          </a:solidFill>
+        </p:grpSpPr>
+        <p:sp>
+          <p:nvSpPr>
+            <p:cNvPr id="22" name="Oval 21">
+              <a:extLst>
+                <a:ext uri="{FF2B5EF4-FFF2-40B4-BE49-F238E27FC236}">
+                  <a16:creationId xmlns:a16="http://schemas.microsoft.com/office/drawing/2014/main" id="{3DB311AD-0125-B41E-5F1F-66271C55B4C1}"/>
+                </a:ext>
+              </a:extLst>
+            </p:cNvPr>
+            <p:cNvSpPr/>
+            <p:nvPr/>
+          </p:nvSpPr>
+          <p:spPr>
+            <a:xfrm>
+              <a:off x="2270739" y="1230803"/>
+              <a:ext cx="361468" cy="361468"/>
+            </a:xfrm>
+            <a:prstGeom prst="ellipse">
+              <a:avLst/>
+            </a:prstGeom>
+            <a:solidFill>
+              <a:srgbClr val="000000"/>
+            </a:solidFill>
+            <a:ln w="6009" cap="flat">
+              <a:noFill/>
+              <a:prstDash val="solid"/>
+              <a:miter/>
+            </a:ln>
+          </p:spPr>
+          <p:txBody>
+            <a:bodyPr/>
+            <a:lstStyle/>
+            <a:p>
+              <a:endParaRPr lang="en-US"/>
+            </a:p>
+          </p:txBody>
+        </p:sp>
+        <p:sp>
+          <p:nvSpPr>
+            <p:cNvPr id="23" name="Freeform: Shape 22">
+              <a:extLst>
+                <a:ext uri="{FF2B5EF4-FFF2-40B4-BE49-F238E27FC236}">
+                  <a16:creationId xmlns:a16="http://schemas.microsoft.com/office/drawing/2014/main" id="{9A42EFF2-A662-2801-CAD1-277708F7FEE0}"/>
+                </a:ext>
+              </a:extLst>
+            </p:cNvPr>
+            <p:cNvSpPr/>
+            <p:nvPr/>
+          </p:nvSpPr>
+          <p:spPr>
+            <a:xfrm>
+              <a:off x="1156212" y="116276"/>
+              <a:ext cx="2590520" cy="2590520"/>
+            </a:xfrm>
+            <a:custGeom>
+              <a:avLst/>
+              <a:gdLst>
+                <a:gd name="csX0" fmla="*/ 1295260 w 2590520"/>
+                <a:gd name="csY0" fmla="*/ 0 h 2590520"/>
+                <a:gd name="csX1" fmla="*/ 0 w 2590520"/>
+                <a:gd name="csY1" fmla="*/ 1295260 h 2590520"/>
+                <a:gd name="csX2" fmla="*/ 145762 w 2590520"/>
+                <a:gd name="csY2" fmla="*/ 1892629 h 2590520"/>
+                <a:gd name="csX3" fmla="*/ 171450 w 2590520"/>
+                <a:gd name="csY3" fmla="*/ 1865277 h 2590520"/>
+                <a:gd name="csX4" fmla="*/ 524352 w 2590520"/>
+                <a:gd name="csY4" fmla="*/ 1670735 h 2590520"/>
+                <a:gd name="csX5" fmla="*/ 661282 w 2590520"/>
+                <a:gd name="csY5" fmla="*/ 1654626 h 2590520"/>
+                <a:gd name="csX6" fmla="*/ 980843 w 2590520"/>
+                <a:gd name="csY6" fmla="*/ 1780091 h 2590520"/>
+                <a:gd name="csX7" fmla="*/ 1090182 w 2590520"/>
+                <a:gd name="csY7" fmla="*/ 2236571 h 2590520"/>
+                <a:gd name="csX8" fmla="*/ 939413 w 2590520"/>
+                <a:gd name="csY8" fmla="*/ 2541024 h 2590520"/>
+                <a:gd name="csX9" fmla="*/ 1295260 w 2590520"/>
+                <a:gd name="csY9" fmla="*/ 2590521 h 2590520"/>
+                <a:gd name="csX10" fmla="*/ 2590521 w 2590520"/>
+                <a:gd name="csY10" fmla="*/ 1295260 h 2590520"/>
+                <a:gd name="csX11" fmla="*/ 1295260 w 2590520"/>
+                <a:gd name="csY11" fmla="*/ 0 h 2590520"/>
+                <a:gd name="csX12" fmla="*/ 1295260 w 2590520"/>
+                <a:gd name="csY12" fmla="*/ 1656728 h 2590520"/>
+                <a:gd name="csX13" fmla="*/ 933792 w 2590520"/>
+                <a:gd name="csY13" fmla="*/ 1295260 h 2590520"/>
+                <a:gd name="csX14" fmla="*/ 1295260 w 2590520"/>
+                <a:gd name="csY14" fmla="*/ 933792 h 2590520"/>
+                <a:gd name="csX15" fmla="*/ 1656728 w 2590520"/>
+                <a:gd name="csY15" fmla="*/ 1295260 h 2590520"/>
+                <a:gd name="csX16" fmla="*/ 1295260 w 2590520"/>
+                <a:gd name="csY16" fmla="*/ 1656728 h 2590520"/>
+              </a:gdLst>
+              <a:ahLst/>
+              <a:cxnLst>
+                <a:cxn ang="0">
+                  <a:pos x="csX0" y="csY0"/>
+                </a:cxn>
+                <a:cxn ang="0">
+                  <a:pos x="csX1" y="csY1"/>
+                </a:cxn>
+                <a:cxn ang="0">
+                  <a:pos x="csX2" y="csY2"/>
+                </a:cxn>
+                <a:cxn ang="0">
+                  <a:pos x="csX3" y="csY3"/>
+                </a:cxn>
+                <a:cxn ang="0">
+                  <a:pos x="csX4" y="csY4"/>
+                </a:cxn>
+                <a:cxn ang="0">
+                  <a:pos x="csX5" y="csY5"/>
+                </a:cxn>
+                <a:cxn ang="0">
+                  <a:pos x="csX6" y="csY6"/>
+                </a:cxn>
+                <a:cxn ang="0">
+                  <a:pos x="csX7" y="csY7"/>
+                </a:cxn>
+                <a:cxn ang="0">
+                  <a:pos x="csX8" y="csY8"/>
+                </a:cxn>
+                <a:cxn ang="0">
+                  <a:pos x="csX9" y="csY9"/>
+                </a:cxn>
+                <a:cxn ang="0">
+                  <a:pos x="csX10" y="csY10"/>
+                </a:cxn>
+                <a:cxn ang="0">
+                  <a:pos x="csX11" y="csY11"/>
+                </a:cxn>
+                <a:cxn ang="0">
+                  <a:pos x="csX12" y="csY12"/>
+                </a:cxn>
+                <a:cxn ang="0">
+                  <a:pos x="csX13" y="csY13"/>
+                </a:cxn>
+                <a:cxn ang="0">
+                  <a:pos x="csX14" y="csY14"/>
+                </a:cxn>
+                <a:cxn ang="0">
+                  <a:pos x="csX15" y="csY15"/>
+                </a:cxn>
+                <a:cxn ang="0">
+                  <a:pos x="csX16" y="csY16"/>
+                </a:cxn>
+              </a:cxnLst>
+              <a:rect l="l" t="t" r="r" b="b"/>
+              <a:pathLst>
+                <a:path w="2590520" h="2590520">
+                  <a:moveTo>
+                    <a:pt x="1295260" y="0"/>
+                  </a:moveTo>
+                  <a:cubicBezTo>
+                    <a:pt x="579909" y="0"/>
+                    <a:pt x="0" y="579909"/>
+                    <a:pt x="0" y="1295260"/>
+                  </a:cubicBezTo>
+                  <a:cubicBezTo>
+                    <a:pt x="0" y="1510732"/>
+                    <a:pt x="52678" y="1713876"/>
+                    <a:pt x="145762" y="1892629"/>
+                  </a:cubicBezTo>
+                  <a:cubicBezTo>
+                    <a:pt x="153979" y="1883345"/>
+                    <a:pt x="162522" y="1874212"/>
+                    <a:pt x="171450" y="1865277"/>
+                  </a:cubicBezTo>
+                  <a:cubicBezTo>
+                    <a:pt x="265125" y="1771603"/>
+                    <a:pt x="393753" y="1700695"/>
+                    <a:pt x="524352" y="1670735"/>
+                  </a:cubicBezTo>
+                  <a:cubicBezTo>
+                    <a:pt x="570957" y="1660048"/>
+                    <a:pt x="617026" y="1654626"/>
+                    <a:pt x="661282" y="1654626"/>
+                  </a:cubicBezTo>
+                  <a:cubicBezTo>
+                    <a:pt x="788271" y="1654626"/>
+                    <a:pt x="898772" y="1698014"/>
+                    <a:pt x="980843" y="1780091"/>
+                  </a:cubicBezTo>
+                  <a:cubicBezTo>
+                    <a:pt x="1091489" y="1890743"/>
+                    <a:pt x="1131341" y="2057121"/>
+                    <a:pt x="1090182" y="2236571"/>
+                  </a:cubicBezTo>
+                  <a:cubicBezTo>
+                    <a:pt x="1065102" y="2345916"/>
+                    <a:pt x="1011237" y="2453796"/>
+                    <a:pt x="939413" y="2541024"/>
+                  </a:cubicBezTo>
+                  <a:cubicBezTo>
+                    <a:pt x="1052480" y="2573249"/>
+                    <a:pt x="1171855" y="2590521"/>
+                    <a:pt x="1295260" y="2590521"/>
+                  </a:cubicBezTo>
+                  <a:cubicBezTo>
+                    <a:pt x="2010612" y="2590521"/>
+                    <a:pt x="2590521" y="2010612"/>
+                    <a:pt x="2590521" y="1295260"/>
+                  </a:cubicBezTo>
+                  <a:cubicBezTo>
+                    <a:pt x="2590521" y="579909"/>
+                    <a:pt x="2010612" y="0"/>
+                    <a:pt x="1295260" y="0"/>
+                  </a:cubicBezTo>
+                  <a:close/>
+                  <a:moveTo>
+                    <a:pt x="1295260" y="1656728"/>
+                  </a:moveTo>
+                  <a:cubicBezTo>
+                    <a:pt x="1095947" y="1656728"/>
+                    <a:pt x="933792" y="1494574"/>
+                    <a:pt x="933792" y="1295260"/>
+                  </a:cubicBezTo>
+                  <a:cubicBezTo>
+                    <a:pt x="933792" y="1095947"/>
+                    <a:pt x="1095947" y="933792"/>
+                    <a:pt x="1295260" y="933792"/>
+                  </a:cubicBezTo>
+                  <a:cubicBezTo>
+                    <a:pt x="1494574" y="933792"/>
+                    <a:pt x="1656728" y="1095947"/>
+                    <a:pt x="1656728" y="1295260"/>
+                  </a:cubicBezTo>
+                  <a:cubicBezTo>
+                    <a:pt x="1656728" y="1494574"/>
+                    <a:pt x="1494574" y="1656728"/>
+                    <a:pt x="1295260" y="1656728"/>
+                  </a:cubicBezTo>
+                  <a:close/>
+                </a:path>
+              </a:pathLst>
+            </a:custGeom>
+            <a:solidFill>
+              <a:srgbClr val="000000"/>
+            </a:solidFill>
+            <a:ln w="6009" cap="flat">
+              <a:noFill/>
+              <a:prstDash val="solid"/>
+              <a:miter/>
+            </a:ln>
+          </p:spPr>
+          <p:txBody>
+            <a:bodyPr/>
+            <a:lstStyle/>
+            <a:p>
+              <a:endParaRPr lang="en-US"/>
+            </a:p>
+          </p:txBody>
+        </p:sp>
+        <p:sp>
+          <p:nvSpPr>
+            <p:cNvPr id="24" name="Freeform: Shape 23">
+              <a:extLst>
+                <a:ext uri="{FF2B5EF4-FFF2-40B4-BE49-F238E27FC236}">
+                  <a16:creationId xmlns:a16="http://schemas.microsoft.com/office/drawing/2014/main" id="{D28D8021-17C3-7BA1-5595-C7893FA28ECA}"/>
+                </a:ext>
+              </a:extLst>
+            </p:cNvPr>
+            <p:cNvSpPr/>
+            <p:nvPr/>
+          </p:nvSpPr>
+          <p:spPr>
+            <a:xfrm>
+              <a:off x="662202" y="1951631"/>
+              <a:ext cx="1419577" cy="1249172"/>
+            </a:xfrm>
+            <a:custGeom>
+              <a:avLst/>
+              <a:gdLst>
+                <a:gd name="csX0" fmla="*/ 1058773 w 1419577"/>
+                <a:gd name="csY0" fmla="*/ 11536 h 1249172"/>
+                <a:gd name="csX1" fmla="*/ 793263 w 1419577"/>
+                <a:gd name="csY1" fmla="*/ 157720 h 1249172"/>
+                <a:gd name="csX2" fmla="*/ 687503 w 1419577"/>
+                <a:gd name="csY2" fmla="*/ 405356 h 1249172"/>
+                <a:gd name="csX3" fmla="*/ 725897 w 1419577"/>
+                <a:gd name="csY3" fmla="*/ 537539 h 1249172"/>
+                <a:gd name="csX4" fmla="*/ 688256 w 1419577"/>
+                <a:gd name="csY4" fmla="*/ 543894 h 1249172"/>
+                <a:gd name="csX5" fmla="*/ 480972 w 1419577"/>
+                <a:gd name="csY5" fmla="*/ 640406 h 1249172"/>
+                <a:gd name="csX6" fmla="*/ 384388 w 1419577"/>
+                <a:gd name="csY6" fmla="*/ 847738 h 1249172"/>
+                <a:gd name="csX7" fmla="*/ 338921 w 1419577"/>
+                <a:gd name="csY7" fmla="*/ 952853 h 1249172"/>
+                <a:gd name="csX8" fmla="*/ 233801 w 1419577"/>
+                <a:gd name="csY8" fmla="*/ 998320 h 1249172"/>
+                <a:gd name="csX9" fmla="*/ 26468 w 1419577"/>
+                <a:gd name="csY9" fmla="*/ 1094904 h 1249172"/>
+                <a:gd name="csX10" fmla="*/ 26468 w 1419577"/>
+                <a:gd name="csY10" fmla="*/ 1222701 h 1249172"/>
+                <a:gd name="csX11" fmla="*/ 90370 w 1419577"/>
+                <a:gd name="csY11" fmla="*/ 1249173 h 1249172"/>
+                <a:gd name="csX12" fmla="*/ 154266 w 1419577"/>
+                <a:gd name="csY12" fmla="*/ 1222701 h 1249172"/>
+                <a:gd name="csX13" fmla="*/ 259380 w 1419577"/>
+                <a:gd name="csY13" fmla="*/ 1177235 h 1249172"/>
+                <a:gd name="csX14" fmla="*/ 466718 w 1419577"/>
+                <a:gd name="csY14" fmla="*/ 1080650 h 1249172"/>
+                <a:gd name="csX15" fmla="*/ 563303 w 1419577"/>
+                <a:gd name="csY15" fmla="*/ 873318 h 1249172"/>
+                <a:gd name="csX16" fmla="*/ 608769 w 1419577"/>
+                <a:gd name="csY16" fmla="*/ 768203 h 1249172"/>
+                <a:gd name="csX17" fmla="*/ 713776 w 1419577"/>
+                <a:gd name="csY17" fmla="*/ 722821 h 1249172"/>
+                <a:gd name="csX18" fmla="*/ 855911 w 1419577"/>
+                <a:gd name="csY18" fmla="*/ 677891 h 1249172"/>
+                <a:gd name="csX19" fmla="*/ 1014222 w 1419577"/>
+                <a:gd name="csY19" fmla="*/ 732069 h 1249172"/>
+                <a:gd name="csX20" fmla="*/ 1028265 w 1419577"/>
+                <a:gd name="csY20" fmla="*/ 732418 h 1249172"/>
+                <a:gd name="csX21" fmla="*/ 1261858 w 1419577"/>
+                <a:gd name="csY21" fmla="*/ 626309 h 1249172"/>
+                <a:gd name="csX22" fmla="*/ 1408041 w 1419577"/>
+                <a:gd name="csY22" fmla="*/ 360793 h 1249172"/>
+                <a:gd name="csX23" fmla="*/ 1347056 w 1419577"/>
+                <a:gd name="csY23" fmla="*/ 72516 h 1249172"/>
+                <a:gd name="csX24" fmla="*/ 1058773 w 1419577"/>
+                <a:gd name="csY24" fmla="*/ 11536 h 1249172"/>
+              </a:gdLst>
+              <a:ahLst/>
+              <a:cxnLst>
+                <a:cxn ang="0">
+                  <a:pos x="csX0" y="csY0"/>
+                </a:cxn>
+                <a:cxn ang="0">
+                  <a:pos x="csX1" y="csY1"/>
+                </a:cxn>
+                <a:cxn ang="0">
+                  <a:pos x="csX2" y="csY2"/>
+                </a:cxn>
+                <a:cxn ang="0">
+                  <a:pos x="csX3" y="csY3"/>
+                </a:cxn>
+                <a:cxn ang="0">
+                  <a:pos x="csX4" y="csY4"/>
+                </a:cxn>
+                <a:cxn ang="0">
+                  <a:pos x="csX5" y="csY5"/>
+                </a:cxn>
+                <a:cxn ang="0">
+                  <a:pos x="csX6" y="csY6"/>
+                </a:cxn>
+                <a:cxn ang="0">
+                  <a:pos x="csX7" y="csY7"/>
+                </a:cxn>
+                <a:cxn ang="0">
+                  <a:pos x="csX8" y="csY8"/>
+                </a:cxn>
+                <a:cxn ang="0">
+                  <a:pos x="csX9" y="csY9"/>
+                </a:cxn>
+                <a:cxn ang="0">
+                  <a:pos x="csX10" y="csY10"/>
+                </a:cxn>
+                <a:cxn ang="0">
+                  <a:pos x="csX11" y="csY11"/>
+                </a:cxn>
+                <a:cxn ang="0">
+                  <a:pos x="csX12" y="csY12"/>
+                </a:cxn>
+                <a:cxn ang="0">
+                  <a:pos x="csX13" y="csY13"/>
+                </a:cxn>
+                <a:cxn ang="0">
+                  <a:pos x="csX14" y="csY14"/>
+                </a:cxn>
+                <a:cxn ang="0">
+                  <a:pos x="csX15" y="csY15"/>
+                </a:cxn>
+                <a:cxn ang="0">
+                  <a:pos x="csX16" y="csY16"/>
+                </a:cxn>
+                <a:cxn ang="0">
+                  <a:pos x="csX17" y="csY17"/>
+                </a:cxn>
+                <a:cxn ang="0">
+                  <a:pos x="csX18" y="csY18"/>
+                </a:cxn>
+                <a:cxn ang="0">
+                  <a:pos x="csX19" y="csY19"/>
+                </a:cxn>
+                <a:cxn ang="0">
+                  <a:pos x="csX20" y="csY20"/>
+                </a:cxn>
+                <a:cxn ang="0">
+                  <a:pos x="csX21" y="csY21"/>
+                </a:cxn>
+                <a:cxn ang="0">
+                  <a:pos x="csX22" y="csY22"/>
+                </a:cxn>
+                <a:cxn ang="0">
+                  <a:pos x="csX23" y="csY23"/>
+                </a:cxn>
+                <a:cxn ang="0">
+                  <a:pos x="csX24" y="csY24"/>
+                </a:cxn>
+              </a:cxnLst>
+              <a:rect l="l" t="t" r="r" b="b"/>
+              <a:pathLst>
+                <a:path w="1419577" h="1249172">
+                  <a:moveTo>
+                    <a:pt x="1058773" y="11536"/>
+                  </a:moveTo>
+                  <a:cubicBezTo>
+                    <a:pt x="960363" y="34110"/>
+                    <a:pt x="863586" y="87391"/>
+                    <a:pt x="793263" y="157720"/>
+                  </a:cubicBezTo>
+                  <a:cubicBezTo>
+                    <a:pt x="700257" y="250726"/>
+                    <a:pt x="684419" y="343720"/>
+                    <a:pt x="687503" y="405356"/>
+                  </a:cubicBezTo>
+                  <a:cubicBezTo>
+                    <a:pt x="689786" y="450913"/>
+                    <a:pt x="702866" y="495482"/>
+                    <a:pt x="725897" y="537539"/>
+                  </a:cubicBezTo>
+                  <a:cubicBezTo>
+                    <a:pt x="714722" y="540111"/>
+                    <a:pt x="702510" y="541858"/>
+                    <a:pt x="688256" y="543894"/>
+                  </a:cubicBezTo>
+                  <a:cubicBezTo>
+                    <a:pt x="633729" y="551672"/>
+                    <a:pt x="559049" y="562323"/>
+                    <a:pt x="480972" y="640406"/>
+                  </a:cubicBezTo>
+                  <a:cubicBezTo>
+                    <a:pt x="402865" y="718514"/>
+                    <a:pt x="392184" y="793205"/>
+                    <a:pt x="384388" y="847738"/>
+                  </a:cubicBezTo>
+                  <a:cubicBezTo>
+                    <a:pt x="377972" y="892615"/>
+                    <a:pt x="374436" y="917333"/>
+                    <a:pt x="338921" y="952853"/>
+                  </a:cubicBezTo>
+                  <a:cubicBezTo>
+                    <a:pt x="303401" y="988374"/>
+                    <a:pt x="278683" y="991904"/>
+                    <a:pt x="233801" y="998320"/>
+                  </a:cubicBezTo>
+                  <a:cubicBezTo>
+                    <a:pt x="179267" y="1006116"/>
+                    <a:pt x="104576" y="1016791"/>
+                    <a:pt x="26468" y="1094904"/>
+                  </a:cubicBezTo>
+                  <a:cubicBezTo>
+                    <a:pt x="-8823" y="1130196"/>
+                    <a:pt x="-8823" y="1187410"/>
+                    <a:pt x="26468" y="1222701"/>
+                  </a:cubicBezTo>
+                  <a:cubicBezTo>
+                    <a:pt x="44114" y="1240353"/>
+                    <a:pt x="67242" y="1249173"/>
+                    <a:pt x="90370" y="1249173"/>
+                  </a:cubicBezTo>
+                  <a:cubicBezTo>
+                    <a:pt x="113498" y="1249173"/>
+                    <a:pt x="136626" y="1240353"/>
+                    <a:pt x="154266" y="1222701"/>
+                  </a:cubicBezTo>
+                  <a:cubicBezTo>
+                    <a:pt x="189786" y="1187187"/>
+                    <a:pt x="214504" y="1183651"/>
+                    <a:pt x="259380" y="1177235"/>
+                  </a:cubicBezTo>
+                  <a:cubicBezTo>
+                    <a:pt x="313920" y="1169439"/>
+                    <a:pt x="388605" y="1158758"/>
+                    <a:pt x="466718" y="1080650"/>
+                  </a:cubicBezTo>
+                  <a:cubicBezTo>
+                    <a:pt x="544826" y="1002543"/>
+                    <a:pt x="555507" y="927858"/>
+                    <a:pt x="563303" y="873318"/>
+                  </a:cubicBezTo>
+                  <a:cubicBezTo>
+                    <a:pt x="569719" y="828442"/>
+                    <a:pt x="573255" y="803724"/>
+                    <a:pt x="608769" y="768203"/>
+                  </a:cubicBezTo>
+                  <a:cubicBezTo>
+                    <a:pt x="644235" y="732737"/>
+                    <a:pt x="668936" y="729213"/>
+                    <a:pt x="713776" y="722821"/>
+                  </a:cubicBezTo>
+                  <a:cubicBezTo>
+                    <a:pt x="752857" y="717248"/>
+                    <a:pt x="802293" y="710188"/>
+                    <a:pt x="855911" y="677891"/>
+                  </a:cubicBezTo>
+                  <a:cubicBezTo>
+                    <a:pt x="905426" y="710784"/>
+                    <a:pt x="959110" y="729310"/>
+                    <a:pt x="1014222" y="732069"/>
+                  </a:cubicBezTo>
+                  <a:cubicBezTo>
+                    <a:pt x="1018740" y="732298"/>
+                    <a:pt x="1023421" y="732418"/>
+                    <a:pt x="1028265" y="732418"/>
+                  </a:cubicBezTo>
+                  <a:cubicBezTo>
+                    <a:pt x="1089492" y="732418"/>
+                    <a:pt x="1175678" y="712495"/>
+                    <a:pt x="1261858" y="626309"/>
+                  </a:cubicBezTo>
+                  <a:cubicBezTo>
+                    <a:pt x="1332187" y="555986"/>
+                    <a:pt x="1385468" y="459209"/>
+                    <a:pt x="1408041" y="360793"/>
+                  </a:cubicBezTo>
+                  <a:cubicBezTo>
+                    <a:pt x="1435393" y="241569"/>
+                    <a:pt x="1413735" y="139189"/>
+                    <a:pt x="1347056" y="72516"/>
+                  </a:cubicBezTo>
+                  <a:cubicBezTo>
+                    <a:pt x="1280383" y="5843"/>
+                    <a:pt x="1178015" y="-15815"/>
+                    <a:pt x="1058773" y="11536"/>
+                  </a:cubicBezTo>
+                  <a:close/>
+                </a:path>
+              </a:pathLst>
+            </a:custGeom>
+            <a:solidFill>
+              <a:srgbClr val="000000"/>
+            </a:solidFill>
+            <a:ln w="6009" cap="flat">
+              <a:noFill/>
+              <a:prstDash val="solid"/>
+              <a:miter/>
+            </a:ln>
+          </p:spPr>
+          <p:txBody>
+            <a:bodyPr/>
+            <a:lstStyle/>
+            <a:p>
+              <a:endParaRPr lang="en-US"/>
+            </a:p>
+          </p:txBody>
+        </p:sp>
+      </p:grpSp>
+      <p:sp>
+        <p:nvSpPr>
+          <p:cNvPr id="20" name="Freeform: Shape 19">
             <a:extLst>
-              <a:ext uri="{96DAC541-7B7A-43D3-8B79-37D633B846F1}">
-                <asvg:svgBlip xmlns:asvg="http://schemas.microsoft.com/office/drawing/2016/SVG/main" r:embed="rId3"/>
+              <a:ext uri="{FF2B5EF4-FFF2-40B4-BE49-F238E27FC236}">
+                <a16:creationId xmlns:a16="http://schemas.microsoft.com/office/drawing/2014/main" id="{2DCA4B78-7DC6-D523-CDED-C5D0AF53B1AA}"/>
               </a:ext>
             </a:extLst>
-          </a:blip>
-          <a:stretch>
-            <a:fillRect/>
-          </a:stretch>
-        </p:blipFill>
+          </p:cNvPr>
+          <p:cNvSpPr/>
+          <p:nvPr/>
+        </p:nvSpPr>
         <p:spPr>
-          <a:xfrm rot="1415675">
-            <a:off x="662206" y="116277"/>
-            <a:ext cx="3084527" cy="3084527"/>
+          <a:xfrm>
+            <a:off x="4242815" y="1013441"/>
+            <a:ext cx="1456815" cy="1780093"/>
           </a:xfrm>
-          <a:prstGeom prst="rect">
+          <a:custGeom>
             <a:avLst/>
-          </a:prstGeom>
+            <a:gdLst>
+              <a:gd name="csX0" fmla="*/ 3589325 w 3706368"/>
+              <a:gd name="csY0" fmla="*/ 3568028 h 4528839"/>
+              <a:gd name="csX1" fmla="*/ 3670527 w 3706368"/>
+              <a:gd name="csY1" fmla="*/ 3584712 h 4528839"/>
+              <a:gd name="csX2" fmla="*/ 3706368 w 3706368"/>
+              <a:gd name="csY2" fmla="*/ 3647682 h 4528839"/>
+              <a:gd name="csX3" fmla="*/ 3706368 w 3706368"/>
+              <a:gd name="csY3" fmla="*/ 4528839 h 4528839"/>
+              <a:gd name="csX4" fmla="*/ 0 w 3706368"/>
+              <a:gd name="csY4" fmla="*/ 4528839 h 4528839"/>
+              <a:gd name="csX5" fmla="*/ 0 w 3706368"/>
+              <a:gd name="csY5" fmla="*/ 4232898 h 4528839"/>
+              <a:gd name="csX6" fmla="*/ 78029 w 3706368"/>
+              <a:gd name="csY6" fmla="*/ 4153244 h 4528839"/>
+              <a:gd name="csX7" fmla="*/ 682753 w 3706368"/>
+              <a:gd name="csY7" fmla="*/ 3553478 h 4528839"/>
+              <a:gd name="csX8" fmla="*/ 752296 w 3706368"/>
+              <a:gd name="csY8" fmla="*/ 3578350 h 4528839"/>
+              <a:gd name="csX9" fmla="*/ 780289 w 3706368"/>
+              <a:gd name="csY9" fmla="*/ 3634758 h 4528839"/>
+              <a:gd name="csX10" fmla="*/ 780289 w 3706368"/>
+              <a:gd name="csY10" fmla="*/ 3870470 h 4528839"/>
+              <a:gd name="csX11" fmla="*/ 585217 w 3706368"/>
+              <a:gd name="csY11" fmla="*/ 3902982 h 4528839"/>
+              <a:gd name="csX12" fmla="*/ 585217 w 3706368"/>
+              <a:gd name="csY12" fmla="*/ 3634758 h 4528839"/>
+              <a:gd name="csX13" fmla="*/ 682753 w 3706368"/>
+              <a:gd name="csY13" fmla="*/ 3553478 h 4528839"/>
+              <a:gd name="csX14" fmla="*/ 1463041 w 3706368"/>
+              <a:gd name="csY14" fmla="*/ 3390918 h 4528839"/>
+              <a:gd name="csX15" fmla="*/ 1532584 w 3706368"/>
+              <a:gd name="csY15" fmla="*/ 3415790 h 4528839"/>
+              <a:gd name="csX16" fmla="*/ 1560577 w 3706368"/>
+              <a:gd name="csY16" fmla="*/ 3472198 h 4528839"/>
+              <a:gd name="csX17" fmla="*/ 1560577 w 3706368"/>
+              <a:gd name="csY17" fmla="*/ 3740422 h 4528839"/>
+              <a:gd name="csX18" fmla="*/ 1365505 w 3706368"/>
+              <a:gd name="csY18" fmla="*/ 3772934 h 4528839"/>
+              <a:gd name="csX19" fmla="*/ 1365505 w 3706368"/>
+              <a:gd name="csY19" fmla="*/ 3472198 h 4528839"/>
+              <a:gd name="csX20" fmla="*/ 1463041 w 3706368"/>
+              <a:gd name="csY20" fmla="*/ 3390918 h 4528839"/>
+              <a:gd name="csX21" fmla="*/ 2243329 w 3706368"/>
+              <a:gd name="csY21" fmla="*/ 3228358 h 4528839"/>
+              <a:gd name="csX22" fmla="*/ 2312872 w 3706368"/>
+              <a:gd name="csY22" fmla="*/ 3253230 h 4528839"/>
+              <a:gd name="csX23" fmla="*/ 2340865 w 3706368"/>
+              <a:gd name="csY23" fmla="*/ 3309638 h 4528839"/>
+              <a:gd name="csX24" fmla="*/ 2340865 w 3706368"/>
+              <a:gd name="csY24" fmla="*/ 3610374 h 4528839"/>
+              <a:gd name="csX25" fmla="*/ 2145793 w 3706368"/>
+              <a:gd name="csY25" fmla="*/ 3642886 h 4528839"/>
+              <a:gd name="csX26" fmla="*/ 2145793 w 3706368"/>
+              <a:gd name="csY26" fmla="*/ 3309638 h 4528839"/>
+              <a:gd name="csX27" fmla="*/ 2243329 w 3706368"/>
+              <a:gd name="csY27" fmla="*/ 3228358 h 4528839"/>
+              <a:gd name="csX28" fmla="*/ 3023617 w 3706368"/>
+              <a:gd name="csY28" fmla="*/ 3065798 h 4528839"/>
+              <a:gd name="csX29" fmla="*/ 3093160 w 3706368"/>
+              <a:gd name="csY29" fmla="*/ 3090670 h 4528839"/>
+              <a:gd name="csX30" fmla="*/ 3121153 w 3706368"/>
+              <a:gd name="csY30" fmla="*/ 3147078 h 4528839"/>
+              <a:gd name="csX31" fmla="*/ 3121153 w 3706368"/>
+              <a:gd name="csY31" fmla="*/ 3480326 h 4528839"/>
+              <a:gd name="csX32" fmla="*/ 2926081 w 3706368"/>
+              <a:gd name="csY32" fmla="*/ 3512838 h 4528839"/>
+              <a:gd name="csX33" fmla="*/ 2926081 w 3706368"/>
+              <a:gd name="csY33" fmla="*/ 3147078 h 4528839"/>
+              <a:gd name="csX34" fmla="*/ 3023617 w 3706368"/>
+              <a:gd name="csY34" fmla="*/ 3065798 h 4528839"/>
+              <a:gd name="csX35" fmla="*/ 1072897 w 3706368"/>
+              <a:gd name="csY35" fmla="*/ 2740678 h 4528839"/>
+              <a:gd name="csX36" fmla="*/ 1142440 w 3706368"/>
+              <a:gd name="csY36" fmla="*/ 2765550 h 4528839"/>
+              <a:gd name="csX37" fmla="*/ 1170433 w 3706368"/>
+              <a:gd name="csY37" fmla="*/ 2821958 h 4528839"/>
+              <a:gd name="csX38" fmla="*/ 1170433 w 3706368"/>
+              <a:gd name="csY38" fmla="*/ 2981105 h 4528839"/>
+              <a:gd name="csX39" fmla="*/ 975361 w 3706368"/>
+              <a:gd name="csY39" fmla="*/ 3021745 h 4528839"/>
+              <a:gd name="csX40" fmla="*/ 975361 w 3706368"/>
+              <a:gd name="csY40" fmla="*/ 2821958 h 4528839"/>
+              <a:gd name="csX41" fmla="*/ 1072897 w 3706368"/>
+              <a:gd name="csY41" fmla="*/ 2740678 h 4528839"/>
+              <a:gd name="csX42" fmla="*/ 3433960 w 3706368"/>
+              <a:gd name="csY42" fmla="*/ 2684409 h 4528839"/>
+              <a:gd name="csX43" fmla="*/ 3473766 w 3706368"/>
+              <a:gd name="csY43" fmla="*/ 2699849 h 4528839"/>
+              <a:gd name="csX44" fmla="*/ 3511297 w 3706368"/>
+              <a:gd name="csY44" fmla="*/ 2763924 h 4528839"/>
+              <a:gd name="csX45" fmla="*/ 3511297 w 3706368"/>
+              <a:gd name="csY45" fmla="*/ 3415302 h 4528839"/>
+              <a:gd name="csX46" fmla="*/ 3316225 w 3706368"/>
+              <a:gd name="csY46" fmla="*/ 3447815 h 4528839"/>
+              <a:gd name="csX47" fmla="*/ 3316225 w 3706368"/>
+              <a:gd name="csY47" fmla="*/ 3147078 h 4528839"/>
+              <a:gd name="csX48" fmla="*/ 3034249 w 3706368"/>
+              <a:gd name="csY48" fmla="*/ 2903238 h 4528839"/>
+              <a:gd name="csX49" fmla="*/ 2818279 w 3706368"/>
+              <a:gd name="csY49" fmla="*/ 2979817 h 4528839"/>
+              <a:gd name="csX50" fmla="*/ 2731009 w 3706368"/>
+              <a:gd name="csY50" fmla="*/ 3161384 h 4528839"/>
+              <a:gd name="csX51" fmla="*/ 2731009 w 3706368"/>
+              <a:gd name="csY51" fmla="*/ 3545351 h 4528839"/>
+              <a:gd name="csX52" fmla="*/ 2535937 w 3706368"/>
+              <a:gd name="csY52" fmla="*/ 3577862 h 4528839"/>
+              <a:gd name="csX53" fmla="*/ 2535937 w 3706368"/>
+              <a:gd name="csY53" fmla="*/ 3309638 h 4528839"/>
+              <a:gd name="csX54" fmla="*/ 2253960 w 3706368"/>
+              <a:gd name="csY54" fmla="*/ 3065798 h 4528839"/>
+              <a:gd name="csX55" fmla="*/ 2037991 w 3706368"/>
+              <a:gd name="csY55" fmla="*/ 3142377 h 4528839"/>
+              <a:gd name="csX56" fmla="*/ 1950721 w 3706368"/>
+              <a:gd name="csY56" fmla="*/ 3323944 h 4528839"/>
+              <a:gd name="csX57" fmla="*/ 1950721 w 3706368"/>
+              <a:gd name="csY57" fmla="*/ 3675398 h 4528839"/>
+              <a:gd name="csX58" fmla="*/ 1755649 w 3706368"/>
+              <a:gd name="csY58" fmla="*/ 3707911 h 4528839"/>
+              <a:gd name="csX59" fmla="*/ 1755649 w 3706368"/>
+              <a:gd name="csY59" fmla="*/ 3472198 h 4528839"/>
+              <a:gd name="csX60" fmla="*/ 1473672 w 3706368"/>
+              <a:gd name="csY60" fmla="*/ 3228358 h 4528839"/>
+              <a:gd name="csX61" fmla="*/ 1257703 w 3706368"/>
+              <a:gd name="csY61" fmla="*/ 3304937 h 4528839"/>
+              <a:gd name="csX62" fmla="*/ 1170433 w 3706368"/>
+              <a:gd name="csY62" fmla="*/ 3486504 h 4528839"/>
+              <a:gd name="csX63" fmla="*/ 1170433 w 3706368"/>
+              <a:gd name="csY63" fmla="*/ 3805446 h 4528839"/>
+              <a:gd name="csX64" fmla="*/ 975361 w 3706368"/>
+              <a:gd name="csY64" fmla="*/ 3837958 h 4528839"/>
+              <a:gd name="csX65" fmla="*/ 975361 w 3706368"/>
+              <a:gd name="csY65" fmla="*/ 3634758 h 4528839"/>
+              <a:gd name="csX66" fmla="*/ 693384 w 3706368"/>
+              <a:gd name="csY66" fmla="*/ 3390918 h 4528839"/>
+              <a:gd name="csX67" fmla="*/ 477415 w 3706368"/>
+              <a:gd name="csY67" fmla="*/ 3467497 h 4528839"/>
+              <a:gd name="csX68" fmla="*/ 390145 w 3706368"/>
+              <a:gd name="csY68" fmla="*/ 3649064 h 4528839"/>
+              <a:gd name="csX69" fmla="*/ 390145 w 3706368"/>
+              <a:gd name="csY69" fmla="*/ 3935495 h 4528839"/>
+              <a:gd name="csX70" fmla="*/ 195073 w 3706368"/>
+              <a:gd name="csY70" fmla="*/ 3968006 h 4528839"/>
+              <a:gd name="csX71" fmla="*/ 197121 w 3706368"/>
+              <a:gd name="csY71" fmla="*/ 3415140 h 4528839"/>
+              <a:gd name="csX72" fmla="*/ 270956 w 3706368"/>
+              <a:gd name="csY72" fmla="*/ 3336542 h 4528839"/>
+              <a:gd name="csX73" fmla="*/ 3390060 w 3706368"/>
+              <a:gd name="csY73" fmla="*/ 2685083 h 4528839"/>
+              <a:gd name="csX74" fmla="*/ 3433960 w 3706368"/>
+              <a:gd name="csY74" fmla="*/ 2684409 h 4528839"/>
+              <a:gd name="csX75" fmla="*/ 1853185 w 3706368"/>
+              <a:gd name="csY75" fmla="*/ 2578118 h 4528839"/>
+              <a:gd name="csX76" fmla="*/ 1922728 w 3706368"/>
+              <a:gd name="csY76" fmla="*/ 2602990 h 4528839"/>
+              <a:gd name="csX77" fmla="*/ 1950721 w 3706368"/>
+              <a:gd name="csY77" fmla="*/ 2659398 h 4528839"/>
+              <a:gd name="csX78" fmla="*/ 1950721 w 3706368"/>
+              <a:gd name="csY78" fmla="*/ 2818057 h 4528839"/>
+              <a:gd name="csX79" fmla="*/ 1755649 w 3706368"/>
+              <a:gd name="csY79" fmla="*/ 2858697 h 4528839"/>
+              <a:gd name="csX80" fmla="*/ 1755649 w 3706368"/>
+              <a:gd name="csY80" fmla="*/ 2659398 h 4528839"/>
+              <a:gd name="csX81" fmla="*/ 1853185 w 3706368"/>
+              <a:gd name="csY81" fmla="*/ 2578118 h 4528839"/>
+              <a:gd name="csX82" fmla="*/ 2633473 w 3706368"/>
+              <a:gd name="csY82" fmla="*/ 2415558 h 4528839"/>
+              <a:gd name="csX83" fmla="*/ 2703016 w 3706368"/>
+              <a:gd name="csY83" fmla="*/ 2440430 h 4528839"/>
+              <a:gd name="csX84" fmla="*/ 2731009 w 3706368"/>
+              <a:gd name="csY84" fmla="*/ 2496838 h 4528839"/>
+              <a:gd name="csX85" fmla="*/ 2731009 w 3706368"/>
+              <a:gd name="csY85" fmla="*/ 2655009 h 4528839"/>
+              <a:gd name="csX86" fmla="*/ 2535937 w 3706368"/>
+              <a:gd name="csY86" fmla="*/ 2695649 h 4528839"/>
+              <a:gd name="csX87" fmla="*/ 2535937 w 3706368"/>
+              <a:gd name="csY87" fmla="*/ 2496838 h 4528839"/>
+              <a:gd name="csX88" fmla="*/ 2633473 w 3706368"/>
+              <a:gd name="csY88" fmla="*/ 2415558 h 4528839"/>
+              <a:gd name="csX89" fmla="*/ 3238888 w 3706368"/>
+              <a:gd name="csY89" fmla="*/ 1952564 h 4528839"/>
+              <a:gd name="csX90" fmla="*/ 3278694 w 3706368"/>
+              <a:gd name="csY90" fmla="*/ 1968004 h 4528839"/>
+              <a:gd name="csX91" fmla="*/ 3316225 w 3706368"/>
+              <a:gd name="csY91" fmla="*/ 2032080 h 4528839"/>
+              <a:gd name="csX92" fmla="*/ 3316225 w 3706368"/>
+              <a:gd name="csY92" fmla="*/ 2532846 h 4528839"/>
+              <a:gd name="csX93" fmla="*/ 2926081 w 3706368"/>
+              <a:gd name="csY93" fmla="*/ 2614126 h 4528839"/>
+              <a:gd name="csX94" fmla="*/ 2926081 w 3706368"/>
+              <a:gd name="csY94" fmla="*/ 2496839 h 4528839"/>
+              <a:gd name="csX95" fmla="*/ 2644105 w 3706368"/>
+              <a:gd name="csY95" fmla="*/ 2252999 h 4528839"/>
+              <a:gd name="csX96" fmla="*/ 2428135 w 3706368"/>
+              <a:gd name="csY96" fmla="*/ 2329578 h 4528839"/>
+              <a:gd name="csX97" fmla="*/ 2340865 w 3706368"/>
+              <a:gd name="csY97" fmla="*/ 2511144 h 4528839"/>
+              <a:gd name="csX98" fmla="*/ 2340865 w 3706368"/>
+              <a:gd name="csY98" fmla="*/ 2736534 h 4528839"/>
+              <a:gd name="csX99" fmla="*/ 2145793 w 3706368"/>
+              <a:gd name="csY99" fmla="*/ 2777174 h 4528839"/>
+              <a:gd name="csX100" fmla="*/ 2145793 w 3706368"/>
+              <a:gd name="csY100" fmla="*/ 2659399 h 4528839"/>
+              <a:gd name="csX101" fmla="*/ 1863816 w 3706368"/>
+              <a:gd name="csY101" fmla="*/ 2415559 h 4528839"/>
+              <a:gd name="csX102" fmla="*/ 1647847 w 3706368"/>
+              <a:gd name="csY102" fmla="*/ 2492138 h 4528839"/>
+              <a:gd name="csX103" fmla="*/ 1560577 w 3706368"/>
+              <a:gd name="csY103" fmla="*/ 2673704 h 4528839"/>
+              <a:gd name="csX104" fmla="*/ 1560577 w 3706368"/>
+              <a:gd name="csY104" fmla="*/ 2899581 h 4528839"/>
+              <a:gd name="csX105" fmla="*/ 1365505 w 3706368"/>
+              <a:gd name="csY105" fmla="*/ 2940221 h 4528839"/>
+              <a:gd name="csX106" fmla="*/ 1365505 w 3706368"/>
+              <a:gd name="csY106" fmla="*/ 2821959 h 4528839"/>
+              <a:gd name="csX107" fmla="*/ 1083528 w 3706368"/>
+              <a:gd name="csY107" fmla="*/ 2578119 h 4528839"/>
+              <a:gd name="csX108" fmla="*/ 867559 w 3706368"/>
+              <a:gd name="csY108" fmla="*/ 2654698 h 4528839"/>
+              <a:gd name="csX109" fmla="*/ 780289 w 3706368"/>
+              <a:gd name="csY109" fmla="*/ 2836264 h 4528839"/>
+              <a:gd name="csX110" fmla="*/ 780289 w 3706368"/>
+              <a:gd name="csY110" fmla="*/ 3062710 h 4528839"/>
+              <a:gd name="csX111" fmla="*/ 390145 w 3706368"/>
+              <a:gd name="csY111" fmla="*/ 3143990 h 4528839"/>
+              <a:gd name="csX112" fmla="*/ 392876 w 3706368"/>
+              <a:gd name="csY112" fmla="*/ 2602340 h 4528839"/>
+              <a:gd name="csX113" fmla="*/ 466613 w 3706368"/>
+              <a:gd name="csY113" fmla="*/ 2523742 h 4528839"/>
+              <a:gd name="csX114" fmla="*/ 3194988 w 3706368"/>
+              <a:gd name="csY114" fmla="*/ 1953238 h 4528839"/>
+              <a:gd name="csX115" fmla="*/ 3238888 w 3706368"/>
+              <a:gd name="csY115" fmla="*/ 1952564 h 4528839"/>
+              <a:gd name="csX116" fmla="*/ 3042611 w 3706368"/>
+              <a:gd name="csY116" fmla="*/ 1141090 h 4528839"/>
+              <a:gd name="csX117" fmla="*/ 3082952 w 3706368"/>
+              <a:gd name="csY117" fmla="*/ 1156304 h 4528839"/>
+              <a:gd name="csX118" fmla="*/ 3121153 w 3706368"/>
+              <a:gd name="csY118" fmla="*/ 1220742 h 4528839"/>
+              <a:gd name="csX119" fmla="*/ 3121153 w 3706368"/>
+              <a:gd name="csY119" fmla="*/ 1801813 h 4528839"/>
+              <a:gd name="csX120" fmla="*/ 2926081 w 3706368"/>
+              <a:gd name="csY120" fmla="*/ 1842453 h 4528839"/>
+              <a:gd name="csX121" fmla="*/ 2926081 w 3706368"/>
+              <a:gd name="csY121" fmla="*/ 1440198 h 4528839"/>
+              <a:gd name="csX122" fmla="*/ 2828545 w 3706368"/>
+              <a:gd name="csY122" fmla="*/ 1358918 h 4528839"/>
+              <a:gd name="csX123" fmla="*/ 2731009 w 3706368"/>
+              <a:gd name="csY123" fmla="*/ 1440198 h 4528839"/>
+              <a:gd name="csX124" fmla="*/ 2731009 w 3706368"/>
+              <a:gd name="csY124" fmla="*/ 1883012 h 4528839"/>
+              <a:gd name="csX125" fmla="*/ 2438401 w 3706368"/>
+              <a:gd name="csY125" fmla="*/ 1944135 h 4528839"/>
+              <a:gd name="csX126" fmla="*/ 2438401 w 3706368"/>
+              <a:gd name="csY126" fmla="*/ 1521478 h 4528839"/>
+              <a:gd name="csX127" fmla="*/ 2340865 w 3706368"/>
+              <a:gd name="csY127" fmla="*/ 1440198 h 4528839"/>
+              <a:gd name="csX128" fmla="*/ 2243329 w 3706368"/>
+              <a:gd name="csY128" fmla="*/ 1521478 h 4528839"/>
+              <a:gd name="csX129" fmla="*/ 2243329 w 3706368"/>
+              <a:gd name="csY129" fmla="*/ 1985100 h 4528839"/>
+              <a:gd name="csX130" fmla="*/ 1950721 w 3706368"/>
+              <a:gd name="csY130" fmla="*/ 2046222 h 4528839"/>
+              <a:gd name="csX131" fmla="*/ 1950721 w 3706368"/>
+              <a:gd name="csY131" fmla="*/ 1684038 h 4528839"/>
+              <a:gd name="csX132" fmla="*/ 1853185 w 3706368"/>
+              <a:gd name="csY132" fmla="*/ 1602758 h 4528839"/>
+              <a:gd name="csX133" fmla="*/ 1755649 w 3706368"/>
+              <a:gd name="csY133" fmla="*/ 1684038 h 4528839"/>
+              <a:gd name="csX134" fmla="*/ 1755649 w 3706368"/>
+              <a:gd name="csY134" fmla="*/ 2086943 h 4528839"/>
+              <a:gd name="csX135" fmla="*/ 1463041 w 3706368"/>
+              <a:gd name="csY135" fmla="*/ 2148066 h 4528839"/>
+              <a:gd name="csX136" fmla="*/ 1463041 w 3706368"/>
+              <a:gd name="csY136" fmla="*/ 1765318 h 4528839"/>
+              <a:gd name="csX137" fmla="*/ 1365505 w 3706368"/>
+              <a:gd name="csY137" fmla="*/ 1684038 h 4528839"/>
+              <a:gd name="csX138" fmla="*/ 1267969 w 3706368"/>
+              <a:gd name="csY138" fmla="*/ 1765318 h 4528839"/>
+              <a:gd name="csX139" fmla="*/ 1267969 w 3706368"/>
+              <a:gd name="csY139" fmla="*/ 2188869 h 4528839"/>
+              <a:gd name="csX140" fmla="*/ 975361 w 3706368"/>
+              <a:gd name="csY140" fmla="*/ 2249991 h 4528839"/>
+              <a:gd name="csX141" fmla="*/ 975361 w 3706368"/>
+              <a:gd name="csY141" fmla="*/ 1846598 h 4528839"/>
+              <a:gd name="csX142" fmla="*/ 877825 w 3706368"/>
+              <a:gd name="csY142" fmla="*/ 1765318 h 4528839"/>
+              <a:gd name="csX143" fmla="*/ 780289 w 3706368"/>
+              <a:gd name="csY143" fmla="*/ 1846598 h 4528839"/>
+              <a:gd name="csX144" fmla="*/ 780289 w 3706368"/>
+              <a:gd name="csY144" fmla="*/ 2290794 h 4528839"/>
+              <a:gd name="csX145" fmla="*/ 585217 w 3706368"/>
+              <a:gd name="csY145" fmla="*/ 2331434 h 4528839"/>
+              <a:gd name="csX146" fmla="*/ 586680 w 3706368"/>
+              <a:gd name="csY146" fmla="*/ 1743292 h 4528839"/>
+              <a:gd name="csX147" fmla="*/ 658954 w 3706368"/>
+              <a:gd name="csY147" fmla="*/ 1664938 h 4528839"/>
+              <a:gd name="csX148" fmla="*/ 2998355 w 3706368"/>
+              <a:gd name="csY148" fmla="*/ 1142307 h 4528839"/>
+              <a:gd name="csX149" fmla="*/ 3042611 w 3706368"/>
+              <a:gd name="csY149" fmla="*/ 1141090 h 4528839"/>
+              <a:gd name="csX150" fmla="*/ 2845764 w 3706368"/>
+              <a:gd name="csY150" fmla="*/ 412318 h 4528839"/>
+              <a:gd name="csX151" fmla="*/ 2886939 w 3706368"/>
+              <a:gd name="csY151" fmla="*/ 427218 h 4528839"/>
+              <a:gd name="csX152" fmla="*/ 2926080 w 3706368"/>
+              <a:gd name="csY152" fmla="*/ 492311 h 4528839"/>
+              <a:gd name="csX153" fmla="*/ 2926080 w 3706368"/>
+              <a:gd name="csY153" fmla="*/ 990151 h 4528839"/>
+              <a:gd name="csX154" fmla="*/ 2731008 w 3706368"/>
+              <a:gd name="csY154" fmla="*/ 1033799 h 4528839"/>
+              <a:gd name="csX155" fmla="*/ 2731008 w 3706368"/>
+              <a:gd name="csY155" fmla="*/ 708679 h 4528839"/>
+              <a:gd name="csX156" fmla="*/ 2633472 w 3706368"/>
+              <a:gd name="csY156" fmla="*/ 627398 h 4528839"/>
+              <a:gd name="csX157" fmla="*/ 2535936 w 3706368"/>
+              <a:gd name="csY157" fmla="*/ 708679 h 4528839"/>
+              <a:gd name="csX158" fmla="*/ 2535936 w 3706368"/>
+              <a:gd name="csY158" fmla="*/ 1077609 h 4528839"/>
+              <a:gd name="csX159" fmla="*/ 2340864 w 3706368"/>
+              <a:gd name="csY159" fmla="*/ 1121174 h 4528839"/>
+              <a:gd name="csX160" fmla="*/ 2340864 w 3706368"/>
+              <a:gd name="csY160" fmla="*/ 789959 h 4528839"/>
+              <a:gd name="csX161" fmla="*/ 2243328 w 3706368"/>
+              <a:gd name="csY161" fmla="*/ 708679 h 4528839"/>
+              <a:gd name="csX162" fmla="*/ 2145792 w 3706368"/>
+              <a:gd name="csY162" fmla="*/ 789959 h 4528839"/>
+              <a:gd name="csX163" fmla="*/ 2145792 w 3706368"/>
+              <a:gd name="csY163" fmla="*/ 1164740 h 4528839"/>
+              <a:gd name="csX164" fmla="*/ 1950720 w 3706368"/>
+              <a:gd name="csY164" fmla="*/ 1208307 h 4528839"/>
+              <a:gd name="csX165" fmla="*/ 1950720 w 3706368"/>
+              <a:gd name="csY165" fmla="*/ 871238 h 4528839"/>
+              <a:gd name="csX166" fmla="*/ 1853184 w 3706368"/>
+              <a:gd name="csY166" fmla="*/ 789959 h 4528839"/>
+              <a:gd name="csX167" fmla="*/ 1755648 w 3706368"/>
+              <a:gd name="csY167" fmla="*/ 871238 h 4528839"/>
+              <a:gd name="csX168" fmla="*/ 1755648 w 3706368"/>
+              <a:gd name="csY168" fmla="*/ 1251873 h 4528839"/>
+              <a:gd name="csX169" fmla="*/ 1560576 w 3706368"/>
+              <a:gd name="csY169" fmla="*/ 1295520 h 4528839"/>
+              <a:gd name="csX170" fmla="*/ 1560576 w 3706368"/>
+              <a:gd name="csY170" fmla="*/ 952518 h 4528839"/>
+              <a:gd name="csX171" fmla="*/ 1463040 w 3706368"/>
+              <a:gd name="csY171" fmla="*/ 871238 h 4528839"/>
+              <a:gd name="csX172" fmla="*/ 1365504 w 3706368"/>
+              <a:gd name="csY172" fmla="*/ 952518 h 4528839"/>
+              <a:gd name="csX173" fmla="*/ 1365504 w 3706368"/>
+              <a:gd name="csY173" fmla="*/ 1339086 h 4528839"/>
+              <a:gd name="csX174" fmla="*/ 1170432 w 3706368"/>
+              <a:gd name="csY174" fmla="*/ 1382652 h 4528839"/>
+              <a:gd name="csX175" fmla="*/ 1170432 w 3706368"/>
+              <a:gd name="csY175" fmla="*/ 1033799 h 4528839"/>
+              <a:gd name="csX176" fmla="*/ 1072896 w 3706368"/>
+              <a:gd name="csY176" fmla="*/ 952518 h 4528839"/>
+              <a:gd name="csX177" fmla="*/ 975360 w 3706368"/>
+              <a:gd name="csY177" fmla="*/ 1033799 h 4528839"/>
+              <a:gd name="csX178" fmla="*/ 975360 w 3706368"/>
+              <a:gd name="csY178" fmla="*/ 1426218 h 4528839"/>
+              <a:gd name="csX179" fmla="*/ 780971 w 3706368"/>
+              <a:gd name="csY179" fmla="*/ 1469703 h 4528839"/>
+              <a:gd name="csX180" fmla="*/ 784287 w 3706368"/>
+              <a:gd name="csY180" fmla="*/ 971376 h 4528839"/>
+              <a:gd name="csX181" fmla="*/ 854123 w 3706368"/>
+              <a:gd name="csY181" fmla="*/ 893915 h 4528839"/>
+              <a:gd name="csX182" fmla="*/ 2800942 w 3706368"/>
+              <a:gd name="csY182" fmla="*/ 414363 h 4528839"/>
+              <a:gd name="csX183" fmla="*/ 2845764 w 3706368"/>
+              <a:gd name="csY183" fmla="*/ 412318 h 4528839"/>
+              <a:gd name="csX184" fmla="*/ 2653672 w 3706368"/>
+              <a:gd name="csY184" fmla="*/ 1763 h 4528839"/>
+              <a:gd name="csX185" fmla="*/ 2693478 w 3706368"/>
+              <a:gd name="csY185" fmla="*/ 17203 h 4528839"/>
+              <a:gd name="csX186" fmla="*/ 2731009 w 3706368"/>
+              <a:gd name="csY186" fmla="*/ 81279 h 4528839"/>
+              <a:gd name="csX187" fmla="*/ 2731009 w 3706368"/>
+              <a:gd name="csY187" fmla="*/ 262208 h 4528839"/>
+              <a:gd name="csX188" fmla="*/ 975361 w 3706368"/>
+              <a:gd name="csY188" fmla="*/ 694211 h 4528839"/>
+              <a:gd name="csX189" fmla="*/ 975361 w 3706368"/>
+              <a:gd name="csY189" fmla="*/ 406317 h 4528839"/>
+              <a:gd name="csX190" fmla="*/ 1049196 w 3706368"/>
+              <a:gd name="csY190" fmla="*/ 327557 h 4528839"/>
+              <a:gd name="csX191" fmla="*/ 2609772 w 3706368"/>
+              <a:gd name="csY191" fmla="*/ 2437 h 4528839"/>
+              <a:gd name="csX192" fmla="*/ 2653672 w 3706368"/>
+              <a:gd name="csY192" fmla="*/ 1763 h 4528839"/>
+            </a:gdLst>
+            <a:ahLst/>
+            <a:cxnLst>
+              <a:cxn ang="0">
+                <a:pos x="csX0" y="csY0"/>
+              </a:cxn>
+              <a:cxn ang="0">
+                <a:pos x="csX1" y="csY1"/>
+              </a:cxn>
+              <a:cxn ang="0">
+                <a:pos x="csX2" y="csY2"/>
+              </a:cxn>
+              <a:cxn ang="0">
+                <a:pos x="csX3" y="csY3"/>
+              </a:cxn>
+              <a:cxn ang="0">
+                <a:pos x="csX4" y="csY4"/>
+              </a:cxn>
+              <a:cxn ang="0">
+                <a:pos x="csX5" y="csY5"/>
+              </a:cxn>
+              <a:cxn ang="0">
+                <a:pos x="csX6" y="csY6"/>
+              </a:cxn>
+              <a:cxn ang="0">
+                <a:pos x="csX7" y="csY7"/>
+              </a:cxn>
+              <a:cxn ang="0">
+                <a:pos x="csX8" y="csY8"/>
+              </a:cxn>
+              <a:cxn ang="0">
+                <a:pos x="csX9" y="csY9"/>
+              </a:cxn>
+              <a:cxn ang="0">
+                <a:pos x="csX10" y="csY10"/>
+              </a:cxn>
+              <a:cxn ang="0">
+                <a:pos x="csX11" y="csY11"/>
+              </a:cxn>
+              <a:cxn ang="0">
+                <a:pos x="csX12" y="csY12"/>
+              </a:cxn>
+              <a:cxn ang="0">
+                <a:pos x="csX13" y="csY13"/>
+              </a:cxn>
+              <a:cxn ang="0">
+                <a:pos x="csX14" y="csY14"/>
+              </a:cxn>
+              <a:cxn ang="0">
+                <a:pos x="csX15" y="csY15"/>
+              </a:cxn>
+              <a:cxn ang="0">
+                <a:pos x="csX16" y="csY16"/>
+              </a:cxn>
+              <a:cxn ang="0">
+                <a:pos x="csX17" y="csY17"/>
+              </a:cxn>
+              <a:cxn ang="0">
+                <a:pos x="csX18" y="csY18"/>
+              </a:cxn>
+              <a:cxn ang="0">
+                <a:pos x="csX19" y="csY19"/>
+              </a:cxn>
+              <a:cxn ang="0">
+                <a:pos x="csX20" y="csY20"/>
+              </a:cxn>
+              <a:cxn ang="0">
+                <a:pos x="csX21" y="csY21"/>
+              </a:cxn>
+              <a:cxn ang="0">
+                <a:pos x="csX22" y="csY22"/>
+              </a:cxn>
+              <a:cxn ang="0">
+                <a:pos x="csX23" y="csY23"/>
+              </a:cxn>
+              <a:cxn ang="0">
+                <a:pos x="csX24" y="csY24"/>
+              </a:cxn>
+              <a:cxn ang="0">
+                <a:pos x="csX25" y="csY25"/>
+              </a:cxn>
+              <a:cxn ang="0">
+                <a:pos x="csX26" y="csY26"/>
+              </a:cxn>
+              <a:cxn ang="0">
+                <a:pos x="csX27" y="csY27"/>
+              </a:cxn>
+              <a:cxn ang="0">
+                <a:pos x="csX28" y="csY28"/>
+              </a:cxn>
+              <a:cxn ang="0">
+                <a:pos x="csX29" y="csY29"/>
+              </a:cxn>
+              <a:cxn ang="0">
+                <a:pos x="csX30" y="csY30"/>
+              </a:cxn>
+              <a:cxn ang="0">
+                <a:pos x="csX31" y="csY31"/>
+              </a:cxn>
+              <a:cxn ang="0">
+                <a:pos x="csX32" y="csY32"/>
+              </a:cxn>
+              <a:cxn ang="0">
+                <a:pos x="csX33" y="csY33"/>
+              </a:cxn>
+              <a:cxn ang="0">
+                <a:pos x="csX34" y="csY34"/>
+              </a:cxn>
+              <a:cxn ang="0">
+                <a:pos x="csX35" y="csY35"/>
+              </a:cxn>
+              <a:cxn ang="0">
+                <a:pos x="csX36" y="csY36"/>
+              </a:cxn>
+              <a:cxn ang="0">
+                <a:pos x="csX37" y="csY37"/>
+              </a:cxn>
+              <a:cxn ang="0">
+                <a:pos x="csX38" y="csY38"/>
+              </a:cxn>
+              <a:cxn ang="0">
+                <a:pos x="csX39" y="csY39"/>
+              </a:cxn>
+              <a:cxn ang="0">
+                <a:pos x="csX40" y="csY40"/>
+              </a:cxn>
+              <a:cxn ang="0">
+                <a:pos x="csX41" y="csY41"/>
+              </a:cxn>
+              <a:cxn ang="0">
+                <a:pos x="csX42" y="csY42"/>
+              </a:cxn>
+              <a:cxn ang="0">
+                <a:pos x="csX43" y="csY43"/>
+              </a:cxn>
+              <a:cxn ang="0">
+                <a:pos x="csX44" y="csY44"/>
+              </a:cxn>
+              <a:cxn ang="0">
+                <a:pos x="csX45" y="csY45"/>
+              </a:cxn>
+              <a:cxn ang="0">
+                <a:pos x="csX46" y="csY46"/>
+              </a:cxn>
+              <a:cxn ang="0">
+                <a:pos x="csX47" y="csY47"/>
+              </a:cxn>
+              <a:cxn ang="0">
+                <a:pos x="csX48" y="csY48"/>
+              </a:cxn>
+              <a:cxn ang="0">
+                <a:pos x="csX49" y="csY49"/>
+              </a:cxn>
+              <a:cxn ang="0">
+                <a:pos x="csX50" y="csY50"/>
+              </a:cxn>
+              <a:cxn ang="0">
+                <a:pos x="csX51" y="csY51"/>
+              </a:cxn>
+              <a:cxn ang="0">
+                <a:pos x="csX52" y="csY52"/>
+              </a:cxn>
+              <a:cxn ang="0">
+                <a:pos x="csX53" y="csY53"/>
+              </a:cxn>
+              <a:cxn ang="0">
+                <a:pos x="csX54" y="csY54"/>
+              </a:cxn>
+              <a:cxn ang="0">
+                <a:pos x="csX55" y="csY55"/>
+              </a:cxn>
+              <a:cxn ang="0">
+                <a:pos x="csX56" y="csY56"/>
+              </a:cxn>
+              <a:cxn ang="0">
+                <a:pos x="csX57" y="csY57"/>
+              </a:cxn>
+              <a:cxn ang="0">
+                <a:pos x="csX58" y="csY58"/>
+              </a:cxn>
+              <a:cxn ang="0">
+                <a:pos x="csX59" y="csY59"/>
+              </a:cxn>
+              <a:cxn ang="0">
+                <a:pos x="csX60" y="csY60"/>
+              </a:cxn>
+              <a:cxn ang="0">
+                <a:pos x="csX61" y="csY61"/>
+              </a:cxn>
+              <a:cxn ang="0">
+                <a:pos x="csX62" y="csY62"/>
+              </a:cxn>
+              <a:cxn ang="0">
+                <a:pos x="csX63" y="csY63"/>
+              </a:cxn>
+              <a:cxn ang="0">
+                <a:pos x="csX64" y="csY64"/>
+              </a:cxn>
+              <a:cxn ang="0">
+                <a:pos x="csX65" y="csY65"/>
+              </a:cxn>
+              <a:cxn ang="0">
+                <a:pos x="csX66" y="csY66"/>
+              </a:cxn>
+              <a:cxn ang="0">
+                <a:pos x="csX67" y="csY67"/>
+              </a:cxn>
+              <a:cxn ang="0">
+                <a:pos x="csX68" y="csY68"/>
+              </a:cxn>
+              <a:cxn ang="0">
+                <a:pos x="csX69" y="csY69"/>
+              </a:cxn>
+              <a:cxn ang="0">
+                <a:pos x="csX70" y="csY70"/>
+              </a:cxn>
+              <a:cxn ang="0">
+                <a:pos x="csX71" y="csY71"/>
+              </a:cxn>
+              <a:cxn ang="0">
+                <a:pos x="csX72" y="csY72"/>
+              </a:cxn>
+              <a:cxn ang="0">
+                <a:pos x="csX73" y="csY73"/>
+              </a:cxn>
+              <a:cxn ang="0">
+                <a:pos x="csX74" y="csY74"/>
+              </a:cxn>
+              <a:cxn ang="0">
+                <a:pos x="csX75" y="csY75"/>
+              </a:cxn>
+              <a:cxn ang="0">
+                <a:pos x="csX76" y="csY76"/>
+              </a:cxn>
+              <a:cxn ang="0">
+                <a:pos x="csX77" y="csY77"/>
+              </a:cxn>
+              <a:cxn ang="0">
+                <a:pos x="csX78" y="csY78"/>
+              </a:cxn>
+              <a:cxn ang="0">
+                <a:pos x="csX79" y="csY79"/>
+              </a:cxn>
+              <a:cxn ang="0">
+                <a:pos x="csX80" y="csY80"/>
+              </a:cxn>
+              <a:cxn ang="0">
+                <a:pos x="csX81" y="csY81"/>
+              </a:cxn>
+              <a:cxn ang="0">
+                <a:pos x="csX82" y="csY82"/>
+              </a:cxn>
+              <a:cxn ang="0">
+                <a:pos x="csX83" y="csY83"/>
+              </a:cxn>
+              <a:cxn ang="0">
+                <a:pos x="csX84" y="csY84"/>
+              </a:cxn>
+              <a:cxn ang="0">
+                <a:pos x="csX85" y="csY85"/>
+              </a:cxn>
+              <a:cxn ang="0">
+                <a:pos x="csX86" y="csY86"/>
+              </a:cxn>
+              <a:cxn ang="0">
+                <a:pos x="csX87" y="csY87"/>
+              </a:cxn>
+              <a:cxn ang="0">
+                <a:pos x="csX88" y="csY88"/>
+              </a:cxn>
+              <a:cxn ang="0">
+                <a:pos x="csX89" y="csY89"/>
+              </a:cxn>
+              <a:cxn ang="0">
+                <a:pos x="csX90" y="csY90"/>
+              </a:cxn>
+              <a:cxn ang="0">
+                <a:pos x="csX91" y="csY91"/>
+              </a:cxn>
+              <a:cxn ang="0">
+                <a:pos x="csX92" y="csY92"/>
+              </a:cxn>
+              <a:cxn ang="0">
+                <a:pos x="csX93" y="csY93"/>
+              </a:cxn>
+              <a:cxn ang="0">
+                <a:pos x="csX94" y="csY94"/>
+              </a:cxn>
+              <a:cxn ang="0">
+                <a:pos x="csX95" y="csY95"/>
+              </a:cxn>
+              <a:cxn ang="0">
+                <a:pos x="csX96" y="csY96"/>
+              </a:cxn>
+              <a:cxn ang="0">
+                <a:pos x="csX97" y="csY97"/>
+              </a:cxn>
+              <a:cxn ang="0">
+                <a:pos x="csX98" y="csY98"/>
+              </a:cxn>
+              <a:cxn ang="0">
+                <a:pos x="csX99" y="csY99"/>
+              </a:cxn>
+              <a:cxn ang="0">
+                <a:pos x="csX100" y="csY100"/>
+              </a:cxn>
+              <a:cxn ang="0">
+                <a:pos x="csX101" y="csY101"/>
+              </a:cxn>
+              <a:cxn ang="0">
+                <a:pos x="csX102" y="csY102"/>
+              </a:cxn>
+              <a:cxn ang="0">
+                <a:pos x="csX103" y="csY103"/>
+              </a:cxn>
+              <a:cxn ang="0">
+                <a:pos x="csX104" y="csY104"/>
+              </a:cxn>
+              <a:cxn ang="0">
+                <a:pos x="csX105" y="csY105"/>
+              </a:cxn>
+              <a:cxn ang="0">
+                <a:pos x="csX106" y="csY106"/>
+              </a:cxn>
+              <a:cxn ang="0">
+                <a:pos x="csX107" y="csY107"/>
+              </a:cxn>
+              <a:cxn ang="0">
+                <a:pos x="csX108" y="csY108"/>
+              </a:cxn>
+              <a:cxn ang="0">
+                <a:pos x="csX109" y="csY109"/>
+              </a:cxn>
+              <a:cxn ang="0">
+                <a:pos x="csX110" y="csY110"/>
+              </a:cxn>
+              <a:cxn ang="0">
+                <a:pos x="csX111" y="csY111"/>
+              </a:cxn>
+              <a:cxn ang="0">
+                <a:pos x="csX112" y="csY112"/>
+              </a:cxn>
+              <a:cxn ang="0">
+                <a:pos x="csX113" y="csY113"/>
+              </a:cxn>
+              <a:cxn ang="0">
+                <a:pos x="csX114" y="csY114"/>
+              </a:cxn>
+              <a:cxn ang="0">
+                <a:pos x="csX115" y="csY115"/>
+              </a:cxn>
+              <a:cxn ang="0">
+                <a:pos x="csX116" y="csY116"/>
+              </a:cxn>
+              <a:cxn ang="0">
+                <a:pos x="csX117" y="csY117"/>
+              </a:cxn>
+              <a:cxn ang="0">
+                <a:pos x="csX118" y="csY118"/>
+              </a:cxn>
+              <a:cxn ang="0">
+                <a:pos x="csX119" y="csY119"/>
+              </a:cxn>
+              <a:cxn ang="0">
+                <a:pos x="csX120" y="csY120"/>
+              </a:cxn>
+              <a:cxn ang="0">
+                <a:pos x="csX121" y="csY121"/>
+              </a:cxn>
+              <a:cxn ang="0">
+                <a:pos x="csX122" y="csY122"/>
+              </a:cxn>
+              <a:cxn ang="0">
+                <a:pos x="csX123" y="csY123"/>
+              </a:cxn>
+              <a:cxn ang="0">
+                <a:pos x="csX124" y="csY124"/>
+              </a:cxn>
+              <a:cxn ang="0">
+                <a:pos x="csX125" y="csY125"/>
+              </a:cxn>
+              <a:cxn ang="0">
+                <a:pos x="csX126" y="csY126"/>
+              </a:cxn>
+              <a:cxn ang="0">
+                <a:pos x="csX127" y="csY127"/>
+              </a:cxn>
+              <a:cxn ang="0">
+                <a:pos x="csX128" y="csY128"/>
+              </a:cxn>
+              <a:cxn ang="0">
+                <a:pos x="csX129" y="csY129"/>
+              </a:cxn>
+              <a:cxn ang="0">
+                <a:pos x="csX130" y="csY130"/>
+              </a:cxn>
+              <a:cxn ang="0">
+                <a:pos x="csX131" y="csY131"/>
+              </a:cxn>
+              <a:cxn ang="0">
+                <a:pos x="csX132" y="csY132"/>
+              </a:cxn>
+              <a:cxn ang="0">
+                <a:pos x="csX133" y="csY133"/>
+              </a:cxn>
+              <a:cxn ang="0">
+                <a:pos x="csX134" y="csY134"/>
+              </a:cxn>
+              <a:cxn ang="0">
+                <a:pos x="csX135" y="csY135"/>
+              </a:cxn>
+              <a:cxn ang="0">
+                <a:pos x="csX136" y="csY136"/>
+              </a:cxn>
+              <a:cxn ang="0">
+                <a:pos x="csX137" y="csY137"/>
+              </a:cxn>
+              <a:cxn ang="0">
+                <a:pos x="csX138" y="csY138"/>
+              </a:cxn>
+              <a:cxn ang="0">
+                <a:pos x="csX139" y="csY139"/>
+              </a:cxn>
+              <a:cxn ang="0">
+                <a:pos x="csX140" y="csY140"/>
+              </a:cxn>
+              <a:cxn ang="0">
+                <a:pos x="csX141" y="csY141"/>
+              </a:cxn>
+              <a:cxn ang="0">
+                <a:pos x="csX142" y="csY142"/>
+              </a:cxn>
+              <a:cxn ang="0">
+                <a:pos x="csX143" y="csY143"/>
+              </a:cxn>
+              <a:cxn ang="0">
+                <a:pos x="csX144" y="csY144"/>
+              </a:cxn>
+              <a:cxn ang="0">
+                <a:pos x="csX145" y="csY145"/>
+              </a:cxn>
+              <a:cxn ang="0">
+                <a:pos x="csX146" y="csY146"/>
+              </a:cxn>
+              <a:cxn ang="0">
+                <a:pos x="csX147" y="csY147"/>
+              </a:cxn>
+              <a:cxn ang="0">
+                <a:pos x="csX148" y="csY148"/>
+              </a:cxn>
+              <a:cxn ang="0">
+                <a:pos x="csX149" y="csY149"/>
+              </a:cxn>
+              <a:cxn ang="0">
+                <a:pos x="csX150" y="csY150"/>
+              </a:cxn>
+              <a:cxn ang="0">
+                <a:pos x="csX151" y="csY151"/>
+              </a:cxn>
+              <a:cxn ang="0">
+                <a:pos x="csX152" y="csY152"/>
+              </a:cxn>
+              <a:cxn ang="0">
+                <a:pos x="csX153" y="csY153"/>
+              </a:cxn>
+              <a:cxn ang="0">
+                <a:pos x="csX154" y="csY154"/>
+              </a:cxn>
+              <a:cxn ang="0">
+                <a:pos x="csX155" y="csY155"/>
+              </a:cxn>
+              <a:cxn ang="0">
+                <a:pos x="csX156" y="csY156"/>
+              </a:cxn>
+              <a:cxn ang="0">
+                <a:pos x="csX157" y="csY157"/>
+              </a:cxn>
+              <a:cxn ang="0">
+                <a:pos x="csX158" y="csY158"/>
+              </a:cxn>
+              <a:cxn ang="0">
+                <a:pos x="csX159" y="csY159"/>
+              </a:cxn>
+              <a:cxn ang="0">
+                <a:pos x="csX160" y="csY160"/>
+              </a:cxn>
+              <a:cxn ang="0">
+                <a:pos x="csX161" y="csY161"/>
+              </a:cxn>
+              <a:cxn ang="0">
+                <a:pos x="csX162" y="csY162"/>
+              </a:cxn>
+              <a:cxn ang="0">
+                <a:pos x="csX163" y="csY163"/>
+              </a:cxn>
+              <a:cxn ang="0">
+                <a:pos x="csX164" y="csY164"/>
+              </a:cxn>
+              <a:cxn ang="0">
+                <a:pos x="csX165" y="csY165"/>
+              </a:cxn>
+              <a:cxn ang="0">
+                <a:pos x="csX166" y="csY166"/>
+              </a:cxn>
+              <a:cxn ang="0">
+                <a:pos x="csX167" y="csY167"/>
+              </a:cxn>
+              <a:cxn ang="0">
+                <a:pos x="csX168" y="csY168"/>
+              </a:cxn>
+              <a:cxn ang="0">
+                <a:pos x="csX169" y="csY169"/>
+              </a:cxn>
+              <a:cxn ang="0">
+                <a:pos x="csX170" y="csY170"/>
+              </a:cxn>
+              <a:cxn ang="0">
+                <a:pos x="csX171" y="csY171"/>
+              </a:cxn>
+              <a:cxn ang="0">
+                <a:pos x="csX172" y="csY172"/>
+              </a:cxn>
+              <a:cxn ang="0">
+                <a:pos x="csX173" y="csY173"/>
+              </a:cxn>
+              <a:cxn ang="0">
+                <a:pos x="csX174" y="csY174"/>
+              </a:cxn>
+              <a:cxn ang="0">
+                <a:pos x="csX175" y="csY175"/>
+              </a:cxn>
+              <a:cxn ang="0">
+                <a:pos x="csX176" y="csY176"/>
+              </a:cxn>
+              <a:cxn ang="0">
+                <a:pos x="csX177" y="csY177"/>
+              </a:cxn>
+              <a:cxn ang="0">
+                <a:pos x="csX178" y="csY178"/>
+              </a:cxn>
+              <a:cxn ang="0">
+                <a:pos x="csX179" y="csY179"/>
+              </a:cxn>
+              <a:cxn ang="0">
+                <a:pos x="csX180" y="csY180"/>
+              </a:cxn>
+              <a:cxn ang="0">
+                <a:pos x="csX181" y="csY181"/>
+              </a:cxn>
+              <a:cxn ang="0">
+                <a:pos x="csX182" y="csY182"/>
+              </a:cxn>
+              <a:cxn ang="0">
+                <a:pos x="csX183" y="csY183"/>
+              </a:cxn>
+              <a:cxn ang="0">
+                <a:pos x="csX184" y="csY184"/>
+              </a:cxn>
+              <a:cxn ang="0">
+                <a:pos x="csX185" y="csY185"/>
+              </a:cxn>
+              <a:cxn ang="0">
+                <a:pos x="csX186" y="csY186"/>
+              </a:cxn>
+              <a:cxn ang="0">
+                <a:pos x="csX187" y="csY187"/>
+              </a:cxn>
+              <a:cxn ang="0">
+                <a:pos x="csX188" y="csY188"/>
+              </a:cxn>
+              <a:cxn ang="0">
+                <a:pos x="csX189" y="csY189"/>
+              </a:cxn>
+              <a:cxn ang="0">
+                <a:pos x="csX190" y="csY190"/>
+              </a:cxn>
+              <a:cxn ang="0">
+                <a:pos x="csX191" y="csY191"/>
+              </a:cxn>
+              <a:cxn ang="0">
+                <a:pos x="csX192" y="csY192"/>
+              </a:cxn>
+            </a:cxnLst>
+            <a:rect l="l" t="t" r="r" b="b"/>
+            <a:pathLst>
+              <a:path w="3706368" h="4528839">
+                <a:moveTo>
+                  <a:pt x="3589325" y="3568028"/>
+                </a:moveTo>
+                <a:cubicBezTo>
+                  <a:pt x="3618025" y="3563146"/>
+                  <a:pt x="3647839" y="3569271"/>
+                  <a:pt x="3670527" y="3584712"/>
+                </a:cubicBezTo>
+                <a:cubicBezTo>
+                  <a:pt x="3693215" y="3600152"/>
+                  <a:pt x="3706374" y="3623272"/>
+                  <a:pt x="3706368" y="3647682"/>
+                </a:cubicBezTo>
+                <a:lnTo>
+                  <a:pt x="3706368" y="4528839"/>
+                </a:lnTo>
+                <a:lnTo>
+                  <a:pt x="0" y="4528839"/>
+                </a:lnTo>
+                <a:lnTo>
+                  <a:pt x="0" y="4232898"/>
+                </a:lnTo>
+                <a:cubicBezTo>
+                  <a:pt x="-9" y="4194269"/>
+                  <a:pt x="32610" y="4160970"/>
+                  <a:pt x="78029" y="4153244"/>
+                </a:cubicBezTo>
+                <a:close/>
+                <a:moveTo>
+                  <a:pt x="682753" y="3553478"/>
+                </a:moveTo>
+                <a:cubicBezTo>
+                  <a:pt x="709058" y="3553424"/>
+                  <a:pt x="734222" y="3562423"/>
+                  <a:pt x="752296" y="3578350"/>
+                </a:cubicBezTo>
+                <a:cubicBezTo>
+                  <a:pt x="770384" y="3593231"/>
+                  <a:pt x="780481" y="3613577"/>
+                  <a:pt x="780289" y="3634758"/>
+                </a:cubicBezTo>
+                <a:lnTo>
+                  <a:pt x="780289" y="3870470"/>
+                </a:lnTo>
+                <a:lnTo>
+                  <a:pt x="585217" y="3902982"/>
+                </a:lnTo>
+                <a:lnTo>
+                  <a:pt x="585217" y="3634758"/>
+                </a:lnTo>
+                <a:cubicBezTo>
+                  <a:pt x="585217" y="3589869"/>
+                  <a:pt x="628885" y="3553478"/>
+                  <a:pt x="682753" y="3553478"/>
+                </a:cubicBezTo>
+                <a:close/>
+                <a:moveTo>
+                  <a:pt x="1463041" y="3390918"/>
+                </a:moveTo>
+                <a:cubicBezTo>
+                  <a:pt x="1489346" y="3390864"/>
+                  <a:pt x="1514510" y="3399863"/>
+                  <a:pt x="1532584" y="3415790"/>
+                </a:cubicBezTo>
+                <a:cubicBezTo>
+                  <a:pt x="1550672" y="3430671"/>
+                  <a:pt x="1560769" y="3451017"/>
+                  <a:pt x="1560577" y="3472198"/>
+                </a:cubicBezTo>
+                <a:lnTo>
+                  <a:pt x="1560577" y="3740422"/>
+                </a:lnTo>
+                <a:lnTo>
+                  <a:pt x="1365505" y="3772934"/>
+                </a:lnTo>
+                <a:lnTo>
+                  <a:pt x="1365505" y="3472198"/>
+                </a:lnTo>
+                <a:cubicBezTo>
+                  <a:pt x="1365505" y="3427309"/>
+                  <a:pt x="1409173" y="3390918"/>
+                  <a:pt x="1463041" y="3390918"/>
+                </a:cubicBezTo>
+                <a:close/>
+                <a:moveTo>
+                  <a:pt x="2243329" y="3228358"/>
+                </a:moveTo>
+                <a:cubicBezTo>
+                  <a:pt x="2269634" y="3228304"/>
+                  <a:pt x="2294798" y="3237303"/>
+                  <a:pt x="2312872" y="3253230"/>
+                </a:cubicBezTo>
+                <a:cubicBezTo>
+                  <a:pt x="2330960" y="3268111"/>
+                  <a:pt x="2341057" y="3288457"/>
+                  <a:pt x="2340865" y="3309638"/>
+                </a:cubicBezTo>
+                <a:lnTo>
+                  <a:pt x="2340865" y="3610374"/>
+                </a:lnTo>
+                <a:lnTo>
+                  <a:pt x="2145793" y="3642886"/>
+                </a:lnTo>
+                <a:lnTo>
+                  <a:pt x="2145793" y="3309638"/>
+                </a:lnTo>
+                <a:cubicBezTo>
+                  <a:pt x="2145793" y="3264749"/>
+                  <a:pt x="2189461" y="3228358"/>
+                  <a:pt x="2243329" y="3228358"/>
+                </a:cubicBezTo>
+                <a:close/>
+                <a:moveTo>
+                  <a:pt x="3023617" y="3065798"/>
+                </a:moveTo>
+                <a:cubicBezTo>
+                  <a:pt x="3049922" y="3065744"/>
+                  <a:pt x="3075086" y="3074743"/>
+                  <a:pt x="3093160" y="3090670"/>
+                </a:cubicBezTo>
+                <a:cubicBezTo>
+                  <a:pt x="3111248" y="3105551"/>
+                  <a:pt x="3121345" y="3125897"/>
+                  <a:pt x="3121153" y="3147078"/>
+                </a:cubicBezTo>
+                <a:lnTo>
+                  <a:pt x="3121153" y="3480326"/>
+                </a:lnTo>
+                <a:lnTo>
+                  <a:pt x="2926081" y="3512838"/>
+                </a:lnTo>
+                <a:lnTo>
+                  <a:pt x="2926081" y="3147078"/>
+                </a:lnTo>
+                <a:cubicBezTo>
+                  <a:pt x="2926081" y="3102189"/>
+                  <a:pt x="2969749" y="3065798"/>
+                  <a:pt x="3023617" y="3065798"/>
+                </a:cubicBezTo>
+                <a:close/>
+                <a:moveTo>
+                  <a:pt x="1072897" y="2740678"/>
+                </a:moveTo>
+                <a:cubicBezTo>
+                  <a:pt x="1099202" y="2740624"/>
+                  <a:pt x="1124366" y="2749623"/>
+                  <a:pt x="1142440" y="2765550"/>
+                </a:cubicBezTo>
+                <a:cubicBezTo>
+                  <a:pt x="1160528" y="2780431"/>
+                  <a:pt x="1170625" y="2800777"/>
+                  <a:pt x="1170433" y="2821958"/>
+                </a:cubicBezTo>
+                <a:lnTo>
+                  <a:pt x="1170433" y="2981105"/>
+                </a:lnTo>
+                <a:lnTo>
+                  <a:pt x="975361" y="3021745"/>
+                </a:lnTo>
+                <a:lnTo>
+                  <a:pt x="975361" y="2821958"/>
+                </a:lnTo>
+                <a:cubicBezTo>
+                  <a:pt x="975361" y="2777069"/>
+                  <a:pt x="1019029" y="2740678"/>
+                  <a:pt x="1072897" y="2740678"/>
+                </a:cubicBezTo>
+                <a:close/>
+                <a:moveTo>
+                  <a:pt x="3433960" y="2684409"/>
+                </a:moveTo>
+                <a:cubicBezTo>
+                  <a:pt x="3448283" y="2686935"/>
+                  <a:pt x="3461924" y="2692148"/>
+                  <a:pt x="3473766" y="2699849"/>
+                </a:cubicBezTo>
+                <a:cubicBezTo>
+                  <a:pt x="3497451" y="2715251"/>
+                  <a:pt x="3511296" y="2738889"/>
+                  <a:pt x="3511297" y="2763924"/>
+                </a:cubicBezTo>
+                <a:lnTo>
+                  <a:pt x="3511297" y="3415302"/>
+                </a:lnTo>
+                <a:lnTo>
+                  <a:pt x="3316225" y="3447815"/>
+                </a:lnTo>
+                <a:lnTo>
+                  <a:pt x="3316225" y="3147078"/>
+                </a:lnTo>
+                <a:cubicBezTo>
+                  <a:pt x="3315526" y="3016065"/>
+                  <a:pt x="3191331" y="2908667"/>
+                  <a:pt x="3034249" y="2903238"/>
+                </a:cubicBezTo>
+                <a:cubicBezTo>
+                  <a:pt x="2952903" y="2903817"/>
+                  <a:pt x="2875185" y="2931374"/>
+                  <a:pt x="2818279" y="2979817"/>
+                </a:cubicBezTo>
+                <a:cubicBezTo>
+                  <a:pt x="2761373" y="3028261"/>
+                  <a:pt x="2729968" y="3093599"/>
+                  <a:pt x="2731009" y="3161384"/>
+                </a:cubicBezTo>
+                <a:lnTo>
+                  <a:pt x="2731009" y="3545351"/>
+                </a:lnTo>
+                <a:lnTo>
+                  <a:pt x="2535937" y="3577862"/>
+                </a:lnTo>
+                <a:lnTo>
+                  <a:pt x="2535937" y="3309638"/>
+                </a:lnTo>
+                <a:cubicBezTo>
+                  <a:pt x="2535238" y="3178625"/>
+                  <a:pt x="2411043" y="3071227"/>
+                  <a:pt x="2253960" y="3065798"/>
+                </a:cubicBezTo>
+                <a:cubicBezTo>
+                  <a:pt x="2172615" y="3066377"/>
+                  <a:pt x="2094897" y="3093934"/>
+                  <a:pt x="2037991" y="3142377"/>
+                </a:cubicBezTo>
+                <a:cubicBezTo>
+                  <a:pt x="1981085" y="3190821"/>
+                  <a:pt x="1949681" y="3256159"/>
+                  <a:pt x="1950721" y="3323944"/>
+                </a:cubicBezTo>
+                <a:lnTo>
+                  <a:pt x="1950721" y="3675398"/>
+                </a:lnTo>
+                <a:lnTo>
+                  <a:pt x="1755649" y="3707911"/>
+                </a:lnTo>
+                <a:lnTo>
+                  <a:pt x="1755649" y="3472198"/>
+                </a:lnTo>
+                <a:cubicBezTo>
+                  <a:pt x="1754950" y="3341185"/>
+                  <a:pt x="1630755" y="3233787"/>
+                  <a:pt x="1473672" y="3228358"/>
+                </a:cubicBezTo>
+                <a:cubicBezTo>
+                  <a:pt x="1392327" y="3228937"/>
+                  <a:pt x="1314609" y="3256494"/>
+                  <a:pt x="1257703" y="3304937"/>
+                </a:cubicBezTo>
+                <a:cubicBezTo>
+                  <a:pt x="1200797" y="3353381"/>
+                  <a:pt x="1169393" y="3418719"/>
+                  <a:pt x="1170433" y="3486504"/>
+                </a:cubicBezTo>
+                <a:lnTo>
+                  <a:pt x="1170433" y="3805446"/>
+                </a:lnTo>
+                <a:lnTo>
+                  <a:pt x="975361" y="3837958"/>
+                </a:lnTo>
+                <a:lnTo>
+                  <a:pt x="975361" y="3634758"/>
+                </a:lnTo>
+                <a:cubicBezTo>
+                  <a:pt x="974662" y="3503745"/>
+                  <a:pt x="850467" y="3396347"/>
+                  <a:pt x="693384" y="3390918"/>
+                </a:cubicBezTo>
+                <a:cubicBezTo>
+                  <a:pt x="612039" y="3391497"/>
+                  <a:pt x="534320" y="3419054"/>
+                  <a:pt x="477415" y="3467497"/>
+                </a:cubicBezTo>
+                <a:cubicBezTo>
+                  <a:pt x="420509" y="3515941"/>
+                  <a:pt x="389104" y="3581279"/>
+                  <a:pt x="390145" y="3649064"/>
+                </a:cubicBezTo>
+                <a:lnTo>
+                  <a:pt x="390145" y="3935495"/>
+                </a:lnTo>
+                <a:lnTo>
+                  <a:pt x="195073" y="3968006"/>
+                </a:lnTo>
+                <a:lnTo>
+                  <a:pt x="197121" y="3415140"/>
+                </a:lnTo>
+                <a:cubicBezTo>
+                  <a:pt x="197256" y="3377949"/>
+                  <a:pt x="227665" y="3345579"/>
+                  <a:pt x="270956" y="3336542"/>
+                </a:cubicBezTo>
+                <a:lnTo>
+                  <a:pt x="3390060" y="2685083"/>
+                </a:lnTo>
+                <a:cubicBezTo>
+                  <a:pt x="3404631" y="2682041"/>
+                  <a:pt x="3419637" y="2681882"/>
+                  <a:pt x="3433960" y="2684409"/>
+                </a:cubicBezTo>
+                <a:close/>
+                <a:moveTo>
+                  <a:pt x="1853185" y="2578118"/>
+                </a:moveTo>
+                <a:cubicBezTo>
+                  <a:pt x="1879490" y="2578064"/>
+                  <a:pt x="1904654" y="2587063"/>
+                  <a:pt x="1922728" y="2602990"/>
+                </a:cubicBezTo>
+                <a:cubicBezTo>
+                  <a:pt x="1940816" y="2617871"/>
+                  <a:pt x="1950913" y="2638217"/>
+                  <a:pt x="1950721" y="2659398"/>
+                </a:cubicBezTo>
+                <a:lnTo>
+                  <a:pt x="1950721" y="2818057"/>
+                </a:lnTo>
+                <a:lnTo>
+                  <a:pt x="1755649" y="2858697"/>
+                </a:lnTo>
+                <a:lnTo>
+                  <a:pt x="1755649" y="2659398"/>
+                </a:lnTo>
+                <a:cubicBezTo>
+                  <a:pt x="1755649" y="2614509"/>
+                  <a:pt x="1799317" y="2578118"/>
+                  <a:pt x="1853185" y="2578118"/>
+                </a:cubicBezTo>
+                <a:close/>
+                <a:moveTo>
+                  <a:pt x="2633473" y="2415558"/>
+                </a:moveTo>
+                <a:cubicBezTo>
+                  <a:pt x="2659778" y="2415504"/>
+                  <a:pt x="2684942" y="2424503"/>
+                  <a:pt x="2703016" y="2440430"/>
+                </a:cubicBezTo>
+                <a:cubicBezTo>
+                  <a:pt x="2721104" y="2455311"/>
+                  <a:pt x="2731201" y="2475657"/>
+                  <a:pt x="2731009" y="2496838"/>
+                </a:cubicBezTo>
+                <a:lnTo>
+                  <a:pt x="2731009" y="2655009"/>
+                </a:lnTo>
+                <a:lnTo>
+                  <a:pt x="2535937" y="2695649"/>
+                </a:lnTo>
+                <a:lnTo>
+                  <a:pt x="2535937" y="2496838"/>
+                </a:lnTo>
+                <a:cubicBezTo>
+                  <a:pt x="2535937" y="2451949"/>
+                  <a:pt x="2579605" y="2415558"/>
+                  <a:pt x="2633473" y="2415558"/>
+                </a:cubicBezTo>
+                <a:close/>
+                <a:moveTo>
+                  <a:pt x="3238888" y="1952564"/>
+                </a:moveTo>
+                <a:cubicBezTo>
+                  <a:pt x="3253211" y="1955090"/>
+                  <a:pt x="3266852" y="1960303"/>
+                  <a:pt x="3278694" y="1968004"/>
+                </a:cubicBezTo>
+                <a:cubicBezTo>
+                  <a:pt x="3302379" y="1983406"/>
+                  <a:pt x="3316224" y="2007044"/>
+                  <a:pt x="3316225" y="2032080"/>
+                </a:cubicBezTo>
+                <a:lnTo>
+                  <a:pt x="3316225" y="2532846"/>
+                </a:lnTo>
+                <a:lnTo>
+                  <a:pt x="2926081" y="2614126"/>
+                </a:lnTo>
+                <a:lnTo>
+                  <a:pt x="2926081" y="2496839"/>
+                </a:lnTo>
+                <a:cubicBezTo>
+                  <a:pt x="2925382" y="2365826"/>
+                  <a:pt x="2801187" y="2258427"/>
+                  <a:pt x="2644105" y="2252999"/>
+                </a:cubicBezTo>
+                <a:cubicBezTo>
+                  <a:pt x="2562759" y="2253577"/>
+                  <a:pt x="2485041" y="2281134"/>
+                  <a:pt x="2428135" y="2329578"/>
+                </a:cubicBezTo>
+                <a:cubicBezTo>
+                  <a:pt x="2371229" y="2378021"/>
+                  <a:pt x="2339825" y="2443359"/>
+                  <a:pt x="2340865" y="2511144"/>
+                </a:cubicBezTo>
+                <a:lnTo>
+                  <a:pt x="2340865" y="2736534"/>
+                </a:lnTo>
+                <a:lnTo>
+                  <a:pt x="2145793" y="2777174"/>
+                </a:lnTo>
+                <a:lnTo>
+                  <a:pt x="2145793" y="2659399"/>
+                </a:lnTo>
+                <a:cubicBezTo>
+                  <a:pt x="2145094" y="2528386"/>
+                  <a:pt x="2020899" y="2420987"/>
+                  <a:pt x="1863816" y="2415559"/>
+                </a:cubicBezTo>
+                <a:cubicBezTo>
+                  <a:pt x="1782471" y="2416137"/>
+                  <a:pt x="1704753" y="2443694"/>
+                  <a:pt x="1647847" y="2492138"/>
+                </a:cubicBezTo>
+                <a:cubicBezTo>
+                  <a:pt x="1590941" y="2540581"/>
+                  <a:pt x="1559537" y="2605919"/>
+                  <a:pt x="1560577" y="2673704"/>
+                </a:cubicBezTo>
+                <a:lnTo>
+                  <a:pt x="1560577" y="2899581"/>
+                </a:lnTo>
+                <a:lnTo>
+                  <a:pt x="1365505" y="2940221"/>
+                </a:lnTo>
+                <a:lnTo>
+                  <a:pt x="1365505" y="2821959"/>
+                </a:lnTo>
+                <a:cubicBezTo>
+                  <a:pt x="1364806" y="2690946"/>
+                  <a:pt x="1240611" y="2583547"/>
+                  <a:pt x="1083528" y="2578119"/>
+                </a:cubicBezTo>
+                <a:cubicBezTo>
+                  <a:pt x="1002183" y="2578697"/>
+                  <a:pt x="924465" y="2606254"/>
+                  <a:pt x="867559" y="2654698"/>
+                </a:cubicBezTo>
+                <a:cubicBezTo>
+                  <a:pt x="810653" y="2703141"/>
+                  <a:pt x="779248" y="2768479"/>
+                  <a:pt x="780289" y="2836264"/>
+                </a:cubicBezTo>
+                <a:lnTo>
+                  <a:pt x="780289" y="3062710"/>
+                </a:lnTo>
+                <a:lnTo>
+                  <a:pt x="390145" y="3143990"/>
+                </a:lnTo>
+                <a:lnTo>
+                  <a:pt x="392876" y="2602340"/>
+                </a:lnTo>
+                <a:cubicBezTo>
+                  <a:pt x="393000" y="2565173"/>
+                  <a:pt x="423361" y="2532811"/>
+                  <a:pt x="466613" y="2523742"/>
+                </a:cubicBezTo>
+                <a:lnTo>
+                  <a:pt x="3194988" y="1953238"/>
+                </a:lnTo>
+                <a:cubicBezTo>
+                  <a:pt x="3209559" y="1950196"/>
+                  <a:pt x="3224565" y="1950037"/>
+                  <a:pt x="3238888" y="1952564"/>
+                </a:cubicBezTo>
+                <a:close/>
+                <a:moveTo>
+                  <a:pt x="3042611" y="1141090"/>
+                </a:moveTo>
+                <a:cubicBezTo>
+                  <a:pt x="3057094" y="1143486"/>
+                  <a:pt x="3070924" y="1148620"/>
+                  <a:pt x="3082952" y="1156304"/>
+                </a:cubicBezTo>
+                <a:cubicBezTo>
+                  <a:pt x="3107009" y="1171670"/>
+                  <a:pt x="3121127" y="1195483"/>
+                  <a:pt x="3121153" y="1220742"/>
+                </a:cubicBezTo>
+                <a:lnTo>
+                  <a:pt x="3121153" y="1801813"/>
+                </a:lnTo>
+                <a:lnTo>
+                  <a:pt x="2926081" y="1842453"/>
+                </a:lnTo>
+                <a:lnTo>
+                  <a:pt x="2926081" y="1440198"/>
+                </a:lnTo>
+                <a:cubicBezTo>
+                  <a:pt x="2926081" y="1395309"/>
+                  <a:pt x="2882413" y="1358918"/>
+                  <a:pt x="2828545" y="1358918"/>
+                </a:cubicBezTo>
+                <a:cubicBezTo>
+                  <a:pt x="2774678" y="1358918"/>
+                  <a:pt x="2731009" y="1395309"/>
+                  <a:pt x="2731009" y="1440198"/>
+                </a:cubicBezTo>
+                <a:lnTo>
+                  <a:pt x="2731009" y="1883012"/>
+                </a:lnTo>
+                <a:lnTo>
+                  <a:pt x="2438401" y="1944135"/>
+                </a:lnTo>
+                <a:lnTo>
+                  <a:pt x="2438401" y="1521478"/>
+                </a:lnTo>
+                <a:cubicBezTo>
+                  <a:pt x="2438401" y="1476589"/>
+                  <a:pt x="2394733" y="1440198"/>
+                  <a:pt x="2340865" y="1440198"/>
+                </a:cubicBezTo>
+                <a:cubicBezTo>
+                  <a:pt x="2286997" y="1440198"/>
+                  <a:pt x="2243329" y="1476589"/>
+                  <a:pt x="2243329" y="1521478"/>
+                </a:cubicBezTo>
+                <a:lnTo>
+                  <a:pt x="2243329" y="1985100"/>
+                </a:lnTo>
+                <a:lnTo>
+                  <a:pt x="1950721" y="2046222"/>
+                </a:lnTo>
+                <a:lnTo>
+                  <a:pt x="1950721" y="1684038"/>
+                </a:lnTo>
+                <a:cubicBezTo>
+                  <a:pt x="1950721" y="1639149"/>
+                  <a:pt x="1907053" y="1602758"/>
+                  <a:pt x="1853185" y="1602758"/>
+                </a:cubicBezTo>
+                <a:cubicBezTo>
+                  <a:pt x="1799317" y="1602758"/>
+                  <a:pt x="1755649" y="1639149"/>
+                  <a:pt x="1755649" y="1684038"/>
+                </a:cubicBezTo>
+                <a:lnTo>
+                  <a:pt x="1755649" y="2086943"/>
+                </a:lnTo>
+                <a:lnTo>
+                  <a:pt x="1463041" y="2148066"/>
+                </a:lnTo>
+                <a:lnTo>
+                  <a:pt x="1463041" y="1765318"/>
+                </a:lnTo>
+                <a:cubicBezTo>
+                  <a:pt x="1463041" y="1720429"/>
+                  <a:pt x="1419373" y="1684038"/>
+                  <a:pt x="1365505" y="1684038"/>
+                </a:cubicBezTo>
+                <a:cubicBezTo>
+                  <a:pt x="1311637" y="1684038"/>
+                  <a:pt x="1267969" y="1720429"/>
+                  <a:pt x="1267969" y="1765318"/>
+                </a:cubicBezTo>
+                <a:lnTo>
+                  <a:pt x="1267969" y="2188869"/>
+                </a:lnTo>
+                <a:lnTo>
+                  <a:pt x="975361" y="2249991"/>
+                </a:lnTo>
+                <a:lnTo>
+                  <a:pt x="975361" y="1846598"/>
+                </a:lnTo>
+                <a:cubicBezTo>
+                  <a:pt x="975361" y="1801709"/>
+                  <a:pt x="931693" y="1765318"/>
+                  <a:pt x="877825" y="1765318"/>
+                </a:cubicBezTo>
+                <a:cubicBezTo>
+                  <a:pt x="823957" y="1765318"/>
+                  <a:pt x="780289" y="1801709"/>
+                  <a:pt x="780289" y="1846598"/>
+                </a:cubicBezTo>
+                <a:lnTo>
+                  <a:pt x="780289" y="2290794"/>
+                </a:lnTo>
+                <a:lnTo>
+                  <a:pt x="585217" y="2331434"/>
+                </a:lnTo>
+                <a:lnTo>
+                  <a:pt x="586680" y="1743292"/>
+                </a:lnTo>
+                <a:cubicBezTo>
+                  <a:pt x="586763" y="1706566"/>
+                  <a:pt x="616387" y="1674449"/>
+                  <a:pt x="658954" y="1664938"/>
+                </a:cubicBezTo>
+                <a:lnTo>
+                  <a:pt x="2998355" y="1142307"/>
+                </a:lnTo>
+                <a:cubicBezTo>
+                  <a:pt x="3012994" y="1139036"/>
+                  <a:pt x="3028129" y="1138693"/>
+                  <a:pt x="3042611" y="1141090"/>
+                </a:cubicBezTo>
+                <a:close/>
+                <a:moveTo>
+                  <a:pt x="2845764" y="412318"/>
+                </a:moveTo>
+                <a:cubicBezTo>
+                  <a:pt x="2860497" y="414520"/>
+                  <a:pt x="2874623" y="419547"/>
+                  <a:pt x="2886939" y="427218"/>
+                </a:cubicBezTo>
+                <a:cubicBezTo>
+                  <a:pt x="2911571" y="442560"/>
+                  <a:pt x="2926077" y="466684"/>
+                  <a:pt x="2926080" y="492311"/>
+                </a:cubicBezTo>
+                <a:lnTo>
+                  <a:pt x="2926080" y="990151"/>
+                </a:lnTo>
+                <a:lnTo>
+                  <a:pt x="2731008" y="1033799"/>
+                </a:lnTo>
+                <a:lnTo>
+                  <a:pt x="2731008" y="708679"/>
+                </a:lnTo>
+                <a:cubicBezTo>
+                  <a:pt x="2731008" y="663790"/>
+                  <a:pt x="2687340" y="627398"/>
+                  <a:pt x="2633472" y="627398"/>
+                </a:cubicBezTo>
+                <a:cubicBezTo>
+                  <a:pt x="2579605" y="627398"/>
+                  <a:pt x="2535936" y="663790"/>
+                  <a:pt x="2535936" y="708679"/>
+                </a:cubicBezTo>
+                <a:lnTo>
+                  <a:pt x="2535936" y="1077609"/>
+                </a:lnTo>
+                <a:lnTo>
+                  <a:pt x="2340864" y="1121174"/>
+                </a:lnTo>
+                <a:lnTo>
+                  <a:pt x="2340864" y="789959"/>
+                </a:lnTo>
+                <a:cubicBezTo>
+                  <a:pt x="2340864" y="745069"/>
+                  <a:pt x="2297196" y="708679"/>
+                  <a:pt x="2243328" y="708679"/>
+                </a:cubicBezTo>
+                <a:cubicBezTo>
+                  <a:pt x="2189461" y="708679"/>
+                  <a:pt x="2145792" y="745069"/>
+                  <a:pt x="2145792" y="789959"/>
+                </a:cubicBezTo>
+                <a:lnTo>
+                  <a:pt x="2145792" y="1164740"/>
+                </a:lnTo>
+                <a:lnTo>
+                  <a:pt x="1950720" y="1208307"/>
+                </a:lnTo>
+                <a:lnTo>
+                  <a:pt x="1950720" y="871238"/>
+                </a:lnTo>
+                <a:cubicBezTo>
+                  <a:pt x="1950720" y="826349"/>
+                  <a:pt x="1907052" y="789959"/>
+                  <a:pt x="1853184" y="789959"/>
+                </a:cubicBezTo>
+                <a:cubicBezTo>
+                  <a:pt x="1799317" y="789959"/>
+                  <a:pt x="1755648" y="826349"/>
+                  <a:pt x="1755648" y="871238"/>
+                </a:cubicBezTo>
+                <a:lnTo>
+                  <a:pt x="1755648" y="1251873"/>
+                </a:lnTo>
+                <a:lnTo>
+                  <a:pt x="1560576" y="1295520"/>
+                </a:lnTo>
+                <a:lnTo>
+                  <a:pt x="1560576" y="952518"/>
+                </a:lnTo>
+                <a:cubicBezTo>
+                  <a:pt x="1560576" y="907629"/>
+                  <a:pt x="1516908" y="871238"/>
+                  <a:pt x="1463040" y="871238"/>
+                </a:cubicBezTo>
+                <a:cubicBezTo>
+                  <a:pt x="1409173" y="871238"/>
+                  <a:pt x="1365504" y="907629"/>
+                  <a:pt x="1365504" y="952518"/>
+                </a:cubicBezTo>
+                <a:lnTo>
+                  <a:pt x="1365504" y="1339086"/>
+                </a:lnTo>
+                <a:lnTo>
+                  <a:pt x="1170432" y="1382652"/>
+                </a:lnTo>
+                <a:lnTo>
+                  <a:pt x="1170432" y="1033799"/>
+                </a:lnTo>
+                <a:cubicBezTo>
+                  <a:pt x="1170432" y="988910"/>
+                  <a:pt x="1126764" y="952518"/>
+                  <a:pt x="1072896" y="952518"/>
+                </a:cubicBezTo>
+                <a:cubicBezTo>
+                  <a:pt x="1019029" y="952518"/>
+                  <a:pt x="975360" y="988910"/>
+                  <a:pt x="975360" y="1033799"/>
+                </a:cubicBezTo>
+                <a:lnTo>
+                  <a:pt x="975360" y="1426218"/>
+                </a:lnTo>
+                <a:lnTo>
+                  <a:pt x="780971" y="1469703"/>
+                </a:lnTo>
+                <a:lnTo>
+                  <a:pt x="784287" y="971376"/>
+                </a:lnTo>
+                <a:cubicBezTo>
+                  <a:pt x="784538" y="935552"/>
+                  <a:pt x="812904" y="904090"/>
+                  <a:pt x="854123" y="893915"/>
+                </a:cubicBezTo>
+                <a:lnTo>
+                  <a:pt x="2800942" y="414363"/>
+                </a:lnTo>
+                <a:cubicBezTo>
+                  <a:pt x="2815689" y="410737"/>
+                  <a:pt x="2831030" y="410115"/>
+                  <a:pt x="2845764" y="412318"/>
+                </a:cubicBezTo>
+                <a:close/>
+                <a:moveTo>
+                  <a:pt x="2653672" y="1763"/>
+                </a:moveTo>
+                <a:cubicBezTo>
+                  <a:pt x="2667995" y="4290"/>
+                  <a:pt x="2681636" y="9502"/>
+                  <a:pt x="2693478" y="17203"/>
+                </a:cubicBezTo>
+                <a:cubicBezTo>
+                  <a:pt x="2717163" y="32605"/>
+                  <a:pt x="2731008" y="56243"/>
+                  <a:pt x="2731009" y="81279"/>
+                </a:cubicBezTo>
+                <a:lnTo>
+                  <a:pt x="2731009" y="262208"/>
+                </a:lnTo>
+                <a:lnTo>
+                  <a:pt x="975361" y="694211"/>
+                </a:lnTo>
+                <a:lnTo>
+                  <a:pt x="975361" y="406317"/>
+                </a:lnTo>
+                <a:cubicBezTo>
+                  <a:pt x="975407" y="369066"/>
+                  <a:pt x="1005834" y="336609"/>
+                  <a:pt x="1049196" y="327557"/>
+                </a:cubicBezTo>
+                <a:lnTo>
+                  <a:pt x="2609772" y="2437"/>
+                </a:lnTo>
+                <a:cubicBezTo>
+                  <a:pt x="2624343" y="-605"/>
+                  <a:pt x="2639348" y="-764"/>
+                  <a:pt x="2653672" y="1763"/>
+                </a:cubicBezTo>
+                <a:close/>
+              </a:path>
+            </a:pathLst>
+          </a:custGeom>
+          <a:solidFill>
+            <a:srgbClr val="000000"/>
+          </a:solidFill>
+          <a:ln w="97536" cap="flat">
+            <a:noFill/>
+            <a:prstDash val="solid"/>
+            <a:miter/>
+          </a:ln>
         </p:spPr>
-      </p:pic>
+        <p:txBody>
+          <a:bodyPr wrap="square">
+            <a:noAutofit/>
+          </a:bodyPr>
+          <a:lstStyle/>
+          <a:p>
+            <a:endParaRPr lang="en-US"/>
+          </a:p>
+        </p:txBody>
+      </p:sp>
     </p:spTree>
     <p:extLst>
       <p:ext uri="{BB962C8B-B14F-4D97-AF65-F5344CB8AC3E}">

</xml_diff>